<commit_message>
debug flow chart added, manual merge
</commit_message>
<xml_diff>
--- a/pptFigures.pptx
+++ b/pptFigures.pptx
@@ -5,25 +5,26 @@
     <p:sldMasterId id="2147483648" r:id="rId1"/>
   </p:sldMasterIdLst>
   <p:notesMasterIdLst>
-    <p:notesMasterId r:id="rId18"/>
+    <p:notesMasterId r:id="rId19"/>
   </p:notesMasterIdLst>
   <p:sldIdLst>
-    <p:sldId id="260" r:id="rId2"/>
-    <p:sldId id="268" r:id="rId3"/>
-    <p:sldId id="261" r:id="rId4"/>
-    <p:sldId id="267" r:id="rId5"/>
-    <p:sldId id="279" r:id="rId6"/>
-    <p:sldId id="280" r:id="rId7"/>
-    <p:sldId id="278" r:id="rId8"/>
-    <p:sldId id="277" r:id="rId9"/>
-    <p:sldId id="275" r:id="rId10"/>
-    <p:sldId id="276" r:id="rId11"/>
-    <p:sldId id="273" r:id="rId12"/>
-    <p:sldId id="274" r:id="rId13"/>
-    <p:sldId id="269" r:id="rId14"/>
-    <p:sldId id="270" r:id="rId15"/>
-    <p:sldId id="272" r:id="rId16"/>
-    <p:sldId id="271" r:id="rId17"/>
+    <p:sldId id="256" r:id="rId2"/>
+    <p:sldId id="260" r:id="rId3"/>
+    <p:sldId id="268" r:id="rId4"/>
+    <p:sldId id="261" r:id="rId5"/>
+    <p:sldId id="267" r:id="rId6"/>
+    <p:sldId id="279" r:id="rId7"/>
+    <p:sldId id="280" r:id="rId8"/>
+    <p:sldId id="278" r:id="rId9"/>
+    <p:sldId id="277" r:id="rId10"/>
+    <p:sldId id="275" r:id="rId11"/>
+    <p:sldId id="276" r:id="rId12"/>
+    <p:sldId id="273" r:id="rId13"/>
+    <p:sldId id="274" r:id="rId14"/>
+    <p:sldId id="269" r:id="rId15"/>
+    <p:sldId id="270" r:id="rId16"/>
+    <p:sldId id="272" r:id="rId17"/>
+    <p:sldId id="271" r:id="rId18"/>
   </p:sldIdLst>
   <p:sldSz cx="9144000" cy="6858000" type="screen4x3"/>
   <p:notesSz cx="6858000" cy="9144000"/>
@@ -13109,7 +13110,7 @@
       <dgm:spPr/>
     </dgm:pt>
     <dgm:pt modelId="{19534C57-D135-4442-A902-30D76676158A}" type="pres">
-      <dgm:prSet presAssocID="{60A1F7A4-CDB6-4E8B-9A50-F8E571BA3491}" presName="parTxOnly" presStyleLbl="node1" presStyleIdx="0" presStyleCnt="1" custLinFactNeighborX="78404" custLinFactNeighborY="2358">
+      <dgm:prSet presAssocID="{60A1F7A4-CDB6-4E8B-9A50-F8E571BA3491}" presName="parTxOnly" presStyleLbl="node1" presStyleIdx="0" presStyleCnt="1" custLinFactNeighborX="43175">
         <dgm:presLayoutVars>
           <dgm:chMax val="0"/>
           <dgm:chPref val="0"/>
@@ -15608,7 +15609,7 @@
       </dsp:nvSpPr>
       <dsp:spPr>
         <a:xfrm>
-          <a:off x="1004" y="460387"/>
+          <a:off x="1004" y="1283506"/>
           <a:ext cx="1958950" cy="1958950"/>
         </a:xfrm>
         <a:prstGeom prst="ellipse">
@@ -15719,7 +15720,7 @@
         </a:p>
       </dsp:txBody>
       <dsp:txXfrm>
-        <a:off x="1004" y="460387"/>
+        <a:off x="1004" y="1283506"/>
         <a:ext cx="1958950" cy="1958950"/>
       </dsp:txXfrm>
     </dsp:sp>
@@ -15730,7 +15731,7 @@
       </dsp:nvSpPr>
       <dsp:spPr>
         <a:xfrm>
-          <a:off x="1568164" y="460387"/>
+          <a:off x="1568164" y="1283506"/>
           <a:ext cx="1958950" cy="1958950"/>
         </a:xfrm>
         <a:prstGeom prst="ellipse">
@@ -15841,7 +15842,7 @@
         </a:p>
       </dsp:txBody>
       <dsp:txXfrm>
-        <a:off x="1568164" y="460387"/>
+        <a:off x="1568164" y="1283506"/>
         <a:ext cx="1958950" cy="1958950"/>
       </dsp:txXfrm>
     </dsp:sp>
@@ -15852,7 +15853,7 @@
       </dsp:nvSpPr>
       <dsp:spPr>
         <a:xfrm>
-          <a:off x="3135324" y="460387"/>
+          <a:off x="3135324" y="1283506"/>
           <a:ext cx="1958950" cy="1958950"/>
         </a:xfrm>
         <a:prstGeom prst="ellipse">
@@ -15963,7 +15964,7 @@
         </a:p>
       </dsp:txBody>
       <dsp:txXfrm>
-        <a:off x="3135324" y="460387"/>
+        <a:off x="3135324" y="1283506"/>
         <a:ext cx="1958950" cy="1958950"/>
       </dsp:txXfrm>
     </dsp:sp>
@@ -15974,7 +15975,7 @@
       </dsp:nvSpPr>
       <dsp:spPr>
         <a:xfrm>
-          <a:off x="4702485" y="460387"/>
+          <a:off x="4702485" y="1283506"/>
           <a:ext cx="1958950" cy="1958950"/>
         </a:xfrm>
         <a:prstGeom prst="ellipse">
@@ -16085,7 +16086,7 @@
         </a:p>
       </dsp:txBody>
       <dsp:txXfrm>
-        <a:off x="4702485" y="460387"/>
+        <a:off x="4702485" y="1283506"/>
         <a:ext cx="1958950" cy="1958950"/>
       </dsp:txXfrm>
     </dsp:sp>
@@ -16096,7 +16097,7 @@
       </dsp:nvSpPr>
       <dsp:spPr>
         <a:xfrm>
-          <a:off x="6269645" y="460387"/>
+          <a:off x="6269645" y="1283506"/>
           <a:ext cx="1958950" cy="1958950"/>
         </a:xfrm>
         <a:prstGeom prst="ellipse">
@@ -16214,7 +16215,7 @@
         </a:p>
       </dsp:txBody>
       <dsp:txXfrm>
-        <a:off x="6269645" y="460387"/>
+        <a:off x="6269645" y="1283506"/>
         <a:ext cx="1958950" cy="1958950"/>
       </dsp:txXfrm>
     </dsp:sp>
@@ -17331,7 +17332,7 @@
       <dsp:spPr>
         <a:xfrm>
           <a:off x="3274" y="0"/>
-          <a:ext cx="3349525" cy="1066800"/>
+          <a:ext cx="3349525" cy="1066799"/>
         </a:xfrm>
         <a:prstGeom prst="chevron">
           <a:avLst/>
@@ -17434,7 +17435,7 @@
       </dsp:txBody>
       <dsp:txXfrm>
         <a:off x="3274" y="0"/>
-        <a:ext cx="3349525" cy="1066800"/>
+        <a:ext cx="3349525" cy="1066799"/>
       </dsp:txXfrm>
     </dsp:sp>
   </dsp:spTree>
@@ -36196,7 +36197,7 @@
             </a:lvl1pPr>
           </a:lstStyle>
           <a:p>
-            <a:fld id="{62660B3D-FE32-4980-9033-73A0F366DFAF}" type="datetimeFigureOut">
+            <a:fld id="{B4D587CB-4639-4B7A-9F0F-841F955FE3A0}" type="datetimeFigureOut">
               <a:rPr lang="en-US" smtClean="0"/>
               <a:t>6/15/2013</a:t>
             </a:fld>
@@ -36357,7 +36358,7 @@
             </a:lvl1pPr>
           </a:lstStyle>
           <a:p>
-            <a:fld id="{1038B51E-4605-4D7A-81F3-593EC1AC8611}" type="slidenum">
+            <a:fld id="{C7638540-05FF-4C33-A664-B971BAFF3076}" type="slidenum">
               <a:rPr lang="en-US" smtClean="0"/>
               <a:t>‹#›</a:t>
             </a:fld>
@@ -36528,7 +36529,7 @@
           <a:bodyPr/>
           <a:lstStyle/>
           <a:p>
-            <a:fld id="{1038B51E-4605-4D7A-81F3-593EC1AC8611}" type="slidenum">
+            <a:fld id="{C7638540-05FF-4C33-A664-B971BAFF3076}" type="slidenum">
               <a:rPr lang="en-US" smtClean="0"/>
               <a:t>1</a:t>
             </a:fld>
@@ -36609,7 +36610,7 @@
           <a:bodyPr/>
           <a:lstStyle/>
           <a:p>
-            <a:fld id="{1038B51E-4605-4D7A-81F3-593EC1AC8611}" type="slidenum">
+            <a:fld id="{C7638540-05FF-4C33-A664-B971BAFF3076}" type="slidenum">
               <a:rPr lang="en-US" smtClean="0"/>
               <a:t>10</a:t>
             </a:fld>
@@ -36690,7 +36691,7 @@
           <a:bodyPr/>
           <a:lstStyle/>
           <a:p>
-            <a:fld id="{1038B51E-4605-4D7A-81F3-593EC1AC8611}" type="slidenum">
+            <a:fld id="{C7638540-05FF-4C33-A664-B971BAFF3076}" type="slidenum">
               <a:rPr lang="en-US" smtClean="0"/>
               <a:t>11</a:t>
             </a:fld>
@@ -36771,7 +36772,7 @@
           <a:bodyPr/>
           <a:lstStyle/>
           <a:p>
-            <a:fld id="{1038B51E-4605-4D7A-81F3-593EC1AC8611}" type="slidenum">
+            <a:fld id="{C7638540-05FF-4C33-A664-B971BAFF3076}" type="slidenum">
               <a:rPr lang="en-US" smtClean="0"/>
               <a:t>12</a:t>
             </a:fld>
@@ -36852,7 +36853,7 @@
           <a:bodyPr/>
           <a:lstStyle/>
           <a:p>
-            <a:fld id="{1038B51E-4605-4D7A-81F3-593EC1AC8611}" type="slidenum">
+            <a:fld id="{C7638540-05FF-4C33-A664-B971BAFF3076}" type="slidenum">
               <a:rPr lang="en-US" smtClean="0"/>
               <a:t>13</a:t>
             </a:fld>
@@ -36933,7 +36934,7 @@
           <a:bodyPr/>
           <a:lstStyle/>
           <a:p>
-            <a:fld id="{1038B51E-4605-4D7A-81F3-593EC1AC8611}" type="slidenum">
+            <a:fld id="{C7638540-05FF-4C33-A664-B971BAFF3076}" type="slidenum">
               <a:rPr lang="en-US" smtClean="0"/>
               <a:t>14</a:t>
             </a:fld>
@@ -37014,7 +37015,7 @@
           <a:bodyPr/>
           <a:lstStyle/>
           <a:p>
-            <a:fld id="{1038B51E-4605-4D7A-81F3-593EC1AC8611}" type="slidenum">
+            <a:fld id="{C7638540-05FF-4C33-A664-B971BAFF3076}" type="slidenum">
               <a:rPr lang="en-US" smtClean="0"/>
               <a:t>15</a:t>
             </a:fld>
@@ -37095,9 +37096,90 @@
           <a:bodyPr/>
           <a:lstStyle/>
           <a:p>
-            <a:fld id="{1038B51E-4605-4D7A-81F3-593EC1AC8611}" type="slidenum">
+            <a:fld id="{C7638540-05FF-4C33-A664-B971BAFF3076}" type="slidenum">
               <a:rPr lang="en-US" smtClean="0"/>
               <a:t>16</a:t>
+            </a:fld>
+            <a:endParaRPr lang="en-US"/>
+          </a:p>
+        </p:txBody>
+      </p:sp>
+    </p:spTree>
+  </p:cSld>
+  <p:clrMapOvr>
+    <a:masterClrMapping/>
+  </p:clrMapOvr>
+</p:notes>
+</file>
+
+<file path=ppt/notesSlides/notesSlide17.xml><?xml version="1.0" encoding="utf-8"?>
+<p:notes xmlns:a="http://schemas.openxmlformats.org/drawingml/2006/main" xmlns:r="http://schemas.openxmlformats.org/officeDocument/2006/relationships" xmlns:p="http://schemas.openxmlformats.org/presentationml/2006/main">
+  <p:cSld>
+    <p:spTree>
+      <p:nvGrpSpPr>
+        <p:cNvPr id="1" name=""/>
+        <p:cNvGrpSpPr/>
+        <p:nvPr/>
+      </p:nvGrpSpPr>
+      <p:grpSpPr>
+        <a:xfrm>
+          <a:off x="0" y="0"/>
+          <a:ext cx="0" cy="0"/>
+          <a:chOff x="0" y="0"/>
+          <a:chExt cx="0" cy="0"/>
+        </a:xfrm>
+      </p:grpSpPr>
+      <p:sp>
+        <p:nvSpPr>
+          <p:cNvPr id="2" name="Slide Image Placeholder 1"/>
+          <p:cNvSpPr>
+            <a:spLocks noGrp="1" noRot="1" noChangeAspect="1"/>
+          </p:cNvSpPr>
+          <p:nvPr>
+            <p:ph type="sldImg"/>
+          </p:nvPr>
+        </p:nvSpPr>
+        <p:spPr/>
+      </p:sp>
+      <p:sp>
+        <p:nvSpPr>
+          <p:cNvPr id="3" name="Notes Placeholder 2"/>
+          <p:cNvSpPr>
+            <a:spLocks noGrp="1"/>
+          </p:cNvSpPr>
+          <p:nvPr>
+            <p:ph type="body" idx="1"/>
+          </p:nvPr>
+        </p:nvSpPr>
+        <p:spPr/>
+        <p:txBody>
+          <a:bodyPr>
+            <a:normAutofit/>
+          </a:bodyPr>
+          <a:lstStyle/>
+          <a:p>
+            <a:endParaRPr lang="en-US"/>
+          </a:p>
+        </p:txBody>
+      </p:sp>
+      <p:sp>
+        <p:nvSpPr>
+          <p:cNvPr id="4" name="Slide Number Placeholder 3"/>
+          <p:cNvSpPr>
+            <a:spLocks noGrp="1"/>
+          </p:cNvSpPr>
+          <p:nvPr>
+            <p:ph type="sldNum" sz="quarter" idx="10"/>
+          </p:nvPr>
+        </p:nvSpPr>
+        <p:spPr/>
+        <p:txBody>
+          <a:bodyPr/>
+          <a:lstStyle/>
+          <a:p>
+            <a:fld id="{C7638540-05FF-4C33-A664-B971BAFF3076}" type="slidenum">
+              <a:rPr lang="en-US" smtClean="0"/>
+              <a:t>17</a:t>
             </a:fld>
             <a:endParaRPr lang="en-US"/>
           </a:p>
@@ -37176,7 +37258,7 @@
           <a:bodyPr/>
           <a:lstStyle/>
           <a:p>
-            <a:fld id="{1038B51E-4605-4D7A-81F3-593EC1AC8611}" type="slidenum">
+            <a:fld id="{C7638540-05FF-4C33-A664-B971BAFF3076}" type="slidenum">
               <a:rPr lang="en-US" smtClean="0"/>
               <a:t>2</a:t>
             </a:fld>
@@ -37257,7 +37339,7 @@
           <a:bodyPr/>
           <a:lstStyle/>
           <a:p>
-            <a:fld id="{1038B51E-4605-4D7A-81F3-593EC1AC8611}" type="slidenum">
+            <a:fld id="{C7638540-05FF-4C33-A664-B971BAFF3076}" type="slidenum">
               <a:rPr lang="en-US" smtClean="0"/>
               <a:t>3</a:t>
             </a:fld>
@@ -37338,7 +37420,7 @@
           <a:bodyPr/>
           <a:lstStyle/>
           <a:p>
-            <a:fld id="{1038B51E-4605-4D7A-81F3-593EC1AC8611}" type="slidenum">
+            <a:fld id="{C7638540-05FF-4C33-A664-B971BAFF3076}" type="slidenum">
               <a:rPr lang="en-US" smtClean="0"/>
               <a:t>4</a:t>
             </a:fld>
@@ -37419,7 +37501,7 @@
           <a:bodyPr/>
           <a:lstStyle/>
           <a:p>
-            <a:fld id="{1038B51E-4605-4D7A-81F3-593EC1AC8611}" type="slidenum">
+            <a:fld id="{C7638540-05FF-4C33-A664-B971BAFF3076}" type="slidenum">
               <a:rPr lang="en-US" smtClean="0"/>
               <a:t>5</a:t>
             </a:fld>
@@ -37502,6 +37584,7 @@
           <a:p>
             <a:fld id="{1038B51E-4605-4D7A-81F3-593EC1AC8611}" type="slidenum">
               <a:rPr lang="en-US" smtClean="0"/>
+              <a:pPr/>
               <a:t>6</a:t>
             </a:fld>
             <a:endParaRPr lang="en-US"/>
@@ -37583,6 +37666,7 @@
           <a:p>
             <a:fld id="{1038B51E-4605-4D7A-81F3-593EC1AC8611}" type="slidenum">
               <a:rPr lang="en-US" smtClean="0"/>
+              <a:pPr/>
               <a:t>7</a:t>
             </a:fld>
             <a:endParaRPr lang="en-US"/>
@@ -37662,7 +37746,7 @@
           <a:bodyPr/>
           <a:lstStyle/>
           <a:p>
-            <a:fld id="{1038B51E-4605-4D7A-81F3-593EC1AC8611}" type="slidenum">
+            <a:fld id="{C7638540-05FF-4C33-A664-B971BAFF3076}" type="slidenum">
               <a:rPr lang="en-US" smtClean="0"/>
               <a:t>8</a:t>
             </a:fld>
@@ -37743,7 +37827,7 @@
           <a:bodyPr/>
           <a:lstStyle/>
           <a:p>
-            <a:fld id="{1038B51E-4605-4D7A-81F3-593EC1AC8611}" type="slidenum">
+            <a:fld id="{C7638540-05FF-4C33-A664-B971BAFF3076}" type="slidenum">
               <a:rPr lang="en-US" smtClean="0"/>
               <a:t>9</a:t>
             </a:fld>
@@ -40771,70 +40855,48 @@
           <a:chExt cx="0" cy="0"/>
         </a:xfrm>
       </p:grpSpPr>
-      <p:graphicFrame>
-        <p:nvGraphicFramePr>
-          <p:cNvPr id="4" name="Content Placeholder 3"/>
-          <p:cNvGraphicFramePr>
-            <a:graphicFrameLocks noGrp="1"/>
-          </p:cNvGraphicFramePr>
-          <p:nvPr>
-            <p:ph idx="1"/>
-            <p:extLst>
-              <p:ext uri="{D42A27DB-BD31-4B8C-83A1-F6EECF244321}">
-                <p14:modId xmlns:p14="http://schemas.microsoft.com/office/powerpoint/2010/main" xmlns="" val="812163987"/>
-              </p:ext>
-            </p:extLst>
-          </p:nvPr>
-        </p:nvGraphicFramePr>
-        <p:xfrm>
-          <a:off x="533400" y="2362201"/>
-          <a:ext cx="8077200" cy="2362199"/>
-        </p:xfrm>
-        <a:graphic>
-          <a:graphicData uri="http://schemas.openxmlformats.org/drawingml/2006/diagram">
-            <dgm:relIds xmlns:dgm="http://schemas.openxmlformats.org/drawingml/2006/diagram" xmlns:r="http://schemas.openxmlformats.org/officeDocument/2006/relationships" r:dm="rId3" r:lo="rId4" r:qs="rId5" r:cs="rId6"/>
-          </a:graphicData>
-        </a:graphic>
-      </p:graphicFrame>
       <p:sp>
         <p:nvSpPr>
-          <p:cNvPr id="6" name="TextBox 5"/>
-          <p:cNvSpPr txBox="1"/>
-          <p:nvPr/>
+          <p:cNvPr id="2" name="Title 1"/>
+          <p:cNvSpPr>
+            <a:spLocks noGrp="1"/>
+          </p:cNvSpPr>
+          <p:nvPr>
+            <p:ph type="ctrTitle"/>
+          </p:nvPr>
         </p:nvSpPr>
-        <p:spPr>
-          <a:xfrm>
-            <a:off x="3352800" y="2514600"/>
-            <a:ext cx="2438400" cy="369332"/>
-          </a:xfrm>
-          <a:prstGeom prst="rect">
-            <a:avLst/>
-          </a:prstGeom>
-          <a:noFill/>
-        </p:spPr>
+        <p:spPr/>
         <p:txBody>
-          <a:bodyPr wrap="square" rtlCol="0">
-            <a:spAutoFit/>
-          </a:bodyPr>
+          <a:bodyPr/>
           <a:lstStyle/>
           <a:p>
-            <a:pPr algn="ctr"/>
-            <a:r>
-              <a:rPr lang="en-US" cap="all" dirty="0" smtClean="0">
-                <a:latin typeface="Times New Roman" pitchFamily="18" charset="0"/>
-              </a:rPr>
-              <a:t>SELF TEST</a:t>
-            </a:r>
-            <a:endParaRPr lang="en-US" cap="all" dirty="0">
-              <a:latin typeface="Times New Roman" pitchFamily="18" charset="0"/>
-            </a:endParaRPr>
+            <a:endParaRPr lang="en-US"/>
+          </a:p>
+        </p:txBody>
+      </p:sp>
+      <p:sp>
+        <p:nvSpPr>
+          <p:cNvPr id="3" name="Subtitle 2"/>
+          <p:cNvSpPr>
+            <a:spLocks noGrp="1"/>
+          </p:cNvSpPr>
+          <p:nvPr>
+            <p:ph type="subTitle" idx="1"/>
+          </p:nvPr>
+        </p:nvSpPr>
+        <p:spPr/>
+        <p:txBody>
+          <a:bodyPr/>
+          <a:lstStyle/>
+          <a:p>
+            <a:endParaRPr lang="en-US"/>
           </a:p>
         </p:txBody>
       </p:sp>
     </p:spTree>
     <p:extLst>
       <p:ext uri="{BB962C8B-B14F-4D97-AF65-F5344CB8AC3E}">
-        <p14:creationId xmlns:p14="http://schemas.microsoft.com/office/powerpoint/2010/main" xmlns="" val="3929008511"/>
+        <p14:creationId xmlns:p14="http://schemas.microsoft.com/office/powerpoint/2010/main" xmlns="" val="2398501569"/>
       </p:ext>
     </p:extLst>
   </p:cSld>
@@ -40852,6 +40914,231 @@
 </file>
 
 <file path=ppt/slides/slide10.xml><?xml version="1.0" encoding="utf-8"?>
+<p:sld xmlns:a="http://schemas.openxmlformats.org/drawingml/2006/main" xmlns:r="http://schemas.openxmlformats.org/officeDocument/2006/relationships" xmlns:p="http://schemas.openxmlformats.org/presentationml/2006/main">
+  <p:cSld>
+    <p:spTree>
+      <p:nvGrpSpPr>
+        <p:cNvPr id="1" name=""/>
+        <p:cNvGrpSpPr/>
+        <p:nvPr/>
+      </p:nvGrpSpPr>
+      <p:grpSpPr>
+        <a:xfrm>
+          <a:off x="0" y="0"/>
+          <a:ext cx="0" cy="0"/>
+          <a:chOff x="0" y="0"/>
+          <a:chExt cx="0" cy="0"/>
+        </a:xfrm>
+      </p:grpSpPr>
+      <p:sp>
+        <p:nvSpPr>
+          <p:cNvPr id="2" name="Title 1"/>
+          <p:cNvSpPr>
+            <a:spLocks noGrp="1"/>
+          </p:cNvSpPr>
+          <p:nvPr>
+            <p:ph type="title"/>
+          </p:nvPr>
+        </p:nvSpPr>
+        <p:spPr/>
+        <p:txBody>
+          <a:bodyPr/>
+          <a:lstStyle/>
+          <a:p>
+            <a:endParaRPr lang="en-US"/>
+          </a:p>
+        </p:txBody>
+      </p:sp>
+      <p:graphicFrame>
+        <p:nvGraphicFramePr>
+          <p:cNvPr id="4" name="Content Placeholder 3"/>
+          <p:cNvGraphicFramePr>
+            <a:graphicFrameLocks noGrp="1"/>
+          </p:cNvGraphicFramePr>
+          <p:nvPr>
+            <p:ph idx="1"/>
+            <p:extLst>
+              <p:ext uri="{D42A27DB-BD31-4B8C-83A1-F6EECF244321}">
+                <p14:modId xmlns:p14="http://schemas.microsoft.com/office/powerpoint/2010/main" xmlns="" val="2177100673"/>
+              </p:ext>
+            </p:extLst>
+          </p:nvPr>
+        </p:nvGraphicFramePr>
+        <p:xfrm>
+          <a:off x="467544" y="692697"/>
+          <a:ext cx="5040560" cy="2016223"/>
+        </p:xfrm>
+        <a:graphic>
+          <a:graphicData uri="http://schemas.openxmlformats.org/drawingml/2006/diagram">
+            <dgm:relIds xmlns:dgm="http://schemas.openxmlformats.org/drawingml/2006/diagram" xmlns:r="http://schemas.openxmlformats.org/officeDocument/2006/relationships" r:dm="rId3" r:lo="rId4" r:qs="rId5" r:cs="rId6"/>
+          </a:graphicData>
+        </a:graphic>
+      </p:graphicFrame>
+      <p:graphicFrame>
+        <p:nvGraphicFramePr>
+          <p:cNvPr id="7" name="Content Placeholder 3"/>
+          <p:cNvGraphicFramePr>
+            <a:graphicFrameLocks/>
+          </p:cNvGraphicFramePr>
+          <p:nvPr>
+            <p:extLst>
+              <p:ext uri="{D42A27DB-BD31-4B8C-83A1-F6EECF244321}">
+                <p14:modId xmlns:p14="http://schemas.microsoft.com/office/powerpoint/2010/main" xmlns="" val="3880500600"/>
+              </p:ext>
+            </p:extLst>
+          </p:nvPr>
+        </p:nvGraphicFramePr>
+        <p:xfrm>
+          <a:off x="3419872" y="2924944"/>
+          <a:ext cx="5040560" cy="2016223"/>
+        </p:xfrm>
+        <a:graphic>
+          <a:graphicData uri="http://schemas.openxmlformats.org/drawingml/2006/diagram">
+            <dgm:relIds xmlns:dgm="http://schemas.openxmlformats.org/drawingml/2006/diagram" xmlns:r="http://schemas.openxmlformats.org/officeDocument/2006/relationships" r:dm="rId8" r:lo="rId9" r:qs="rId10" r:cs="rId11"/>
+          </a:graphicData>
+        </a:graphic>
+      </p:graphicFrame>
+      <p:sp>
+        <p:nvSpPr>
+          <p:cNvPr id="5" name="Down Arrow 4"/>
+          <p:cNvSpPr/>
+          <p:nvPr/>
+        </p:nvSpPr>
+        <p:spPr>
+          <a:xfrm>
+            <a:off x="4211960" y="2420888"/>
+            <a:ext cx="648072" cy="792088"/>
+          </a:xfrm>
+          <a:prstGeom prst="downArrow">
+            <a:avLst/>
+          </a:prstGeom>
+          <a:solidFill>
+            <a:schemeClr val="tx2">
+              <a:lumMod val="75000"/>
+            </a:schemeClr>
+          </a:solidFill>
+          <a:ln>
+            <a:noFill/>
+          </a:ln>
+        </p:spPr>
+        <p:style>
+          <a:lnRef idx="2">
+            <a:schemeClr val="accent1">
+              <a:shade val="50000"/>
+            </a:schemeClr>
+          </a:lnRef>
+          <a:fillRef idx="1">
+            <a:schemeClr val="accent1"/>
+          </a:fillRef>
+          <a:effectRef idx="0">
+            <a:schemeClr val="accent1"/>
+          </a:effectRef>
+          <a:fontRef idx="minor">
+            <a:schemeClr val="lt1"/>
+          </a:fontRef>
+        </p:style>
+        <p:txBody>
+          <a:bodyPr rtlCol="0" anchor="ctr"/>
+          <a:lstStyle/>
+          <a:p>
+            <a:pPr algn="ctr"/>
+            <a:endParaRPr lang="en-US"/>
+          </a:p>
+        </p:txBody>
+      </p:sp>
+      <p:sp>
+        <p:nvSpPr>
+          <p:cNvPr id="8" name="TextBox 7"/>
+          <p:cNvSpPr txBox="1"/>
+          <p:nvPr/>
+        </p:nvSpPr>
+        <p:spPr>
+          <a:xfrm>
+            <a:off x="5796136" y="2420888"/>
+            <a:ext cx="2664296" cy="338554"/>
+          </a:xfrm>
+          <a:prstGeom prst="rect">
+            <a:avLst/>
+          </a:prstGeom>
+          <a:noFill/>
+        </p:spPr>
+        <p:txBody>
+          <a:bodyPr wrap="square" rtlCol="0">
+            <a:spAutoFit/>
+          </a:bodyPr>
+          <a:lstStyle/>
+          <a:p>
+            <a:r>
+              <a:rPr lang="en-US" sz="1600" i="1" dirty="0" smtClean="0">
+                <a:latin typeface="Times New Roman" pitchFamily="18" charset="0"/>
+                <a:cs typeface="Times New Roman" pitchFamily="18" charset="0"/>
+              </a:rPr>
+              <a:t>STAGE 1: RTL SIMULATION</a:t>
+            </a:r>
+            <a:endParaRPr lang="en-US" sz="1600" i="1" dirty="0">
+              <a:latin typeface="Times New Roman" pitchFamily="18" charset="0"/>
+              <a:cs typeface="Times New Roman" pitchFamily="18" charset="0"/>
+            </a:endParaRPr>
+          </a:p>
+        </p:txBody>
+      </p:sp>
+      <p:sp>
+        <p:nvSpPr>
+          <p:cNvPr id="10" name="TextBox 9"/>
+          <p:cNvSpPr txBox="1"/>
+          <p:nvPr/>
+        </p:nvSpPr>
+        <p:spPr>
+          <a:xfrm>
+            <a:off x="5508104" y="5085184"/>
+            <a:ext cx="3104728" cy="338554"/>
+          </a:xfrm>
+          <a:prstGeom prst="rect">
+            <a:avLst/>
+          </a:prstGeom>
+          <a:noFill/>
+        </p:spPr>
+        <p:txBody>
+          <a:bodyPr wrap="square" rtlCol="0">
+            <a:spAutoFit/>
+          </a:bodyPr>
+          <a:lstStyle/>
+          <a:p>
+            <a:r>
+              <a:rPr lang="en-US" sz="1600" i="1" dirty="0" smtClean="0">
+                <a:latin typeface="Times New Roman" pitchFamily="18" charset="0"/>
+                <a:cs typeface="Times New Roman" pitchFamily="18" charset="0"/>
+              </a:rPr>
+              <a:t>STAGE 2: NETLIST SIMULATION</a:t>
+            </a:r>
+            <a:endParaRPr lang="en-US" sz="1600" i="1" dirty="0">
+              <a:latin typeface="Times New Roman" pitchFamily="18" charset="0"/>
+              <a:cs typeface="Times New Roman" pitchFamily="18" charset="0"/>
+            </a:endParaRPr>
+          </a:p>
+        </p:txBody>
+      </p:sp>
+    </p:spTree>
+    <p:extLst>
+      <p:ext uri="{BB962C8B-B14F-4D97-AF65-F5344CB8AC3E}">
+        <p14:creationId xmlns:p14="http://schemas.microsoft.com/office/powerpoint/2010/main" xmlns="" val="686433211"/>
+      </p:ext>
+    </p:extLst>
+  </p:cSld>
+  <p:clrMapOvr>
+    <a:masterClrMapping/>
+  </p:clrMapOvr>
+  <p:timing>
+    <p:tnLst>
+      <p:par>
+        <p:cTn id="1" dur="indefinite" restart="never" nodeType="tmRoot"/>
+      </p:par>
+    </p:tnLst>
+  </p:timing>
+</p:sld>
+</file>
+
+<file path=ppt/slides/slide11.xml><?xml version="1.0" encoding="utf-8"?>
 <p:sld xmlns:a="http://schemas.openxmlformats.org/drawingml/2006/main" xmlns:r="http://schemas.openxmlformats.org/officeDocument/2006/relationships" xmlns:p="http://schemas.openxmlformats.org/presentationml/2006/main">
   <p:cSld>
     <p:spTree>
@@ -40932,7 +41219,7 @@
 </p:sld>
 </file>
 
-<file path=ppt/slides/slide11.xml><?xml version="1.0" encoding="utf-8"?>
+<file path=ppt/slides/slide12.xml><?xml version="1.0" encoding="utf-8"?>
 <p:sld xmlns:a="http://schemas.openxmlformats.org/drawingml/2006/main" xmlns:r="http://schemas.openxmlformats.org/officeDocument/2006/relationships" xmlns:p="http://schemas.openxmlformats.org/presentationml/2006/main">
   <p:cSld>
     <p:spTree>
@@ -41147,7 +41434,7 @@
 </p:sld>
 </file>
 
-<file path=ppt/slides/slide12.xml><?xml version="1.0" encoding="utf-8"?>
+<file path=ppt/slides/slide13.xml><?xml version="1.0" encoding="utf-8"?>
 <p:sld xmlns:a="http://schemas.openxmlformats.org/drawingml/2006/main" xmlns:r="http://schemas.openxmlformats.org/officeDocument/2006/relationships" xmlns:p="http://schemas.openxmlformats.org/presentationml/2006/main">
   <p:cSld>
     <p:spTree>
@@ -41166,7 +41453,7 @@
       </p:grpSpPr>
       <p:sp>
         <p:nvSpPr>
-          <p:cNvPr id="4" name="Title 3"/>
+          <p:cNvPr id="2" name="Title 1"/>
           <p:cNvSpPr>
             <a:spLocks noGrp="1"/>
           </p:cNvSpPr>
@@ -41179,11 +41466,7 @@
           <a:bodyPr/>
           <a:lstStyle/>
           <a:p>
-            <a:r>
-              <a:rPr lang="en-US" dirty="0" smtClean="0"/>
-              <a:t>Fsdb.tif</a:t>
-            </a:r>
-            <a:endParaRPr lang="en-US" dirty="0"/>
+            <a:endParaRPr lang="en-US"/>
           </a:p>
         </p:txBody>
       </p:sp>
@@ -41194,7 +41477,7 @@
             <a:graphicFrameLocks noGrp="1"/>
           </p:cNvGraphicFramePr>
           <p:nvPr>
-            <p:ph idx="4294967295"/>
+            <p:ph idx="1"/>
             <p:extLst>
               <p:ext uri="{D42A27DB-BD31-4B8C-83A1-F6EECF244321}">
                 <p14:modId xmlns:p14="http://schemas.microsoft.com/office/powerpoint/2010/main" xmlns="" val="3607291589"/>
@@ -41203,8 +41486,8 @@
           </p:nvPr>
         </p:nvGraphicFramePr>
         <p:xfrm>
-          <a:off x="539552" y="2060848"/>
-          <a:ext cx="8229600" cy="2879725"/>
+          <a:off x="457200" y="1600200"/>
+          <a:ext cx="8229600" cy="4525963"/>
         </p:xfrm>
         <a:graphic>
           <a:graphicData uri="http://schemas.openxmlformats.org/drawingml/2006/diagram">
@@ -41232,7 +41515,7 @@
 </p:sld>
 </file>
 
-<file path=ppt/slides/slide13.xml><?xml version="1.0" encoding="utf-8"?>
+<file path=ppt/slides/slide14.xml><?xml version="1.0" encoding="utf-8"?>
 <p:sld xmlns:a="http://schemas.openxmlformats.org/drawingml/2006/main" xmlns:r="http://schemas.openxmlformats.org/officeDocument/2006/relationships" xmlns:p="http://schemas.openxmlformats.org/presentationml/2006/main">
   <p:cSld>
     <p:spTree>
@@ -41249,6 +41532,44 @@
           <a:chExt cx="0" cy="0"/>
         </a:xfrm>
       </p:grpSpPr>
+      <p:sp>
+        <p:nvSpPr>
+          <p:cNvPr id="2" name="Title 1"/>
+          <p:cNvSpPr>
+            <a:spLocks noGrp="1"/>
+          </p:cNvSpPr>
+          <p:nvPr>
+            <p:ph type="title"/>
+          </p:nvPr>
+        </p:nvSpPr>
+        <p:spPr/>
+        <p:txBody>
+          <a:bodyPr/>
+          <a:lstStyle/>
+          <a:p>
+            <a:endParaRPr lang="en-IN" dirty="0"/>
+          </a:p>
+        </p:txBody>
+      </p:sp>
+      <p:sp>
+        <p:nvSpPr>
+          <p:cNvPr id="3" name="Content Placeholder 2"/>
+          <p:cNvSpPr>
+            <a:spLocks noGrp="1"/>
+          </p:cNvSpPr>
+          <p:nvPr>
+            <p:ph idx="1"/>
+          </p:nvPr>
+        </p:nvSpPr>
+        <p:spPr/>
+        <p:txBody>
+          <a:bodyPr/>
+          <a:lstStyle/>
+          <a:p>
+            <a:endParaRPr lang="en-IN" dirty="0"/>
+          </a:p>
+        </p:txBody>
+      </p:sp>
       <p:sp>
         <p:nvSpPr>
           <p:cNvPr id="4" name="Flowchart: Document 3"/>
@@ -41746,7 +42067,7 @@
 </p:sld>
 </file>
 
-<file path=ppt/slides/slide14.xml><?xml version="1.0" encoding="utf-8"?>
+<file path=ppt/slides/slide15.xml><?xml version="1.0" encoding="utf-8"?>
 <p:sld xmlns:a="http://schemas.openxmlformats.org/drawingml/2006/main" xmlns:r="http://schemas.openxmlformats.org/officeDocument/2006/relationships" xmlns:p="http://schemas.openxmlformats.org/presentationml/2006/main">
   <p:cSld>
     <p:spTree>
@@ -41763,6 +42084,44 @@
           <a:chExt cx="0" cy="0"/>
         </a:xfrm>
       </p:grpSpPr>
+      <p:sp>
+        <p:nvSpPr>
+          <p:cNvPr id="2" name="Title 1"/>
+          <p:cNvSpPr>
+            <a:spLocks noGrp="1"/>
+          </p:cNvSpPr>
+          <p:nvPr>
+            <p:ph type="title"/>
+          </p:nvPr>
+        </p:nvSpPr>
+        <p:spPr/>
+        <p:txBody>
+          <a:bodyPr/>
+          <a:lstStyle/>
+          <a:p>
+            <a:endParaRPr lang="en-IN" dirty="0"/>
+          </a:p>
+        </p:txBody>
+      </p:sp>
+      <p:sp>
+        <p:nvSpPr>
+          <p:cNvPr id="3" name="Content Placeholder 2"/>
+          <p:cNvSpPr>
+            <a:spLocks noGrp="1"/>
+          </p:cNvSpPr>
+          <p:nvPr>
+            <p:ph idx="1"/>
+          </p:nvPr>
+        </p:nvSpPr>
+        <p:spPr/>
+        <p:txBody>
+          <a:bodyPr/>
+          <a:lstStyle/>
+          <a:p>
+            <a:endParaRPr lang="en-IN" dirty="0"/>
+          </a:p>
+        </p:txBody>
+      </p:sp>
       <p:sp>
         <p:nvSpPr>
           <p:cNvPr id="4" name="Rounded Rectangle 3"/>
@@ -42236,7 +42595,7 @@
 </p:sld>
 </file>
 
-<file path=ppt/slides/slide15.xml><?xml version="1.0" encoding="utf-8"?>
+<file path=ppt/slides/slide16.xml><?xml version="1.0" encoding="utf-8"?>
 <p:sld xmlns:a="http://schemas.openxmlformats.org/drawingml/2006/main" xmlns:r="http://schemas.openxmlformats.org/officeDocument/2006/relationships" xmlns:p="http://schemas.openxmlformats.org/presentationml/2006/main">
   <p:cSld>
     <p:spTree>
@@ -43384,7 +43743,7 @@
 </p:sld>
 </file>
 
-<file path=ppt/slides/slide16.xml><?xml version="1.0" encoding="utf-8"?>
+<file path=ppt/slides/slide17.xml><?xml version="1.0" encoding="utf-8"?>
 <p:sld xmlns:a="http://schemas.openxmlformats.org/drawingml/2006/main" xmlns:r="http://schemas.openxmlformats.org/officeDocument/2006/relationships" xmlns:p="http://schemas.openxmlformats.org/presentationml/2006/main">
   <p:cSld>
     <p:spTree>
@@ -43401,6 +43760,44 @@
           <a:chExt cx="0" cy="0"/>
         </a:xfrm>
       </p:grpSpPr>
+      <p:sp>
+        <p:nvSpPr>
+          <p:cNvPr id="2" name="Title 1"/>
+          <p:cNvSpPr>
+            <a:spLocks noGrp="1"/>
+          </p:cNvSpPr>
+          <p:nvPr>
+            <p:ph type="title"/>
+          </p:nvPr>
+        </p:nvSpPr>
+        <p:spPr/>
+        <p:txBody>
+          <a:bodyPr/>
+          <a:lstStyle/>
+          <a:p>
+            <a:endParaRPr lang="en-US" dirty="0"/>
+          </a:p>
+        </p:txBody>
+      </p:sp>
+      <p:sp>
+        <p:nvSpPr>
+          <p:cNvPr id="3" name="Content Placeholder 2"/>
+          <p:cNvSpPr>
+            <a:spLocks noGrp="1"/>
+          </p:cNvSpPr>
+          <p:nvPr>
+            <p:ph idx="1"/>
+          </p:nvPr>
+        </p:nvSpPr>
+        <p:spPr/>
+        <p:txBody>
+          <a:bodyPr/>
+          <a:lstStyle/>
+          <a:p>
+            <a:endParaRPr lang="en-US" dirty="0"/>
+          </a:p>
+        </p:txBody>
+      </p:sp>
       <p:grpSp>
         <p:nvGrpSpPr>
           <p:cNvPr id="4" name="Group 3"/>
@@ -44387,6 +44784,141 @@
           <a:chExt cx="0" cy="0"/>
         </a:xfrm>
       </p:grpSpPr>
+      <p:sp>
+        <p:nvSpPr>
+          <p:cNvPr id="2" name="Title 1"/>
+          <p:cNvSpPr>
+            <a:spLocks noGrp="1"/>
+          </p:cNvSpPr>
+          <p:nvPr>
+            <p:ph type="title"/>
+          </p:nvPr>
+        </p:nvSpPr>
+        <p:spPr/>
+        <p:txBody>
+          <a:bodyPr/>
+          <a:lstStyle/>
+          <a:p>
+            <a:endParaRPr lang="en-US"/>
+          </a:p>
+        </p:txBody>
+      </p:sp>
+      <p:graphicFrame>
+        <p:nvGraphicFramePr>
+          <p:cNvPr id="4" name="Content Placeholder 3"/>
+          <p:cNvGraphicFramePr>
+            <a:graphicFrameLocks noGrp="1"/>
+          </p:cNvGraphicFramePr>
+          <p:nvPr>
+            <p:ph idx="1"/>
+            <p:extLst>
+              <p:ext uri="{D42A27DB-BD31-4B8C-83A1-F6EECF244321}">
+                <p14:modId xmlns:p14="http://schemas.microsoft.com/office/powerpoint/2010/main" xmlns="" val="812163987"/>
+              </p:ext>
+            </p:extLst>
+          </p:nvPr>
+        </p:nvGraphicFramePr>
+        <p:xfrm>
+          <a:off x="533400" y="2362201"/>
+          <a:ext cx="8077200" cy="2362199"/>
+        </p:xfrm>
+        <a:graphic>
+          <a:graphicData uri="http://schemas.openxmlformats.org/drawingml/2006/diagram">
+            <dgm:relIds xmlns:dgm="http://schemas.openxmlformats.org/drawingml/2006/diagram" xmlns:r="http://schemas.openxmlformats.org/officeDocument/2006/relationships" r:dm="rId3" r:lo="rId4" r:qs="rId5" r:cs="rId6"/>
+          </a:graphicData>
+        </a:graphic>
+      </p:graphicFrame>
+      <p:sp>
+        <p:nvSpPr>
+          <p:cNvPr id="6" name="TextBox 5"/>
+          <p:cNvSpPr txBox="1"/>
+          <p:nvPr/>
+        </p:nvSpPr>
+        <p:spPr>
+          <a:xfrm>
+            <a:off x="3352800" y="2514600"/>
+            <a:ext cx="2438400" cy="369332"/>
+          </a:xfrm>
+          <a:prstGeom prst="rect">
+            <a:avLst/>
+          </a:prstGeom>
+          <a:noFill/>
+        </p:spPr>
+        <p:txBody>
+          <a:bodyPr wrap="square" rtlCol="0">
+            <a:spAutoFit/>
+          </a:bodyPr>
+          <a:lstStyle/>
+          <a:p>
+            <a:pPr algn="ctr"/>
+            <a:r>
+              <a:rPr lang="en-US" cap="all" dirty="0" smtClean="0">
+                <a:latin typeface="Times New Roman" pitchFamily="18" charset="0"/>
+              </a:rPr>
+              <a:t>SELF TEST</a:t>
+            </a:r>
+            <a:endParaRPr lang="en-US" cap="all" dirty="0">
+              <a:latin typeface="Times New Roman" pitchFamily="18" charset="0"/>
+            </a:endParaRPr>
+          </a:p>
+        </p:txBody>
+      </p:sp>
+    </p:spTree>
+    <p:extLst>
+      <p:ext uri="{BB962C8B-B14F-4D97-AF65-F5344CB8AC3E}">
+        <p14:creationId xmlns:p14="http://schemas.microsoft.com/office/powerpoint/2010/main" xmlns="" val="3929008511"/>
+      </p:ext>
+    </p:extLst>
+  </p:cSld>
+  <p:clrMapOvr>
+    <a:masterClrMapping/>
+  </p:clrMapOvr>
+  <p:timing>
+    <p:tnLst>
+      <p:par>
+        <p:cTn id="1" dur="indefinite" restart="never" nodeType="tmRoot"/>
+      </p:par>
+    </p:tnLst>
+  </p:timing>
+</p:sld>
+</file>
+
+<file path=ppt/slides/slide3.xml><?xml version="1.0" encoding="utf-8"?>
+<p:sld xmlns:a="http://schemas.openxmlformats.org/drawingml/2006/main" xmlns:r="http://schemas.openxmlformats.org/officeDocument/2006/relationships" xmlns:p="http://schemas.openxmlformats.org/presentationml/2006/main">
+  <p:cSld>
+    <p:spTree>
+      <p:nvGrpSpPr>
+        <p:cNvPr id="1" name=""/>
+        <p:cNvGrpSpPr/>
+        <p:nvPr/>
+      </p:nvGrpSpPr>
+      <p:grpSpPr>
+        <a:xfrm>
+          <a:off x="0" y="0"/>
+          <a:ext cx="0" cy="0"/>
+          <a:chOff x="0" y="0"/>
+          <a:chExt cx="0" cy="0"/>
+        </a:xfrm>
+      </p:grpSpPr>
+      <p:sp>
+        <p:nvSpPr>
+          <p:cNvPr id="2" name="Title 1"/>
+          <p:cNvSpPr>
+            <a:spLocks noGrp="1"/>
+          </p:cNvSpPr>
+          <p:nvPr>
+            <p:ph type="title"/>
+          </p:nvPr>
+        </p:nvSpPr>
+        <p:spPr/>
+        <p:txBody>
+          <a:bodyPr/>
+          <a:lstStyle/>
+          <a:p>
+            <a:endParaRPr lang="en-IN"/>
+          </a:p>
+        </p:txBody>
+      </p:sp>
       <p:graphicFrame>
         <p:nvGraphicFramePr>
           <p:cNvPr id="4" name="Content Placeholder 3"/>
@@ -44768,7 +45300,7 @@
 </p:sld>
 </file>
 
-<file path=ppt/slides/slide3.xml><?xml version="1.0" encoding="utf-8"?>
+<file path=ppt/slides/slide4.xml><?xml version="1.0" encoding="utf-8"?>
 <p:sld xmlns:a="http://schemas.openxmlformats.org/drawingml/2006/main" xmlns:r="http://schemas.openxmlformats.org/officeDocument/2006/relationships" xmlns:p="http://schemas.openxmlformats.org/presentationml/2006/main">
   <p:cSld>
     <p:spTree>
@@ -44849,7 +45381,7 @@
 </p:sld>
 </file>
 
-<file path=ppt/slides/slide4.xml><?xml version="1.0" encoding="utf-8"?>
+<file path=ppt/slides/slide5.xml><?xml version="1.0" encoding="utf-8"?>
 <p:sld xmlns:a="http://schemas.openxmlformats.org/drawingml/2006/main" xmlns:r="http://schemas.openxmlformats.org/officeDocument/2006/relationships" xmlns:p="http://schemas.openxmlformats.org/presentationml/2006/main">
   <p:cSld>
     <p:spTree>
@@ -44868,7 +45400,7 @@
       </p:grpSpPr>
       <p:sp>
         <p:nvSpPr>
-          <p:cNvPr id="9" name="Title 8"/>
+          <p:cNvPr id="2" name="Title 1"/>
           <p:cNvSpPr>
             <a:spLocks noGrp="1"/>
           </p:cNvSpPr>
@@ -44876,7 +45408,12 @@
             <p:ph type="title"/>
           </p:nvPr>
         </p:nvSpPr>
-        <p:spPr/>
+        <p:spPr>
+          <a:xfrm>
+            <a:off x="533400" y="381000"/>
+            <a:ext cx="8305800" cy="990600"/>
+          </a:xfrm>
+        </p:spPr>
         <p:txBody>
           <a:bodyPr/>
           <a:lstStyle/>
@@ -44892,7 +45429,7 @@
             <a:graphicFrameLocks noGrp="1"/>
           </p:cNvGraphicFramePr>
           <p:nvPr>
-            <p:ph idx="4294967295"/>
+            <p:ph idx="1"/>
             <p:extLst>
               <p:ext uri="{D42A27DB-BD31-4B8C-83A1-F6EECF244321}">
                 <p14:modId xmlns:p14="http://schemas.microsoft.com/office/powerpoint/2010/main" xmlns="" val="2475547916"/>
@@ -44901,8 +45438,8 @@
           </p:nvPr>
         </p:nvGraphicFramePr>
         <p:xfrm>
-          <a:off x="0" y="2971800"/>
-          <a:ext cx="3352800" cy="1066800"/>
+          <a:off x="2895600" y="2971800"/>
+          <a:ext cx="3352800" cy="1066799"/>
         </p:xfrm>
         <a:graphic>
           <a:graphicData uri="http://schemas.openxmlformats.org/drawingml/2006/diagram">
@@ -45085,7 +45622,7 @@
 </p:sld>
 </file>
 
-<file path=ppt/slides/slide5.xml><?xml version="1.0" encoding="utf-8"?>
+<file path=ppt/slides/slide6.xml><?xml version="1.0" encoding="utf-8"?>
 <p:sld xmlns:a="http://schemas.openxmlformats.org/drawingml/2006/main" xmlns:r="http://schemas.openxmlformats.org/officeDocument/2006/relationships" xmlns:p="http://schemas.openxmlformats.org/presentationml/2006/main">
   <p:cSld>
     <p:spTree>
@@ -47237,7 +47774,7 @@
 </p:sld>
 </file>
 
-<file path=ppt/slides/slide6.xml><?xml version="1.0" encoding="utf-8"?>
+<file path=ppt/slides/slide7.xml><?xml version="1.0" encoding="utf-8"?>
 <p:sld xmlns:a="http://schemas.openxmlformats.org/drawingml/2006/main" xmlns:r="http://schemas.openxmlformats.org/officeDocument/2006/relationships" xmlns:p="http://schemas.openxmlformats.org/presentationml/2006/main">
   <p:cSld>
     <p:spTree>
@@ -48467,7 +49004,7 @@
 </p:sld>
 </file>
 
-<file path=ppt/slides/slide7.xml><?xml version="1.0" encoding="utf-8"?>
+<file path=ppt/slides/slide8.xml><?xml version="1.0" encoding="utf-8"?>
 <p:sld xmlns:a="http://schemas.openxmlformats.org/drawingml/2006/main" xmlns:r="http://schemas.openxmlformats.org/officeDocument/2006/relationships" xmlns:p="http://schemas.openxmlformats.org/presentationml/2006/main">
   <p:cSld>
     <p:spTree>
@@ -48486,12 +49023,31 @@
       </p:grpSpPr>
       <p:sp>
         <p:nvSpPr>
-          <p:cNvPr id="4" name="Title 3"/>
+          <p:cNvPr id="2" name="Title 1"/>
           <p:cNvSpPr>
             <a:spLocks noGrp="1"/>
           </p:cNvSpPr>
           <p:nvPr>
             <p:ph type="title"/>
+          </p:nvPr>
+        </p:nvSpPr>
+        <p:spPr/>
+        <p:txBody>
+          <a:bodyPr/>
+          <a:lstStyle/>
+          <a:p>
+            <a:endParaRPr lang="en-US"/>
+          </a:p>
+        </p:txBody>
+      </p:sp>
+      <p:sp>
+        <p:nvSpPr>
+          <p:cNvPr id="3" name="Content Placeholder 2"/>
+          <p:cNvSpPr>
+            <a:spLocks noGrp="1"/>
+          </p:cNvSpPr>
+          <p:nvPr>
+            <p:ph idx="1"/>
           </p:nvPr>
         </p:nvSpPr>
         <p:spPr/>
@@ -48516,7 +49072,7 @@
 </p:sld>
 </file>
 
-<file path=ppt/slides/slide8.xml><?xml version="1.0" encoding="utf-8"?>
+<file path=ppt/slides/slide9.xml><?xml version="1.0" encoding="utf-8"?>
 <p:sld xmlns:a="http://schemas.openxmlformats.org/drawingml/2006/main" xmlns:r="http://schemas.openxmlformats.org/officeDocument/2006/relationships" xmlns:p="http://schemas.openxmlformats.org/presentationml/2006/main">
   <p:cSld>
     <p:spTree>
@@ -48533,6 +49089,52 @@
           <a:chExt cx="0" cy="0"/>
         </a:xfrm>
       </p:grpSpPr>
+      <p:sp>
+        <p:nvSpPr>
+          <p:cNvPr id="2" name="Title 1"/>
+          <p:cNvSpPr>
+            <a:spLocks noGrp="1"/>
+          </p:cNvSpPr>
+          <p:nvPr>
+            <p:ph type="title"/>
+          </p:nvPr>
+        </p:nvSpPr>
+        <p:spPr/>
+        <p:txBody>
+          <a:bodyPr>
+            <a:normAutofit/>
+          </a:bodyPr>
+          <a:lstStyle/>
+          <a:p>
+            <a:endParaRPr lang="en-US" sz="1800" dirty="0">
+              <a:solidFill>
+                <a:schemeClr val="bg1"/>
+              </a:solidFill>
+              <a:latin typeface="Times New Roman" pitchFamily="18" charset="0"/>
+              <a:cs typeface="Times New Roman" pitchFamily="18" charset="0"/>
+            </a:endParaRPr>
+          </a:p>
+        </p:txBody>
+      </p:sp>
+      <p:sp>
+        <p:nvSpPr>
+          <p:cNvPr id="5" name="Content Placeholder 4"/>
+          <p:cNvSpPr>
+            <a:spLocks noGrp="1"/>
+          </p:cNvSpPr>
+          <p:nvPr>
+            <p:ph idx="1"/>
+          </p:nvPr>
+        </p:nvSpPr>
+        <p:spPr/>
+        <p:txBody>
+          <a:bodyPr/>
+          <a:lstStyle/>
+          <a:p>
+            <a:endParaRPr lang="en-US" dirty="0"/>
+          </a:p>
+        </p:txBody>
+      </p:sp>
       <p:sp>
         <p:nvSpPr>
           <p:cNvPr id="6" name="Rounded Rectangle 5"/>
@@ -49147,231 +49749,6 @@
     <p:extLst>
       <p:ext uri="{BB962C8B-B14F-4D97-AF65-F5344CB8AC3E}">
         <p14:creationId xmlns:p14="http://schemas.microsoft.com/office/powerpoint/2010/main" xmlns="" val="2601577110"/>
-      </p:ext>
-    </p:extLst>
-  </p:cSld>
-  <p:clrMapOvr>
-    <a:masterClrMapping/>
-  </p:clrMapOvr>
-  <p:timing>
-    <p:tnLst>
-      <p:par>
-        <p:cTn id="1" dur="indefinite" restart="never" nodeType="tmRoot"/>
-      </p:par>
-    </p:tnLst>
-  </p:timing>
-</p:sld>
-</file>
-
-<file path=ppt/slides/slide9.xml><?xml version="1.0" encoding="utf-8"?>
-<p:sld xmlns:a="http://schemas.openxmlformats.org/drawingml/2006/main" xmlns:r="http://schemas.openxmlformats.org/officeDocument/2006/relationships" xmlns:p="http://schemas.openxmlformats.org/presentationml/2006/main">
-  <p:cSld>
-    <p:spTree>
-      <p:nvGrpSpPr>
-        <p:cNvPr id="1" name=""/>
-        <p:cNvGrpSpPr/>
-        <p:nvPr/>
-      </p:nvGrpSpPr>
-      <p:grpSpPr>
-        <a:xfrm>
-          <a:off x="0" y="0"/>
-          <a:ext cx="0" cy="0"/>
-          <a:chOff x="0" y="0"/>
-          <a:chExt cx="0" cy="0"/>
-        </a:xfrm>
-      </p:grpSpPr>
-      <p:sp>
-        <p:nvSpPr>
-          <p:cNvPr id="2" name="Title 1"/>
-          <p:cNvSpPr>
-            <a:spLocks noGrp="1"/>
-          </p:cNvSpPr>
-          <p:nvPr>
-            <p:ph type="title"/>
-          </p:nvPr>
-        </p:nvSpPr>
-        <p:spPr/>
-        <p:txBody>
-          <a:bodyPr/>
-          <a:lstStyle/>
-          <a:p>
-            <a:endParaRPr lang="en-US"/>
-          </a:p>
-        </p:txBody>
-      </p:sp>
-      <p:graphicFrame>
-        <p:nvGraphicFramePr>
-          <p:cNvPr id="4" name="Content Placeholder 3"/>
-          <p:cNvGraphicFramePr>
-            <a:graphicFrameLocks noGrp="1"/>
-          </p:cNvGraphicFramePr>
-          <p:nvPr>
-            <p:ph idx="1"/>
-            <p:extLst>
-              <p:ext uri="{D42A27DB-BD31-4B8C-83A1-F6EECF244321}">
-                <p14:modId xmlns:p14="http://schemas.microsoft.com/office/powerpoint/2010/main" xmlns="" val="2177100673"/>
-              </p:ext>
-            </p:extLst>
-          </p:nvPr>
-        </p:nvGraphicFramePr>
-        <p:xfrm>
-          <a:off x="467544" y="692697"/>
-          <a:ext cx="5040560" cy="2016223"/>
-        </p:xfrm>
-        <a:graphic>
-          <a:graphicData uri="http://schemas.openxmlformats.org/drawingml/2006/diagram">
-            <dgm:relIds xmlns:dgm="http://schemas.openxmlformats.org/drawingml/2006/diagram" xmlns:r="http://schemas.openxmlformats.org/officeDocument/2006/relationships" r:dm="rId3" r:lo="rId4" r:qs="rId5" r:cs="rId6"/>
-          </a:graphicData>
-        </a:graphic>
-      </p:graphicFrame>
-      <p:graphicFrame>
-        <p:nvGraphicFramePr>
-          <p:cNvPr id="7" name="Content Placeholder 3"/>
-          <p:cNvGraphicFramePr>
-            <a:graphicFrameLocks/>
-          </p:cNvGraphicFramePr>
-          <p:nvPr>
-            <p:extLst>
-              <p:ext uri="{D42A27DB-BD31-4B8C-83A1-F6EECF244321}">
-                <p14:modId xmlns:p14="http://schemas.microsoft.com/office/powerpoint/2010/main" xmlns="" val="3880500600"/>
-              </p:ext>
-            </p:extLst>
-          </p:nvPr>
-        </p:nvGraphicFramePr>
-        <p:xfrm>
-          <a:off x="3419872" y="2924944"/>
-          <a:ext cx="5040560" cy="2016223"/>
-        </p:xfrm>
-        <a:graphic>
-          <a:graphicData uri="http://schemas.openxmlformats.org/drawingml/2006/diagram">
-            <dgm:relIds xmlns:dgm="http://schemas.openxmlformats.org/drawingml/2006/diagram" xmlns:r="http://schemas.openxmlformats.org/officeDocument/2006/relationships" r:dm="rId8" r:lo="rId9" r:qs="rId10" r:cs="rId11"/>
-          </a:graphicData>
-        </a:graphic>
-      </p:graphicFrame>
-      <p:sp>
-        <p:nvSpPr>
-          <p:cNvPr id="5" name="Down Arrow 4"/>
-          <p:cNvSpPr/>
-          <p:nvPr/>
-        </p:nvSpPr>
-        <p:spPr>
-          <a:xfrm>
-            <a:off x="4211960" y="2420888"/>
-            <a:ext cx="648072" cy="792088"/>
-          </a:xfrm>
-          <a:prstGeom prst="downArrow">
-            <a:avLst/>
-          </a:prstGeom>
-          <a:solidFill>
-            <a:schemeClr val="tx2">
-              <a:lumMod val="75000"/>
-            </a:schemeClr>
-          </a:solidFill>
-          <a:ln>
-            <a:noFill/>
-          </a:ln>
-        </p:spPr>
-        <p:style>
-          <a:lnRef idx="2">
-            <a:schemeClr val="accent1">
-              <a:shade val="50000"/>
-            </a:schemeClr>
-          </a:lnRef>
-          <a:fillRef idx="1">
-            <a:schemeClr val="accent1"/>
-          </a:fillRef>
-          <a:effectRef idx="0">
-            <a:schemeClr val="accent1"/>
-          </a:effectRef>
-          <a:fontRef idx="minor">
-            <a:schemeClr val="lt1"/>
-          </a:fontRef>
-        </p:style>
-        <p:txBody>
-          <a:bodyPr rtlCol="0" anchor="ctr"/>
-          <a:lstStyle/>
-          <a:p>
-            <a:pPr algn="ctr"/>
-            <a:endParaRPr lang="en-US"/>
-          </a:p>
-        </p:txBody>
-      </p:sp>
-      <p:sp>
-        <p:nvSpPr>
-          <p:cNvPr id="8" name="TextBox 7"/>
-          <p:cNvSpPr txBox="1"/>
-          <p:nvPr/>
-        </p:nvSpPr>
-        <p:spPr>
-          <a:xfrm>
-            <a:off x="5796136" y="2420888"/>
-            <a:ext cx="2664296" cy="338554"/>
-          </a:xfrm>
-          <a:prstGeom prst="rect">
-            <a:avLst/>
-          </a:prstGeom>
-          <a:noFill/>
-        </p:spPr>
-        <p:txBody>
-          <a:bodyPr wrap="square" rtlCol="0">
-            <a:spAutoFit/>
-          </a:bodyPr>
-          <a:lstStyle/>
-          <a:p>
-            <a:r>
-              <a:rPr lang="en-US" sz="1600" i="1" dirty="0" smtClean="0">
-                <a:latin typeface="Times New Roman" pitchFamily="18" charset="0"/>
-                <a:cs typeface="Times New Roman" pitchFamily="18" charset="0"/>
-              </a:rPr>
-              <a:t>STAGE 1: RTL SIMULATION</a:t>
-            </a:r>
-            <a:endParaRPr lang="en-US" sz="1600" i="1" dirty="0">
-              <a:latin typeface="Times New Roman" pitchFamily="18" charset="0"/>
-              <a:cs typeface="Times New Roman" pitchFamily="18" charset="0"/>
-            </a:endParaRPr>
-          </a:p>
-        </p:txBody>
-      </p:sp>
-      <p:sp>
-        <p:nvSpPr>
-          <p:cNvPr id="10" name="TextBox 9"/>
-          <p:cNvSpPr txBox="1"/>
-          <p:nvPr/>
-        </p:nvSpPr>
-        <p:spPr>
-          <a:xfrm>
-            <a:off x="5508104" y="5085184"/>
-            <a:ext cx="3104728" cy="338554"/>
-          </a:xfrm>
-          <a:prstGeom prst="rect">
-            <a:avLst/>
-          </a:prstGeom>
-          <a:noFill/>
-        </p:spPr>
-        <p:txBody>
-          <a:bodyPr wrap="square" rtlCol="0">
-            <a:spAutoFit/>
-          </a:bodyPr>
-          <a:lstStyle/>
-          <a:p>
-            <a:r>
-              <a:rPr lang="en-US" sz="1600" i="1" dirty="0" smtClean="0">
-                <a:latin typeface="Times New Roman" pitchFamily="18" charset="0"/>
-                <a:cs typeface="Times New Roman" pitchFamily="18" charset="0"/>
-              </a:rPr>
-              <a:t>STAGE 2: NETLIST SIMULATION</a:t>
-            </a:r>
-            <a:endParaRPr lang="en-US" sz="1600" i="1" dirty="0">
-              <a:latin typeface="Times New Roman" pitchFamily="18" charset="0"/>
-              <a:cs typeface="Times New Roman" pitchFamily="18" charset="0"/>
-            </a:endParaRPr>
-          </a:p>
-        </p:txBody>
-      </p:sp>
-    </p:spTree>
-    <p:extLst>
-      <p:ext uri="{BB962C8B-B14F-4D97-AF65-F5344CB8AC3E}">
-        <p14:creationId xmlns:p14="http://schemas.microsoft.com/office/powerpoint/2010/main" xmlns="" val="686433211"/>
       </p:ext>
     </p:extLst>
   </p:cSld>

</xml_diff>

<commit_message>
png saved as tif, made conversion to tif
</commit_message>
<xml_diff>
--- a/pptFigures.pptx
+++ b/pptFigures.pptx
@@ -11609,8 +11609,8 @@
     <dgm:cxn modelId="{3D5DB84A-28AC-4B00-A322-344ACBD665A1}" type="presOf" srcId="{60A634FA-D51E-4DFA-A8B7-6627332F3222}" destId="{8D048A75-E83A-48D6-A855-C4FE5D533639}" srcOrd="0" destOrd="0" presId="urn:microsoft.com/office/officeart/2005/8/layout/process5"/>
     <dgm:cxn modelId="{70746F17-67B3-49C6-ADF5-8DA5442091FE}" type="presOf" srcId="{6D9A60DC-AD23-4395-A2B6-098A85C95DAF}" destId="{53DC6053-EF4C-4ACD-B03F-8CF667438B89}" srcOrd="0" destOrd="0" presId="urn:microsoft.com/office/officeart/2005/8/layout/process5"/>
     <dgm:cxn modelId="{C22CA8C5-D445-4FC2-A1B5-DF7B3C7C381E}" srcId="{6D9A60DC-AD23-4395-A2B6-098A85C95DAF}" destId="{6DB6DE26-1159-4C42-AA9C-C2C9040357D2}" srcOrd="1" destOrd="0" parTransId="{30913342-7ABF-4DA0-837F-C1F2F887444C}" sibTransId="{60A634FA-D51E-4DFA-A8B7-6627332F3222}"/>
+    <dgm:cxn modelId="{FE51332D-46FF-43BD-8477-AAFF77C5ECF4}" type="presOf" srcId="{EB43B6EF-5A5A-4A68-96D7-24989EB4F565}" destId="{08139FAF-B268-4BD6-BAAC-2DCE292E9DA9}" srcOrd="0" destOrd="0" presId="urn:microsoft.com/office/officeart/2005/8/layout/process5"/>
     <dgm:cxn modelId="{14C0939A-1E32-4001-B316-3100411C1C85}" srcId="{6D9A60DC-AD23-4395-A2B6-098A85C95DAF}" destId="{3AD45C46-17C9-46AB-BDDD-469FA601C13C}" srcOrd="0" destOrd="0" parTransId="{FF2AF0DB-6D32-4F43-A798-AEA6016B4D3A}" sibTransId="{66694CC5-7120-4F35-9FF6-3EE8026C4947}"/>
-    <dgm:cxn modelId="{FE51332D-46FF-43BD-8477-AAFF77C5ECF4}" type="presOf" srcId="{EB43B6EF-5A5A-4A68-96D7-24989EB4F565}" destId="{08139FAF-B268-4BD6-BAAC-2DCE292E9DA9}" srcOrd="0" destOrd="0" presId="urn:microsoft.com/office/officeart/2005/8/layout/process5"/>
     <dgm:cxn modelId="{03A4D65C-936F-4543-9246-EEACAE1F55F1}" type="presOf" srcId="{3AD45C46-17C9-46AB-BDDD-469FA601C13C}" destId="{C54D33F4-3F41-4981-8216-E1E6D78F10B6}" srcOrd="0" destOrd="0" presId="urn:microsoft.com/office/officeart/2005/8/layout/process5"/>
     <dgm:cxn modelId="{03D97DCF-1082-4534-8B6A-0F4C3D73CAA0}" srcId="{6D9A60DC-AD23-4395-A2B6-098A85C95DAF}" destId="{EB43B6EF-5A5A-4A68-96D7-24989EB4F565}" srcOrd="2" destOrd="0" parTransId="{499405AF-CC85-48D8-8E6D-22C6B9CDDA23}" sibTransId="{72BE0F66-E742-44D1-B94F-41B3B8262BE8}"/>
     <dgm:cxn modelId="{C983FE68-AC44-4AF2-8B9A-F5A71BD5C399}" type="presOf" srcId="{60A634FA-D51E-4DFA-A8B7-6627332F3222}" destId="{193C265C-C4B1-48F6-97B8-E418DD8A9806}" srcOrd="1" destOrd="0" presId="urn:microsoft.com/office/officeart/2005/8/layout/process5"/>
@@ -13022,8 +13022,8 @@
     <dgm:cxn modelId="{5F869347-E138-4CB8-AB6E-C343C0009BAA}" type="presOf" srcId="{284B9274-2047-4B8C-9936-F9913333047C}" destId="{29AA9764-D645-4913-BA66-1A208AC75DAF}" srcOrd="0" destOrd="0" presId="urn:microsoft.com/office/officeart/2005/8/layout/radial4"/>
     <dgm:cxn modelId="{5C9438A1-7A30-4550-BB8B-90C0BDEBABC4}" type="presOf" srcId="{A6C49565-F519-4542-BF98-870261B124FA}" destId="{58C112E9-B04B-49F3-8D98-591AEB55C9C0}" srcOrd="0" destOrd="0" presId="urn:microsoft.com/office/officeart/2005/8/layout/radial4"/>
     <dgm:cxn modelId="{0772E6F0-39BA-44D5-9D2F-3A90A62E3B47}" type="presOf" srcId="{51404F99-6616-492C-86CE-352231288269}" destId="{A8D681BB-369D-4769-9F03-109FF3C39C96}" srcOrd="0" destOrd="0" presId="urn:microsoft.com/office/officeart/2005/8/layout/radial4"/>
+    <dgm:cxn modelId="{065FFCAA-41E6-4C85-AFAC-64A9EE77B730}" srcId="{F24FEC6D-07A1-47A1-96FC-ED8C83255B09}" destId="{4959CA43-C147-403A-AEC2-1032C38D1C08}" srcOrd="3" destOrd="0" parTransId="{284B9274-2047-4B8C-9936-F9913333047C}" sibTransId="{25FB47C5-60B0-40C1-819C-1A8643099C4B}"/>
     <dgm:cxn modelId="{9FFFD23D-47B5-47E1-AF28-88DE763D3267}" type="presOf" srcId="{0EE9F469-090F-46E1-ABC2-09BD96234DF3}" destId="{FBE4C170-3664-419C-B0EB-3DCEFB167F5C}" srcOrd="0" destOrd="0" presId="urn:microsoft.com/office/officeart/2005/8/layout/radial4"/>
-    <dgm:cxn modelId="{065FFCAA-41E6-4C85-AFAC-64A9EE77B730}" srcId="{F24FEC6D-07A1-47A1-96FC-ED8C83255B09}" destId="{4959CA43-C147-403A-AEC2-1032C38D1C08}" srcOrd="3" destOrd="0" parTransId="{284B9274-2047-4B8C-9936-F9913333047C}" sibTransId="{25FB47C5-60B0-40C1-819C-1A8643099C4B}"/>
     <dgm:cxn modelId="{419510B4-33AD-4C25-A6EC-430446607831}" srcId="{F24FEC6D-07A1-47A1-96FC-ED8C83255B09}" destId="{51404F99-6616-492C-86CE-352231288269}" srcOrd="1" destOrd="0" parTransId="{0EE9F469-090F-46E1-ABC2-09BD96234DF3}" sibTransId="{C57ABC00-3475-4454-BBE5-AF6787BAF720}"/>
     <dgm:cxn modelId="{4536C01F-ACD1-4559-97D8-F47ACB34EB8F}" type="presOf" srcId="{4959CA43-C147-403A-AEC2-1032C38D1C08}" destId="{EE01AE8D-B608-4914-9828-57481EE0CDA9}" srcOrd="0" destOrd="0" presId="urn:microsoft.com/office/officeart/2005/8/layout/radial4"/>
     <dgm:cxn modelId="{214E35C2-7D65-478A-8A8F-F36CB2AFBF83}" type="presOf" srcId="{23F37D44-4B1A-4BD6-9E75-C62E7D900C4A}" destId="{3A8DB876-3295-4771-915B-47CA1FB93B42}" srcOrd="0" destOrd="0" presId="urn:microsoft.com/office/officeart/2005/8/layout/radial4"/>
@@ -36199,6 +36199,7 @@
           <a:p>
             <a:fld id="{B4D587CB-4639-4B7A-9F0F-841F955FE3A0}" type="datetimeFigureOut">
               <a:rPr lang="en-US" smtClean="0"/>
+              <a:pPr/>
               <a:t>6/15/2013</a:t>
             </a:fld>
             <a:endParaRPr lang="en-US"/>
@@ -36360,6 +36361,7 @@
           <a:p>
             <a:fld id="{C7638540-05FF-4C33-A664-B971BAFF3076}" type="slidenum">
               <a:rPr lang="en-US" smtClean="0"/>
+              <a:pPr/>
               <a:t>‹#›</a:t>
             </a:fld>
             <a:endParaRPr lang="en-US"/>
@@ -36531,6 +36533,7 @@
           <a:p>
             <a:fld id="{C7638540-05FF-4C33-A664-B971BAFF3076}" type="slidenum">
               <a:rPr lang="en-US" smtClean="0"/>
+              <a:pPr/>
               <a:t>1</a:t>
             </a:fld>
             <a:endParaRPr lang="en-US"/>
@@ -36612,6 +36615,7 @@
           <a:p>
             <a:fld id="{C7638540-05FF-4C33-A664-B971BAFF3076}" type="slidenum">
               <a:rPr lang="en-US" smtClean="0"/>
+              <a:pPr/>
               <a:t>10</a:t>
             </a:fld>
             <a:endParaRPr lang="en-US"/>
@@ -36693,6 +36697,7 @@
           <a:p>
             <a:fld id="{C7638540-05FF-4C33-A664-B971BAFF3076}" type="slidenum">
               <a:rPr lang="en-US" smtClean="0"/>
+              <a:pPr/>
               <a:t>11</a:t>
             </a:fld>
             <a:endParaRPr lang="en-US"/>
@@ -36774,6 +36779,7 @@
           <a:p>
             <a:fld id="{C7638540-05FF-4C33-A664-B971BAFF3076}" type="slidenum">
               <a:rPr lang="en-US" smtClean="0"/>
+              <a:pPr/>
               <a:t>12</a:t>
             </a:fld>
             <a:endParaRPr lang="en-US"/>
@@ -36855,6 +36861,7 @@
           <a:p>
             <a:fld id="{C7638540-05FF-4C33-A664-B971BAFF3076}" type="slidenum">
               <a:rPr lang="en-US" smtClean="0"/>
+              <a:pPr/>
               <a:t>13</a:t>
             </a:fld>
             <a:endParaRPr lang="en-US"/>
@@ -36936,6 +36943,7 @@
           <a:p>
             <a:fld id="{C7638540-05FF-4C33-A664-B971BAFF3076}" type="slidenum">
               <a:rPr lang="en-US" smtClean="0"/>
+              <a:pPr/>
               <a:t>14</a:t>
             </a:fld>
             <a:endParaRPr lang="en-US"/>
@@ -37017,6 +37025,7 @@
           <a:p>
             <a:fld id="{C7638540-05FF-4C33-A664-B971BAFF3076}" type="slidenum">
               <a:rPr lang="en-US" smtClean="0"/>
+              <a:pPr/>
               <a:t>15</a:t>
             </a:fld>
             <a:endParaRPr lang="en-US"/>
@@ -37098,6 +37107,7 @@
           <a:p>
             <a:fld id="{C7638540-05FF-4C33-A664-B971BAFF3076}" type="slidenum">
               <a:rPr lang="en-US" smtClean="0"/>
+              <a:pPr/>
               <a:t>16</a:t>
             </a:fld>
             <a:endParaRPr lang="en-US"/>
@@ -37179,6 +37189,7 @@
           <a:p>
             <a:fld id="{C7638540-05FF-4C33-A664-B971BAFF3076}" type="slidenum">
               <a:rPr lang="en-US" smtClean="0"/>
+              <a:pPr/>
               <a:t>17</a:t>
             </a:fld>
             <a:endParaRPr lang="en-US"/>
@@ -37260,6 +37271,7 @@
           <a:p>
             <a:fld id="{C7638540-05FF-4C33-A664-B971BAFF3076}" type="slidenum">
               <a:rPr lang="en-US" smtClean="0"/>
+              <a:pPr/>
               <a:t>2</a:t>
             </a:fld>
             <a:endParaRPr lang="en-US"/>
@@ -37341,6 +37353,7 @@
           <a:p>
             <a:fld id="{C7638540-05FF-4C33-A664-B971BAFF3076}" type="slidenum">
               <a:rPr lang="en-US" smtClean="0"/>
+              <a:pPr/>
               <a:t>3</a:t>
             </a:fld>
             <a:endParaRPr lang="en-US"/>
@@ -37422,6 +37435,7 @@
           <a:p>
             <a:fld id="{C7638540-05FF-4C33-A664-B971BAFF3076}" type="slidenum">
               <a:rPr lang="en-US" smtClean="0"/>
+              <a:pPr/>
               <a:t>4</a:t>
             </a:fld>
             <a:endParaRPr lang="en-US"/>
@@ -37503,6 +37517,7 @@
           <a:p>
             <a:fld id="{C7638540-05FF-4C33-A664-B971BAFF3076}" type="slidenum">
               <a:rPr lang="en-US" smtClean="0"/>
+              <a:pPr/>
               <a:t>5</a:t>
             </a:fld>
             <a:endParaRPr lang="en-US"/>
@@ -37748,6 +37763,7 @@
           <a:p>
             <a:fld id="{C7638540-05FF-4C33-A664-B971BAFF3076}" type="slidenum">
               <a:rPr lang="en-US" smtClean="0"/>
+              <a:pPr/>
               <a:t>8</a:t>
             </a:fld>
             <a:endParaRPr lang="en-US"/>
@@ -37829,6 +37845,7 @@
           <a:p>
             <a:fld id="{C7638540-05FF-4C33-A664-B971BAFF3076}" type="slidenum">
               <a:rPr lang="en-US" smtClean="0"/>
+              <a:pPr/>
               <a:t>9</a:t>
             </a:fld>
             <a:endParaRPr lang="en-US"/>
@@ -38077,7 +38094,7 @@
     </p:spTree>
     <p:extLst>
       <p:ext uri="{BB962C8B-B14F-4D97-AF65-F5344CB8AC3E}">
-        <p14:creationId xmlns:p14="http://schemas.microsoft.com/office/powerpoint/2010/main" xmlns="" val="1359784228"/>
+        <p14:creationId xmlns="" xmlns:p14="http://schemas.microsoft.com/office/powerpoint/2010/main" val="1359784228"/>
       </p:ext>
     </p:extLst>
   </p:cSld>
@@ -38249,7 +38266,7 @@
     </p:spTree>
     <p:extLst>
       <p:ext uri="{BB962C8B-B14F-4D97-AF65-F5344CB8AC3E}">
-        <p14:creationId xmlns:p14="http://schemas.microsoft.com/office/powerpoint/2010/main" xmlns="" val="1535817038"/>
+        <p14:creationId xmlns="" xmlns:p14="http://schemas.microsoft.com/office/powerpoint/2010/main" val="1535817038"/>
       </p:ext>
     </p:extLst>
   </p:cSld>
@@ -38431,7 +38448,7 @@
     </p:spTree>
     <p:extLst>
       <p:ext uri="{BB962C8B-B14F-4D97-AF65-F5344CB8AC3E}">
-        <p14:creationId xmlns:p14="http://schemas.microsoft.com/office/powerpoint/2010/main" xmlns="" val="3305786099"/>
+        <p14:creationId xmlns="" xmlns:p14="http://schemas.microsoft.com/office/powerpoint/2010/main" val="3305786099"/>
       </p:ext>
     </p:extLst>
   </p:cSld>
@@ -38603,7 +38620,7 @@
     </p:spTree>
     <p:extLst>
       <p:ext uri="{BB962C8B-B14F-4D97-AF65-F5344CB8AC3E}">
-        <p14:creationId xmlns:p14="http://schemas.microsoft.com/office/powerpoint/2010/main" xmlns="" val="2808464794"/>
+        <p14:creationId xmlns="" xmlns:p14="http://schemas.microsoft.com/office/powerpoint/2010/main" val="2808464794"/>
       </p:ext>
     </p:extLst>
   </p:cSld>
@@ -38851,7 +38868,7 @@
     </p:spTree>
     <p:extLst>
       <p:ext uri="{BB962C8B-B14F-4D97-AF65-F5344CB8AC3E}">
-        <p14:creationId xmlns:p14="http://schemas.microsoft.com/office/powerpoint/2010/main" xmlns="" val="3350234395"/>
+        <p14:creationId xmlns="" xmlns:p14="http://schemas.microsoft.com/office/powerpoint/2010/main" val="3350234395"/>
       </p:ext>
     </p:extLst>
   </p:cSld>
@@ -39141,7 +39158,7 @@
     </p:spTree>
     <p:extLst>
       <p:ext uri="{BB962C8B-B14F-4D97-AF65-F5344CB8AC3E}">
-        <p14:creationId xmlns:p14="http://schemas.microsoft.com/office/powerpoint/2010/main" xmlns="" val="2876325978"/>
+        <p14:creationId xmlns="" xmlns:p14="http://schemas.microsoft.com/office/powerpoint/2010/main" val="2876325978"/>
       </p:ext>
     </p:extLst>
   </p:cSld>
@@ -39565,7 +39582,7 @@
     </p:spTree>
     <p:extLst>
       <p:ext uri="{BB962C8B-B14F-4D97-AF65-F5344CB8AC3E}">
-        <p14:creationId xmlns:p14="http://schemas.microsoft.com/office/powerpoint/2010/main" xmlns="" val="2581016330"/>
+        <p14:creationId xmlns="" xmlns:p14="http://schemas.microsoft.com/office/powerpoint/2010/main" val="2581016330"/>
       </p:ext>
     </p:extLst>
   </p:cSld>
@@ -39685,7 +39702,7 @@
     </p:spTree>
     <p:extLst>
       <p:ext uri="{BB962C8B-B14F-4D97-AF65-F5344CB8AC3E}">
-        <p14:creationId xmlns:p14="http://schemas.microsoft.com/office/powerpoint/2010/main" xmlns="" val="2219315351"/>
+        <p14:creationId xmlns="" xmlns:p14="http://schemas.microsoft.com/office/powerpoint/2010/main" val="2219315351"/>
       </p:ext>
     </p:extLst>
   </p:cSld>
@@ -39782,7 +39799,7 @@
     </p:spTree>
     <p:extLst>
       <p:ext uri="{BB962C8B-B14F-4D97-AF65-F5344CB8AC3E}">
-        <p14:creationId xmlns:p14="http://schemas.microsoft.com/office/powerpoint/2010/main" xmlns="" val="4149962164"/>
+        <p14:creationId xmlns="" xmlns:p14="http://schemas.microsoft.com/office/powerpoint/2010/main" val="4149962164"/>
       </p:ext>
     </p:extLst>
   </p:cSld>
@@ -40061,7 +40078,7 @@
     </p:spTree>
     <p:extLst>
       <p:ext uri="{BB962C8B-B14F-4D97-AF65-F5344CB8AC3E}">
-        <p14:creationId xmlns:p14="http://schemas.microsoft.com/office/powerpoint/2010/main" xmlns="" val="2318772332"/>
+        <p14:creationId xmlns="" xmlns:p14="http://schemas.microsoft.com/office/powerpoint/2010/main" val="2318772332"/>
       </p:ext>
     </p:extLst>
   </p:cSld>
@@ -40316,7 +40333,7 @@
     </p:spTree>
     <p:extLst>
       <p:ext uri="{BB962C8B-B14F-4D97-AF65-F5344CB8AC3E}">
-        <p14:creationId xmlns:p14="http://schemas.microsoft.com/office/powerpoint/2010/main" xmlns="" val="2574223405"/>
+        <p14:creationId xmlns="" xmlns:p14="http://schemas.microsoft.com/office/powerpoint/2010/main" val="2574223405"/>
       </p:ext>
     </p:extLst>
   </p:cSld>
@@ -40567,7 +40584,7 @@
     </p:spTree>
     <p:extLst>
       <p:ext uri="{BB962C8B-B14F-4D97-AF65-F5344CB8AC3E}">
-        <p14:creationId xmlns:p14="http://schemas.microsoft.com/office/powerpoint/2010/main" xmlns="" val="3383897187"/>
+        <p14:creationId xmlns="" xmlns:p14="http://schemas.microsoft.com/office/powerpoint/2010/main" val="3383897187"/>
       </p:ext>
     </p:extLst>
   </p:cSld>
@@ -40896,7 +40913,7 @@
     </p:spTree>
     <p:extLst>
       <p:ext uri="{BB962C8B-B14F-4D97-AF65-F5344CB8AC3E}">
-        <p14:creationId xmlns:p14="http://schemas.microsoft.com/office/powerpoint/2010/main" xmlns="" val="2398501569"/>
+        <p14:creationId xmlns="" xmlns:p14="http://schemas.microsoft.com/office/powerpoint/2010/main" val="2398501569"/>
       </p:ext>
     </p:extLst>
   </p:cSld>
@@ -40959,7 +40976,7 @@
             <p:ph idx="1"/>
             <p:extLst>
               <p:ext uri="{D42A27DB-BD31-4B8C-83A1-F6EECF244321}">
-                <p14:modId xmlns:p14="http://schemas.microsoft.com/office/powerpoint/2010/main" xmlns="" val="2177100673"/>
+                <p14:modId xmlns="" xmlns:p14="http://schemas.microsoft.com/office/powerpoint/2010/main" val="2177100673"/>
               </p:ext>
             </p:extLst>
           </p:nvPr>
@@ -40983,7 +41000,7 @@
           <p:nvPr>
             <p:extLst>
               <p:ext uri="{D42A27DB-BD31-4B8C-83A1-F6EECF244321}">
-                <p14:modId xmlns:p14="http://schemas.microsoft.com/office/powerpoint/2010/main" xmlns="" val="3880500600"/>
+                <p14:modId xmlns="" xmlns:p14="http://schemas.microsoft.com/office/powerpoint/2010/main" val="3880500600"/>
               </p:ext>
             </p:extLst>
           </p:nvPr>
@@ -41121,7 +41138,7 @@
     </p:spTree>
     <p:extLst>
       <p:ext uri="{BB962C8B-B14F-4D97-AF65-F5344CB8AC3E}">
-        <p14:creationId xmlns:p14="http://schemas.microsoft.com/office/powerpoint/2010/main" xmlns="" val="686433211"/>
+        <p14:creationId xmlns="" xmlns:p14="http://schemas.microsoft.com/office/powerpoint/2010/main" val="686433211"/>
       </p:ext>
     </p:extLst>
   </p:cSld>
@@ -41165,12 +41182,23 @@
             <p:ph type="title"/>
           </p:nvPr>
         </p:nvSpPr>
-        <p:spPr/>
+        <p:spPr>
+          <a:xfrm>
+            <a:off x="457200" y="274638"/>
+            <a:ext cx="8229600" cy="634082"/>
+          </a:xfrm>
+        </p:spPr>
         <p:txBody>
-          <a:bodyPr/>
+          <a:bodyPr>
+            <a:normAutofit fontScale="90000"/>
+          </a:bodyPr>
           <a:lstStyle/>
           <a:p>
-            <a:endParaRPr lang="en-US"/>
+            <a:r>
+              <a:rPr lang="en-US" dirty="0" smtClean="0"/>
+              <a:t>Cosim_flow.tif</a:t>
+            </a:r>
+            <a:endParaRPr lang="en-US" dirty="0"/>
           </a:p>
         </p:txBody>
       </p:sp>
@@ -41184,7 +41212,7 @@
             <p:ph idx="1"/>
             <p:extLst>
               <p:ext uri="{D42A27DB-BD31-4B8C-83A1-F6EECF244321}">
-                <p14:modId xmlns:p14="http://schemas.microsoft.com/office/powerpoint/2010/main" xmlns="" val="545708058"/>
+                <p14:modId xmlns="" xmlns:p14="http://schemas.microsoft.com/office/powerpoint/2010/main" val="545708058"/>
               </p:ext>
             </p:extLst>
           </p:nvPr>
@@ -41202,7 +41230,7 @@
     </p:spTree>
     <p:extLst>
       <p:ext uri="{BB962C8B-B14F-4D97-AF65-F5344CB8AC3E}">
-        <p14:creationId xmlns:p14="http://schemas.microsoft.com/office/powerpoint/2010/main" xmlns="" val="2992830619"/>
+        <p14:creationId xmlns="" xmlns:p14="http://schemas.microsoft.com/office/powerpoint/2010/main" val="2992830619"/>
       </p:ext>
     </p:extLst>
   </p:cSld>
@@ -41283,7 +41311,7 @@
           <p:nvPr>
             <p:extLst>
               <p:ext uri="{D42A27DB-BD31-4B8C-83A1-F6EECF244321}">
-                <p14:modId xmlns:p14="http://schemas.microsoft.com/office/powerpoint/2010/main" xmlns="" val="2621353938"/>
+                <p14:modId xmlns="" xmlns:p14="http://schemas.microsoft.com/office/powerpoint/2010/main" val="2621353938"/>
               </p:ext>
             </p:extLst>
           </p:nvPr>
@@ -41307,7 +41335,7 @@
           <p:nvPr>
             <p:extLst>
               <p:ext uri="{D42A27DB-BD31-4B8C-83A1-F6EECF244321}">
-                <p14:modId xmlns:p14="http://schemas.microsoft.com/office/powerpoint/2010/main" xmlns="" val="1248215537"/>
+                <p14:modId xmlns="" xmlns:p14="http://schemas.microsoft.com/office/powerpoint/2010/main" val="1248215537"/>
               </p:ext>
             </p:extLst>
           </p:nvPr>
@@ -41417,7 +41445,7 @@
     </p:spTree>
     <p:extLst>
       <p:ext uri="{BB962C8B-B14F-4D97-AF65-F5344CB8AC3E}">
-        <p14:creationId xmlns:p14="http://schemas.microsoft.com/office/powerpoint/2010/main" xmlns="" val="1557959741"/>
+        <p14:creationId xmlns="" xmlns:p14="http://schemas.microsoft.com/office/powerpoint/2010/main" val="1557959741"/>
       </p:ext>
     </p:extLst>
   </p:cSld>
@@ -41480,7 +41508,7 @@
             <p:ph idx="1"/>
             <p:extLst>
               <p:ext uri="{D42A27DB-BD31-4B8C-83A1-F6EECF244321}">
-                <p14:modId xmlns:p14="http://schemas.microsoft.com/office/powerpoint/2010/main" xmlns="" val="3607291589"/>
+                <p14:modId xmlns="" xmlns:p14="http://schemas.microsoft.com/office/powerpoint/2010/main" val="3607291589"/>
               </p:ext>
             </p:extLst>
           </p:nvPr>
@@ -41498,7 +41526,7 @@
     </p:spTree>
     <p:extLst>
       <p:ext uri="{BB962C8B-B14F-4D97-AF65-F5344CB8AC3E}">
-        <p14:creationId xmlns:p14="http://schemas.microsoft.com/office/powerpoint/2010/main" xmlns="" val="704232541"/>
+        <p14:creationId xmlns="" xmlns:p14="http://schemas.microsoft.com/office/powerpoint/2010/main" val="704232541"/>
       </p:ext>
     </p:extLst>
   </p:cSld>
@@ -43726,7 +43754,7 @@
     </p:spTree>
     <p:extLst>
       <p:ext uri="{BB962C8B-B14F-4D97-AF65-F5344CB8AC3E}">
-        <p14:creationId xmlns:p14="http://schemas.microsoft.com/office/powerpoint/2010/main" xmlns="" val="1650756672"/>
+        <p14:creationId xmlns="" xmlns:p14="http://schemas.microsoft.com/office/powerpoint/2010/main" val="1650756672"/>
       </p:ext>
     </p:extLst>
   </p:cSld>
@@ -43821,7 +43849,7 @@
             <p:nvPr>
               <p:extLst>
                 <p:ext uri="{D42A27DB-BD31-4B8C-83A1-F6EECF244321}">
-                  <p14:modId xmlns:p14="http://schemas.microsoft.com/office/powerpoint/2010/main" xmlns="" val="2598465583"/>
+                  <p14:modId xmlns="" xmlns:p14="http://schemas.microsoft.com/office/powerpoint/2010/main" val="2598465583"/>
                 </p:ext>
               </p:extLst>
             </p:nvPr>
@@ -44750,7 +44778,7 @@
     </p:spTree>
     <p:extLst>
       <p:ext uri="{BB962C8B-B14F-4D97-AF65-F5344CB8AC3E}">
-        <p14:creationId xmlns:p14="http://schemas.microsoft.com/office/powerpoint/2010/main" xmlns="" val="1633000113"/>
+        <p14:creationId xmlns="" xmlns:p14="http://schemas.microsoft.com/office/powerpoint/2010/main" val="1633000113"/>
       </p:ext>
     </p:extLst>
   </p:cSld>
@@ -44813,7 +44841,7 @@
             <p:ph idx="1"/>
             <p:extLst>
               <p:ext uri="{D42A27DB-BD31-4B8C-83A1-F6EECF244321}">
-                <p14:modId xmlns:p14="http://schemas.microsoft.com/office/powerpoint/2010/main" xmlns="" val="812163987"/>
+                <p14:modId xmlns="" xmlns:p14="http://schemas.microsoft.com/office/powerpoint/2010/main" val="812163987"/>
               </p:ext>
             </p:extLst>
           </p:nvPr>
@@ -44866,7 +44894,7 @@
     </p:spTree>
     <p:extLst>
       <p:ext uri="{BB962C8B-B14F-4D97-AF65-F5344CB8AC3E}">
-        <p14:creationId xmlns:p14="http://schemas.microsoft.com/office/powerpoint/2010/main" xmlns="" val="3929008511"/>
+        <p14:creationId xmlns="" xmlns:p14="http://schemas.microsoft.com/office/powerpoint/2010/main" val="3929008511"/>
       </p:ext>
     </p:extLst>
   </p:cSld>
@@ -45346,7 +45374,7 @@
             <p:ph idx="1"/>
             <p:extLst>
               <p:ext uri="{D42A27DB-BD31-4B8C-83A1-F6EECF244321}">
-                <p14:modId xmlns:p14="http://schemas.microsoft.com/office/powerpoint/2010/main" xmlns="" val="3537299332"/>
+                <p14:modId xmlns="" xmlns:p14="http://schemas.microsoft.com/office/powerpoint/2010/main" val="3537299332"/>
               </p:ext>
             </p:extLst>
           </p:nvPr>
@@ -45364,7 +45392,7 @@
     </p:spTree>
     <p:extLst>
       <p:ext uri="{BB962C8B-B14F-4D97-AF65-F5344CB8AC3E}">
-        <p14:creationId xmlns:p14="http://schemas.microsoft.com/office/powerpoint/2010/main" xmlns="" val="2350175017"/>
+        <p14:creationId xmlns="" xmlns:p14="http://schemas.microsoft.com/office/powerpoint/2010/main" val="2350175017"/>
       </p:ext>
     </p:extLst>
   </p:cSld>
@@ -45432,7 +45460,7 @@
             <p:ph idx="1"/>
             <p:extLst>
               <p:ext uri="{D42A27DB-BD31-4B8C-83A1-F6EECF244321}">
-                <p14:modId xmlns:p14="http://schemas.microsoft.com/office/powerpoint/2010/main" xmlns="" val="2475547916"/>
+                <p14:modId xmlns="" xmlns:p14="http://schemas.microsoft.com/office/powerpoint/2010/main" val="2475547916"/>
               </p:ext>
             </p:extLst>
           </p:nvPr>
@@ -45454,7 +45482,7 @@
           <p:nvPr>
             <p:extLst>
               <p:ext uri="{D42A27DB-BD31-4B8C-83A1-F6EECF244321}">
-                <p14:modId xmlns:p14="http://schemas.microsoft.com/office/powerpoint/2010/main" xmlns="" val="1761478570"/>
+                <p14:modId xmlns="" xmlns:p14="http://schemas.microsoft.com/office/powerpoint/2010/main" val="1761478570"/>
               </p:ext>
             </p:extLst>
           </p:nvPr>
@@ -45478,7 +45506,7 @@
           <p:nvPr>
             <p:extLst>
               <p:ext uri="{D42A27DB-BD31-4B8C-83A1-F6EECF244321}">
-                <p14:modId xmlns:p14="http://schemas.microsoft.com/office/powerpoint/2010/main" xmlns="" val="1111039397"/>
+                <p14:modId xmlns="" xmlns:p14="http://schemas.microsoft.com/office/powerpoint/2010/main" val="1111039397"/>
               </p:ext>
             </p:extLst>
           </p:nvPr>
@@ -45605,7 +45633,7 @@
     </p:spTree>
     <p:extLst>
       <p:ext uri="{BB962C8B-B14F-4D97-AF65-F5344CB8AC3E}">
-        <p14:creationId xmlns:p14="http://schemas.microsoft.com/office/powerpoint/2010/main" xmlns="" val="2434108879"/>
+        <p14:creationId xmlns="" xmlns:p14="http://schemas.microsoft.com/office/powerpoint/2010/main" val="2434108879"/>
       </p:ext>
     </p:extLst>
   </p:cSld>
@@ -49062,7 +49090,7 @@
     </p:spTree>
     <p:extLst>
       <p:ext uri="{BB962C8B-B14F-4D97-AF65-F5344CB8AC3E}">
-        <p14:creationId xmlns:p14="http://schemas.microsoft.com/office/powerpoint/2010/main" xmlns="" val="1734076018"/>
+        <p14:creationId xmlns="" xmlns:p14="http://schemas.microsoft.com/office/powerpoint/2010/main" val="1734076018"/>
       </p:ext>
     </p:extLst>
   </p:cSld>
@@ -49748,7 +49776,7 @@
     </p:spTree>
     <p:extLst>
       <p:ext uri="{BB962C8B-B14F-4D97-AF65-F5344CB8AC3E}">
-        <p14:creationId xmlns:p14="http://schemas.microsoft.com/office/powerpoint/2010/main" xmlns="" val="2601577110"/>
+        <p14:creationId xmlns="" xmlns:p14="http://schemas.microsoft.com/office/powerpoint/2010/main" val="2601577110"/>
       </p:ext>
     </p:extLst>
   </p:cSld>

</xml_diff>

<commit_message>
Reviewed most of dualsim.tex
</commit_message>
<xml_diff>
--- a/pptFigures.pptx
+++ b/pptFigures.pptx
@@ -5,7 +5,7 @@
     <p:sldMasterId id="2147483648" r:id="rId1"/>
   </p:sldMasterIdLst>
   <p:notesMasterIdLst>
-    <p:notesMasterId r:id="rId24"/>
+    <p:notesMasterId r:id="rId25"/>
   </p:notesMasterIdLst>
   <p:sldIdLst>
     <p:sldId id="256" r:id="rId2"/>
@@ -27,9 +27,10 @@
     <p:sldId id="272" r:id="rId18"/>
     <p:sldId id="281" r:id="rId19"/>
     <p:sldId id="271" r:id="rId20"/>
-    <p:sldId id="282" r:id="rId21"/>
-    <p:sldId id="284" r:id="rId22"/>
-    <p:sldId id="285" r:id="rId23"/>
+    <p:sldId id="286" r:id="rId21"/>
+    <p:sldId id="282" r:id="rId22"/>
+    <p:sldId id="284" r:id="rId23"/>
+    <p:sldId id="285" r:id="rId24"/>
   </p:sldIdLst>
   <p:sldSz cx="9144000" cy="6858000" type="screen4x3"/>
   <p:notesSz cx="6858000" cy="9144000"/>
@@ -6168,6 +6169,753 @@
 </file>
 
 <file path=ppt/diagrams/colors17.xml><?xml version="1.0" encoding="utf-8"?>
+<dgm:colorsDef xmlns:dgm="http://schemas.openxmlformats.org/drawingml/2006/diagram" xmlns:a="http://schemas.openxmlformats.org/drawingml/2006/main" uniqueId="urn:microsoft.com/office/officeart/2005/8/colors/accent1_2">
+  <dgm:title val=""/>
+  <dgm:desc val=""/>
+  <dgm:catLst>
+    <dgm:cat type="accent1" pri="11200"/>
+  </dgm:catLst>
+  <dgm:styleLbl name="node0">
+    <dgm:fillClrLst meth="repeat">
+      <a:schemeClr val="accent1"/>
+    </dgm:fillClrLst>
+    <dgm:linClrLst meth="repeat">
+      <a:schemeClr val="lt1"/>
+    </dgm:linClrLst>
+    <dgm:effectClrLst/>
+    <dgm:txLinClrLst/>
+    <dgm:txFillClrLst/>
+    <dgm:txEffectClrLst/>
+  </dgm:styleLbl>
+  <dgm:styleLbl name="alignNode1">
+    <dgm:fillClrLst meth="repeat">
+      <a:schemeClr val="accent1"/>
+    </dgm:fillClrLst>
+    <dgm:linClrLst meth="repeat">
+      <a:schemeClr val="accent1"/>
+    </dgm:linClrLst>
+    <dgm:effectClrLst/>
+    <dgm:txLinClrLst/>
+    <dgm:txFillClrLst/>
+    <dgm:txEffectClrLst/>
+  </dgm:styleLbl>
+  <dgm:styleLbl name="node1">
+    <dgm:fillClrLst meth="repeat">
+      <a:schemeClr val="accent1"/>
+    </dgm:fillClrLst>
+    <dgm:linClrLst meth="repeat">
+      <a:schemeClr val="lt1"/>
+    </dgm:linClrLst>
+    <dgm:effectClrLst/>
+    <dgm:txLinClrLst/>
+    <dgm:txFillClrLst/>
+    <dgm:txEffectClrLst/>
+  </dgm:styleLbl>
+  <dgm:styleLbl name="lnNode1">
+    <dgm:fillClrLst meth="repeat">
+      <a:schemeClr val="accent1"/>
+    </dgm:fillClrLst>
+    <dgm:linClrLst meth="repeat">
+      <a:schemeClr val="lt1"/>
+    </dgm:linClrLst>
+    <dgm:effectClrLst/>
+    <dgm:txLinClrLst/>
+    <dgm:txFillClrLst/>
+    <dgm:txEffectClrLst/>
+  </dgm:styleLbl>
+  <dgm:styleLbl name="vennNode1">
+    <dgm:fillClrLst meth="repeat">
+      <a:schemeClr val="accent1">
+        <a:alpha val="50000"/>
+      </a:schemeClr>
+    </dgm:fillClrLst>
+    <dgm:linClrLst meth="repeat">
+      <a:schemeClr val="lt1"/>
+    </dgm:linClrLst>
+    <dgm:effectClrLst/>
+    <dgm:txLinClrLst/>
+    <dgm:txFillClrLst/>
+    <dgm:txEffectClrLst/>
+  </dgm:styleLbl>
+  <dgm:styleLbl name="node2">
+    <dgm:fillClrLst meth="repeat">
+      <a:schemeClr val="accent1"/>
+    </dgm:fillClrLst>
+    <dgm:linClrLst meth="repeat">
+      <a:schemeClr val="lt1"/>
+    </dgm:linClrLst>
+    <dgm:effectClrLst/>
+    <dgm:txLinClrLst/>
+    <dgm:txFillClrLst/>
+    <dgm:txEffectClrLst/>
+  </dgm:styleLbl>
+  <dgm:styleLbl name="node3">
+    <dgm:fillClrLst meth="repeat">
+      <a:schemeClr val="accent1"/>
+    </dgm:fillClrLst>
+    <dgm:linClrLst meth="repeat">
+      <a:schemeClr val="lt1"/>
+    </dgm:linClrLst>
+    <dgm:effectClrLst/>
+    <dgm:txLinClrLst/>
+    <dgm:txFillClrLst/>
+    <dgm:txEffectClrLst/>
+  </dgm:styleLbl>
+  <dgm:styleLbl name="node4">
+    <dgm:fillClrLst meth="repeat">
+      <a:schemeClr val="accent1"/>
+    </dgm:fillClrLst>
+    <dgm:linClrLst meth="repeat">
+      <a:schemeClr val="lt1"/>
+    </dgm:linClrLst>
+    <dgm:effectClrLst/>
+    <dgm:txLinClrLst/>
+    <dgm:txFillClrLst/>
+    <dgm:txEffectClrLst/>
+  </dgm:styleLbl>
+  <dgm:styleLbl name="fgImgPlace1">
+    <dgm:fillClrLst meth="repeat">
+      <a:schemeClr val="accent1">
+        <a:tint val="50000"/>
+      </a:schemeClr>
+    </dgm:fillClrLst>
+    <dgm:linClrLst meth="repeat">
+      <a:schemeClr val="lt1"/>
+    </dgm:linClrLst>
+    <dgm:effectClrLst/>
+    <dgm:txLinClrLst/>
+    <dgm:txFillClrLst meth="repeat">
+      <a:schemeClr val="lt1"/>
+    </dgm:txFillClrLst>
+    <dgm:txEffectClrLst/>
+  </dgm:styleLbl>
+  <dgm:styleLbl name="alignImgPlace1">
+    <dgm:fillClrLst meth="repeat">
+      <a:schemeClr val="accent1">
+        <a:tint val="50000"/>
+      </a:schemeClr>
+    </dgm:fillClrLst>
+    <dgm:linClrLst meth="repeat">
+      <a:schemeClr val="lt1"/>
+    </dgm:linClrLst>
+    <dgm:effectClrLst/>
+    <dgm:txLinClrLst/>
+    <dgm:txFillClrLst meth="repeat">
+      <a:schemeClr val="lt1"/>
+    </dgm:txFillClrLst>
+    <dgm:txEffectClrLst/>
+  </dgm:styleLbl>
+  <dgm:styleLbl name="bgImgPlace1">
+    <dgm:fillClrLst meth="repeat">
+      <a:schemeClr val="accent1">
+        <a:tint val="50000"/>
+      </a:schemeClr>
+    </dgm:fillClrLst>
+    <dgm:linClrLst meth="repeat">
+      <a:schemeClr val="lt1"/>
+    </dgm:linClrLst>
+    <dgm:effectClrLst/>
+    <dgm:txLinClrLst/>
+    <dgm:txFillClrLst meth="repeat">
+      <a:schemeClr val="lt1"/>
+    </dgm:txFillClrLst>
+    <dgm:txEffectClrLst/>
+  </dgm:styleLbl>
+  <dgm:styleLbl name="sibTrans2D1">
+    <dgm:fillClrLst meth="repeat">
+      <a:schemeClr val="accent1">
+        <a:tint val="60000"/>
+      </a:schemeClr>
+    </dgm:fillClrLst>
+    <dgm:linClrLst meth="repeat">
+      <a:schemeClr val="accent1">
+        <a:tint val="60000"/>
+      </a:schemeClr>
+    </dgm:linClrLst>
+    <dgm:effectClrLst/>
+    <dgm:txLinClrLst/>
+    <dgm:txFillClrLst/>
+    <dgm:txEffectClrLst/>
+  </dgm:styleLbl>
+  <dgm:styleLbl name="fgSibTrans2D1">
+    <dgm:fillClrLst meth="repeat">
+      <a:schemeClr val="accent1">
+        <a:tint val="60000"/>
+      </a:schemeClr>
+    </dgm:fillClrLst>
+    <dgm:linClrLst meth="repeat">
+      <a:schemeClr val="accent1">
+        <a:tint val="60000"/>
+      </a:schemeClr>
+    </dgm:linClrLst>
+    <dgm:effectClrLst/>
+    <dgm:txLinClrLst/>
+    <dgm:txFillClrLst/>
+    <dgm:txEffectClrLst/>
+  </dgm:styleLbl>
+  <dgm:styleLbl name="bgSibTrans2D1">
+    <dgm:fillClrLst meth="repeat">
+      <a:schemeClr val="accent1">
+        <a:tint val="60000"/>
+      </a:schemeClr>
+    </dgm:fillClrLst>
+    <dgm:linClrLst meth="repeat">
+      <a:schemeClr val="accent1">
+        <a:tint val="60000"/>
+      </a:schemeClr>
+    </dgm:linClrLst>
+    <dgm:effectClrLst/>
+    <dgm:txLinClrLst/>
+    <dgm:txFillClrLst/>
+    <dgm:txEffectClrLst/>
+  </dgm:styleLbl>
+  <dgm:styleLbl name="sibTrans1D1">
+    <dgm:fillClrLst meth="repeat">
+      <a:schemeClr val="accent1"/>
+    </dgm:fillClrLst>
+    <dgm:linClrLst meth="repeat">
+      <a:schemeClr val="accent1"/>
+    </dgm:linClrLst>
+    <dgm:effectClrLst/>
+    <dgm:txLinClrLst/>
+    <dgm:txFillClrLst meth="repeat">
+      <a:schemeClr val="tx1"/>
+    </dgm:txFillClrLst>
+    <dgm:txEffectClrLst/>
+  </dgm:styleLbl>
+  <dgm:styleLbl name="callout">
+    <dgm:fillClrLst meth="repeat">
+      <a:schemeClr val="accent1"/>
+    </dgm:fillClrLst>
+    <dgm:linClrLst meth="repeat">
+      <a:schemeClr val="accent1">
+        <a:tint val="50000"/>
+      </a:schemeClr>
+    </dgm:linClrLst>
+    <dgm:effectClrLst/>
+    <dgm:txLinClrLst/>
+    <dgm:txFillClrLst meth="repeat">
+      <a:schemeClr val="tx1"/>
+    </dgm:txFillClrLst>
+    <dgm:txEffectClrLst/>
+  </dgm:styleLbl>
+  <dgm:styleLbl name="asst0">
+    <dgm:fillClrLst meth="repeat">
+      <a:schemeClr val="accent1"/>
+    </dgm:fillClrLst>
+    <dgm:linClrLst meth="repeat">
+      <a:schemeClr val="lt1"/>
+    </dgm:linClrLst>
+    <dgm:effectClrLst/>
+    <dgm:txLinClrLst/>
+    <dgm:txFillClrLst/>
+    <dgm:txEffectClrLst/>
+  </dgm:styleLbl>
+  <dgm:styleLbl name="asst1">
+    <dgm:fillClrLst meth="repeat">
+      <a:schemeClr val="accent1"/>
+    </dgm:fillClrLst>
+    <dgm:linClrLst meth="repeat">
+      <a:schemeClr val="lt1"/>
+    </dgm:linClrLst>
+    <dgm:effectClrLst/>
+    <dgm:txLinClrLst/>
+    <dgm:txFillClrLst/>
+    <dgm:txEffectClrLst/>
+  </dgm:styleLbl>
+  <dgm:styleLbl name="asst2">
+    <dgm:fillClrLst meth="repeat">
+      <a:schemeClr val="accent1"/>
+    </dgm:fillClrLst>
+    <dgm:linClrLst meth="repeat">
+      <a:schemeClr val="lt1"/>
+    </dgm:linClrLst>
+    <dgm:effectClrLst/>
+    <dgm:txLinClrLst/>
+    <dgm:txFillClrLst/>
+    <dgm:txEffectClrLst/>
+  </dgm:styleLbl>
+  <dgm:styleLbl name="asst3">
+    <dgm:fillClrLst meth="repeat">
+      <a:schemeClr val="accent1"/>
+    </dgm:fillClrLst>
+    <dgm:linClrLst meth="repeat">
+      <a:schemeClr val="lt1"/>
+    </dgm:linClrLst>
+    <dgm:effectClrLst/>
+    <dgm:txLinClrLst/>
+    <dgm:txFillClrLst/>
+    <dgm:txEffectClrLst/>
+  </dgm:styleLbl>
+  <dgm:styleLbl name="asst4">
+    <dgm:fillClrLst meth="repeat">
+      <a:schemeClr val="accent1"/>
+    </dgm:fillClrLst>
+    <dgm:linClrLst meth="repeat">
+      <a:schemeClr val="lt1"/>
+    </dgm:linClrLst>
+    <dgm:effectClrLst/>
+    <dgm:txLinClrLst/>
+    <dgm:txFillClrLst/>
+    <dgm:txEffectClrLst/>
+  </dgm:styleLbl>
+  <dgm:styleLbl name="parChTrans2D1">
+    <dgm:fillClrLst meth="repeat">
+      <a:schemeClr val="accent1">
+        <a:tint val="60000"/>
+      </a:schemeClr>
+    </dgm:fillClrLst>
+    <dgm:linClrLst meth="repeat">
+      <a:schemeClr val="accent1">
+        <a:tint val="60000"/>
+      </a:schemeClr>
+    </dgm:linClrLst>
+    <dgm:effectClrLst/>
+    <dgm:txLinClrLst/>
+    <dgm:txFillClrLst meth="repeat">
+      <a:schemeClr val="lt1"/>
+    </dgm:txFillClrLst>
+    <dgm:txEffectClrLst/>
+  </dgm:styleLbl>
+  <dgm:styleLbl name="parChTrans2D2">
+    <dgm:fillClrLst meth="repeat">
+      <a:schemeClr val="accent1"/>
+    </dgm:fillClrLst>
+    <dgm:linClrLst meth="repeat">
+      <a:schemeClr val="accent1"/>
+    </dgm:linClrLst>
+    <dgm:effectClrLst/>
+    <dgm:txLinClrLst/>
+    <dgm:txFillClrLst meth="repeat">
+      <a:schemeClr val="lt1"/>
+    </dgm:txFillClrLst>
+    <dgm:txEffectClrLst/>
+  </dgm:styleLbl>
+  <dgm:styleLbl name="parChTrans2D3">
+    <dgm:fillClrLst meth="repeat">
+      <a:schemeClr val="accent1"/>
+    </dgm:fillClrLst>
+    <dgm:linClrLst meth="repeat">
+      <a:schemeClr val="accent1"/>
+    </dgm:linClrLst>
+    <dgm:effectClrLst/>
+    <dgm:txLinClrLst/>
+    <dgm:txFillClrLst meth="repeat">
+      <a:schemeClr val="lt1"/>
+    </dgm:txFillClrLst>
+    <dgm:txEffectClrLst/>
+  </dgm:styleLbl>
+  <dgm:styleLbl name="parChTrans2D4">
+    <dgm:fillClrLst meth="repeat">
+      <a:schemeClr val="accent1"/>
+    </dgm:fillClrLst>
+    <dgm:linClrLst meth="repeat">
+      <a:schemeClr val="accent1"/>
+    </dgm:linClrLst>
+    <dgm:effectClrLst/>
+    <dgm:txLinClrLst/>
+    <dgm:txFillClrLst meth="repeat">
+      <a:schemeClr val="lt1"/>
+    </dgm:txFillClrLst>
+    <dgm:txEffectClrLst/>
+  </dgm:styleLbl>
+  <dgm:styleLbl name="parChTrans1D1">
+    <dgm:fillClrLst meth="repeat">
+      <a:schemeClr val="accent1"/>
+    </dgm:fillClrLst>
+    <dgm:linClrLst meth="repeat">
+      <a:schemeClr val="accent1">
+        <a:shade val="60000"/>
+      </a:schemeClr>
+    </dgm:linClrLst>
+    <dgm:effectClrLst/>
+    <dgm:txLinClrLst/>
+    <dgm:txFillClrLst meth="repeat">
+      <a:schemeClr val="tx1"/>
+    </dgm:txFillClrLst>
+    <dgm:txEffectClrLst/>
+  </dgm:styleLbl>
+  <dgm:styleLbl name="parChTrans1D2">
+    <dgm:fillClrLst meth="repeat">
+      <a:schemeClr val="accent1"/>
+    </dgm:fillClrLst>
+    <dgm:linClrLst meth="repeat">
+      <a:schemeClr val="accent1">
+        <a:shade val="60000"/>
+      </a:schemeClr>
+    </dgm:linClrLst>
+    <dgm:effectClrLst/>
+    <dgm:txLinClrLst/>
+    <dgm:txFillClrLst meth="repeat">
+      <a:schemeClr val="tx1"/>
+    </dgm:txFillClrLst>
+    <dgm:txEffectClrLst/>
+  </dgm:styleLbl>
+  <dgm:styleLbl name="parChTrans1D3">
+    <dgm:fillClrLst meth="repeat">
+      <a:schemeClr val="accent1"/>
+    </dgm:fillClrLst>
+    <dgm:linClrLst meth="repeat">
+      <a:schemeClr val="accent1">
+        <a:shade val="80000"/>
+      </a:schemeClr>
+    </dgm:linClrLst>
+    <dgm:effectClrLst/>
+    <dgm:txLinClrLst/>
+    <dgm:txFillClrLst meth="repeat">
+      <a:schemeClr val="tx1"/>
+    </dgm:txFillClrLst>
+    <dgm:txEffectClrLst/>
+  </dgm:styleLbl>
+  <dgm:styleLbl name="parChTrans1D4">
+    <dgm:fillClrLst meth="repeat">
+      <a:schemeClr val="accent1"/>
+    </dgm:fillClrLst>
+    <dgm:linClrLst meth="repeat">
+      <a:schemeClr val="accent1">
+        <a:shade val="80000"/>
+      </a:schemeClr>
+    </dgm:linClrLst>
+    <dgm:effectClrLst/>
+    <dgm:txLinClrLst/>
+    <dgm:txFillClrLst meth="repeat">
+      <a:schemeClr val="tx1"/>
+    </dgm:txFillClrLst>
+    <dgm:txEffectClrLst/>
+  </dgm:styleLbl>
+  <dgm:styleLbl name="fgAcc1">
+    <dgm:fillClrLst meth="repeat">
+      <a:schemeClr val="lt1">
+        <a:alpha val="90000"/>
+      </a:schemeClr>
+    </dgm:fillClrLst>
+    <dgm:linClrLst meth="repeat">
+      <a:schemeClr val="accent1"/>
+    </dgm:linClrLst>
+    <dgm:effectClrLst/>
+    <dgm:txLinClrLst/>
+    <dgm:txFillClrLst meth="repeat">
+      <a:schemeClr val="dk1"/>
+    </dgm:txFillClrLst>
+    <dgm:txEffectClrLst/>
+  </dgm:styleLbl>
+  <dgm:styleLbl name="conFgAcc1">
+    <dgm:fillClrLst meth="repeat">
+      <a:schemeClr val="lt1">
+        <a:alpha val="90000"/>
+      </a:schemeClr>
+    </dgm:fillClrLst>
+    <dgm:linClrLst meth="repeat">
+      <a:schemeClr val="accent1"/>
+    </dgm:linClrLst>
+    <dgm:effectClrLst/>
+    <dgm:txLinClrLst/>
+    <dgm:txFillClrLst meth="repeat">
+      <a:schemeClr val="dk1"/>
+    </dgm:txFillClrLst>
+    <dgm:txEffectClrLst/>
+  </dgm:styleLbl>
+  <dgm:styleLbl name="alignAcc1">
+    <dgm:fillClrLst meth="repeat">
+      <a:schemeClr val="lt1">
+        <a:alpha val="90000"/>
+      </a:schemeClr>
+    </dgm:fillClrLst>
+    <dgm:linClrLst meth="repeat">
+      <a:schemeClr val="accent1"/>
+    </dgm:linClrLst>
+    <dgm:effectClrLst/>
+    <dgm:txLinClrLst/>
+    <dgm:txFillClrLst meth="repeat">
+      <a:schemeClr val="dk1"/>
+    </dgm:txFillClrLst>
+    <dgm:txEffectClrLst/>
+  </dgm:styleLbl>
+  <dgm:styleLbl name="trAlignAcc1">
+    <dgm:fillClrLst meth="repeat">
+      <a:schemeClr val="lt1">
+        <a:alpha val="40000"/>
+      </a:schemeClr>
+    </dgm:fillClrLst>
+    <dgm:linClrLst meth="repeat">
+      <a:schemeClr val="accent1"/>
+    </dgm:linClrLst>
+    <dgm:effectClrLst/>
+    <dgm:txLinClrLst/>
+    <dgm:txFillClrLst meth="repeat">
+      <a:schemeClr val="dk1"/>
+    </dgm:txFillClrLst>
+    <dgm:txEffectClrLst/>
+  </dgm:styleLbl>
+  <dgm:styleLbl name="bgAcc1">
+    <dgm:fillClrLst meth="repeat">
+      <a:schemeClr val="lt1">
+        <a:alpha val="90000"/>
+      </a:schemeClr>
+    </dgm:fillClrLst>
+    <dgm:linClrLst meth="repeat">
+      <a:schemeClr val="accent1"/>
+    </dgm:linClrLst>
+    <dgm:effectClrLst/>
+    <dgm:txLinClrLst/>
+    <dgm:txFillClrLst meth="repeat">
+      <a:schemeClr val="dk1"/>
+    </dgm:txFillClrLst>
+    <dgm:txEffectClrLst/>
+  </dgm:styleLbl>
+  <dgm:styleLbl name="solidFgAcc1">
+    <dgm:fillClrLst meth="repeat">
+      <a:schemeClr val="lt1"/>
+    </dgm:fillClrLst>
+    <dgm:linClrLst meth="repeat">
+      <a:schemeClr val="accent1"/>
+    </dgm:linClrLst>
+    <dgm:effectClrLst/>
+    <dgm:txLinClrLst/>
+    <dgm:txFillClrLst meth="repeat">
+      <a:schemeClr val="dk1"/>
+    </dgm:txFillClrLst>
+    <dgm:txEffectClrLst/>
+  </dgm:styleLbl>
+  <dgm:styleLbl name="solidAlignAcc1">
+    <dgm:fillClrLst meth="repeat">
+      <a:schemeClr val="lt1"/>
+    </dgm:fillClrLst>
+    <dgm:linClrLst meth="repeat">
+      <a:schemeClr val="accent1"/>
+    </dgm:linClrLst>
+    <dgm:effectClrLst/>
+    <dgm:txLinClrLst/>
+    <dgm:txFillClrLst meth="repeat">
+      <a:schemeClr val="dk1"/>
+    </dgm:txFillClrLst>
+    <dgm:txEffectClrLst/>
+  </dgm:styleLbl>
+  <dgm:styleLbl name="solidBgAcc1">
+    <dgm:fillClrLst meth="repeat">
+      <a:schemeClr val="lt1"/>
+    </dgm:fillClrLst>
+    <dgm:linClrLst meth="repeat">
+      <a:schemeClr val="accent1"/>
+    </dgm:linClrLst>
+    <dgm:effectClrLst/>
+    <dgm:txLinClrLst/>
+    <dgm:txFillClrLst meth="repeat">
+      <a:schemeClr val="dk1"/>
+    </dgm:txFillClrLst>
+    <dgm:txEffectClrLst/>
+  </dgm:styleLbl>
+  <dgm:styleLbl name="fgAccFollowNode1">
+    <dgm:fillClrLst meth="repeat">
+      <a:schemeClr val="accent1">
+        <a:alpha val="90000"/>
+        <a:tint val="40000"/>
+      </a:schemeClr>
+    </dgm:fillClrLst>
+    <dgm:linClrLst meth="repeat">
+      <a:schemeClr val="accent1">
+        <a:alpha val="90000"/>
+        <a:tint val="40000"/>
+      </a:schemeClr>
+    </dgm:linClrLst>
+    <dgm:effectClrLst/>
+    <dgm:txLinClrLst/>
+    <dgm:txFillClrLst meth="repeat">
+      <a:schemeClr val="dk1"/>
+    </dgm:txFillClrLst>
+    <dgm:txEffectClrLst/>
+  </dgm:styleLbl>
+  <dgm:styleLbl name="alignAccFollowNode1">
+    <dgm:fillClrLst meth="repeat">
+      <a:schemeClr val="accent1">
+        <a:alpha val="90000"/>
+        <a:tint val="40000"/>
+      </a:schemeClr>
+    </dgm:fillClrLst>
+    <dgm:linClrLst meth="repeat">
+      <a:schemeClr val="accent1">
+        <a:alpha val="90000"/>
+        <a:tint val="40000"/>
+      </a:schemeClr>
+    </dgm:linClrLst>
+    <dgm:effectClrLst/>
+    <dgm:txLinClrLst/>
+    <dgm:txFillClrLst meth="repeat">
+      <a:schemeClr val="dk1"/>
+    </dgm:txFillClrLst>
+    <dgm:txEffectClrLst/>
+  </dgm:styleLbl>
+  <dgm:styleLbl name="bgAccFollowNode1">
+    <dgm:fillClrLst meth="repeat">
+      <a:schemeClr val="accent1">
+        <a:alpha val="90000"/>
+        <a:tint val="40000"/>
+      </a:schemeClr>
+    </dgm:fillClrLst>
+    <dgm:linClrLst meth="repeat">
+      <a:schemeClr val="accent1">
+        <a:alpha val="90000"/>
+        <a:tint val="40000"/>
+      </a:schemeClr>
+    </dgm:linClrLst>
+    <dgm:effectClrLst/>
+    <dgm:txLinClrLst/>
+    <dgm:txFillClrLst meth="repeat">
+      <a:schemeClr val="dk1"/>
+    </dgm:txFillClrLst>
+    <dgm:txEffectClrLst/>
+  </dgm:styleLbl>
+  <dgm:styleLbl name="fgAcc0">
+    <dgm:fillClrLst meth="repeat">
+      <a:schemeClr val="lt1">
+        <a:alpha val="90000"/>
+      </a:schemeClr>
+    </dgm:fillClrLst>
+    <dgm:linClrLst meth="repeat">
+      <a:schemeClr val="accent1"/>
+    </dgm:linClrLst>
+    <dgm:effectClrLst/>
+    <dgm:txLinClrLst/>
+    <dgm:txFillClrLst meth="repeat">
+      <a:schemeClr val="dk1"/>
+    </dgm:txFillClrLst>
+    <dgm:txEffectClrLst/>
+  </dgm:styleLbl>
+  <dgm:styleLbl name="fgAcc2">
+    <dgm:fillClrLst meth="repeat">
+      <a:schemeClr val="lt1">
+        <a:alpha val="90000"/>
+      </a:schemeClr>
+    </dgm:fillClrLst>
+    <dgm:linClrLst meth="repeat">
+      <a:schemeClr val="accent1"/>
+    </dgm:linClrLst>
+    <dgm:effectClrLst/>
+    <dgm:txLinClrLst/>
+    <dgm:txFillClrLst meth="repeat">
+      <a:schemeClr val="dk1"/>
+    </dgm:txFillClrLst>
+    <dgm:txEffectClrLst/>
+  </dgm:styleLbl>
+  <dgm:styleLbl name="fgAcc3">
+    <dgm:fillClrLst meth="repeat">
+      <a:schemeClr val="lt1">
+        <a:alpha val="90000"/>
+      </a:schemeClr>
+    </dgm:fillClrLst>
+    <dgm:linClrLst meth="repeat">
+      <a:schemeClr val="accent1"/>
+    </dgm:linClrLst>
+    <dgm:effectClrLst/>
+    <dgm:txLinClrLst/>
+    <dgm:txFillClrLst meth="repeat">
+      <a:schemeClr val="dk1"/>
+    </dgm:txFillClrLst>
+    <dgm:txEffectClrLst/>
+  </dgm:styleLbl>
+  <dgm:styleLbl name="fgAcc4">
+    <dgm:fillClrLst meth="repeat">
+      <a:schemeClr val="lt1">
+        <a:alpha val="90000"/>
+      </a:schemeClr>
+    </dgm:fillClrLst>
+    <dgm:linClrLst meth="repeat">
+      <a:schemeClr val="accent1"/>
+    </dgm:linClrLst>
+    <dgm:effectClrLst/>
+    <dgm:txLinClrLst/>
+    <dgm:txFillClrLst meth="repeat">
+      <a:schemeClr val="dk1"/>
+    </dgm:txFillClrLst>
+    <dgm:txEffectClrLst/>
+  </dgm:styleLbl>
+  <dgm:styleLbl name="bgShp">
+    <dgm:fillClrLst meth="repeat">
+      <a:schemeClr val="accent1">
+        <a:tint val="40000"/>
+      </a:schemeClr>
+    </dgm:fillClrLst>
+    <dgm:linClrLst meth="repeat">
+      <a:schemeClr val="accent1"/>
+    </dgm:linClrLst>
+    <dgm:effectClrLst/>
+    <dgm:txLinClrLst/>
+    <dgm:txFillClrLst meth="repeat">
+      <a:schemeClr val="dk1"/>
+    </dgm:txFillClrLst>
+    <dgm:txEffectClrLst/>
+  </dgm:styleLbl>
+  <dgm:styleLbl name="dkBgShp">
+    <dgm:fillClrLst meth="repeat">
+      <a:schemeClr val="accent1">
+        <a:shade val="80000"/>
+      </a:schemeClr>
+    </dgm:fillClrLst>
+    <dgm:linClrLst meth="repeat">
+      <a:schemeClr val="accent1"/>
+    </dgm:linClrLst>
+    <dgm:effectClrLst/>
+    <dgm:txLinClrLst/>
+    <dgm:txFillClrLst meth="repeat">
+      <a:schemeClr val="lt1"/>
+    </dgm:txFillClrLst>
+    <dgm:txEffectClrLst/>
+  </dgm:styleLbl>
+  <dgm:styleLbl name="trBgShp">
+    <dgm:fillClrLst meth="repeat">
+      <a:schemeClr val="accent1">
+        <a:tint val="50000"/>
+        <a:alpha val="40000"/>
+      </a:schemeClr>
+    </dgm:fillClrLst>
+    <dgm:linClrLst meth="repeat">
+      <a:schemeClr val="accent1"/>
+    </dgm:linClrLst>
+    <dgm:effectClrLst/>
+    <dgm:txLinClrLst/>
+    <dgm:txFillClrLst meth="repeat">
+      <a:schemeClr val="lt1"/>
+    </dgm:txFillClrLst>
+    <dgm:txEffectClrLst/>
+  </dgm:styleLbl>
+  <dgm:styleLbl name="fgShp">
+    <dgm:fillClrLst meth="repeat">
+      <a:schemeClr val="accent1">
+        <a:tint val="60000"/>
+      </a:schemeClr>
+    </dgm:fillClrLst>
+    <dgm:linClrLst meth="repeat">
+      <a:schemeClr val="lt1"/>
+    </dgm:linClrLst>
+    <dgm:effectClrLst/>
+    <dgm:txLinClrLst/>
+    <dgm:txFillClrLst meth="repeat">
+      <a:schemeClr val="dk1"/>
+    </dgm:txFillClrLst>
+    <dgm:txEffectClrLst/>
+  </dgm:styleLbl>
+  <dgm:styleLbl name="revTx">
+    <dgm:fillClrLst meth="repeat">
+      <a:schemeClr val="lt1">
+        <a:alpha val="0"/>
+      </a:schemeClr>
+    </dgm:fillClrLst>
+    <dgm:linClrLst meth="repeat">
+      <a:schemeClr val="dk1">
+        <a:alpha val="0"/>
+      </a:schemeClr>
+    </dgm:linClrLst>
+    <dgm:effectClrLst/>
+    <dgm:txLinClrLst/>
+    <dgm:txFillClrLst meth="repeat">
+      <a:schemeClr val="tx1"/>
+    </dgm:txFillClrLst>
+    <dgm:txEffectClrLst/>
+  </dgm:styleLbl>
+</dgm:colorsDef>
+</file>
+
+<file path=ppt/diagrams/colors18.xml><?xml version="1.0" encoding="utf-8"?>
 <dgm:colorsDef xmlns:dgm="http://schemas.openxmlformats.org/drawingml/2006/diagram" xmlns:a="http://schemas.openxmlformats.org/drawingml/2006/main" uniqueId="urn:microsoft.com/office/officeart/2005/8/colors/accent1_2">
   <dgm:title val=""/>
   <dgm:desc val=""/>
@@ -14166,8 +14914,8 @@
     <dgm:cxn modelId="{1E2AC893-2C52-4BC4-9D99-436745CEBA38}" srcId="{39EB69AF-086C-4F08-9188-08B527843E3B}" destId="{291E5144-73A5-486F-9193-5D319AF3BE45}" srcOrd="5" destOrd="0" parTransId="{7FF10263-9F84-4265-A544-45D5CD0870B9}" sibTransId="{32686A01-99A6-4708-99AA-0C32E7270378}"/>
     <dgm:cxn modelId="{9B480DC6-37BB-4A56-BFFD-379E0DC4E0D1}" srcId="{BF89F98F-0A80-4F30-9DE4-C088946202B7}" destId="{39EB69AF-086C-4F08-9188-08B527843E3B}" srcOrd="1" destOrd="0" parTransId="{43FF8FF7-5F46-4F86-BFF0-CC138300F95E}" sibTransId="{D834F24A-157C-40CD-9171-3F3F6C20FE73}"/>
     <dgm:cxn modelId="{21119AE2-F8F5-43A1-AAC0-CA15116ECB60}" type="presOf" srcId="{EF1E942D-56A6-41D5-87CA-926DDE1172C7}" destId="{0670FEEE-F7AF-4AED-9012-363BC48189C2}" srcOrd="0" destOrd="2" presId="urn:microsoft.com/office/officeart/2005/8/layout/vList5"/>
+    <dgm:cxn modelId="{082F0C55-B4F9-4695-98C5-D7CDE2BCE3E2}" type="presOf" srcId="{6791B8C0-D89E-4C6D-8AFD-C5F0C0B2E2A5}" destId="{0670FEEE-F7AF-4AED-9012-363BC48189C2}" srcOrd="0" destOrd="10" presId="urn:microsoft.com/office/officeart/2005/8/layout/vList5"/>
     <dgm:cxn modelId="{D074C638-F60F-4CD9-9634-0B5E122BB25B}" type="presOf" srcId="{39EB69AF-086C-4F08-9188-08B527843E3B}" destId="{5AC14FB5-BFFF-42E7-80BB-5CB2D5CC2E48}" srcOrd="0" destOrd="0" presId="urn:microsoft.com/office/officeart/2005/8/layout/vList5"/>
-    <dgm:cxn modelId="{082F0C55-B4F9-4695-98C5-D7CDE2BCE3E2}" type="presOf" srcId="{6791B8C0-D89E-4C6D-8AFD-C5F0C0B2E2A5}" destId="{0670FEEE-F7AF-4AED-9012-363BC48189C2}" srcOrd="0" destOrd="10" presId="urn:microsoft.com/office/officeart/2005/8/layout/vList5"/>
     <dgm:cxn modelId="{4BA3B278-F188-4FBC-9961-F1FBAE94836D}" srcId="{39EB69AF-086C-4F08-9188-08B527843E3B}" destId="{450BB2FB-E6F5-4FB7-932E-985994FE6A80}" srcOrd="1" destOrd="0" parTransId="{9A8D3FB4-1BED-4DED-A73B-C395FE3D44B0}" sibTransId="{913C64AA-B237-46F8-B125-7E6DEB138BC7}"/>
     <dgm:cxn modelId="{CDF7D60D-F239-44F7-80BC-B1C7467AAF90}" srcId="{39EB69AF-086C-4F08-9188-08B527843E3B}" destId="{0FDEBC16-D2EE-4981-A9DD-8092B8DE080A}" srcOrd="3" destOrd="0" parTransId="{ECA42086-11D5-47B9-AA4D-5F99A86E126E}" sibTransId="{94D33C98-09C9-473F-A343-4EC4A6A23F6B}"/>
     <dgm:cxn modelId="{A6FF804A-A5C1-4128-9226-14ABC5BA69FD}" type="presParOf" srcId="{95ABC759-3090-4CC9-B73B-90342CFBB381}" destId="{5B413501-42AE-40DD-BC1B-BCC50F73FD3C}" srcOrd="0" destOrd="0" presId="urn:microsoft.com/office/officeart/2005/8/layout/vList5"/>
@@ -15457,13 +16205,13 @@
         <a:lstStyle/>
         <a:p>
           <a:r>
-            <a:rPr lang="en-US" sz="1800" dirty="0" smtClean="0">
+            <a:rPr lang="en-US" sz="1600" dirty="0" smtClean="0">
               <a:latin typeface="Times New Roman" pitchFamily="18" charset="0"/>
               <a:cs typeface="Times New Roman" pitchFamily="18" charset="0"/>
             </a:rPr>
             <a:t>FSDB</a:t>
           </a:r>
-          <a:endParaRPr lang="en-US" sz="1800" dirty="0">
+          <a:endParaRPr lang="en-US" sz="1600" dirty="0">
             <a:latin typeface="Times New Roman" pitchFamily="18" charset="0"/>
             <a:cs typeface="Times New Roman" pitchFamily="18" charset="0"/>
           </a:endParaRPr>
@@ -15477,7 +16225,7 @@
         <a:bodyPr/>
         <a:lstStyle/>
         <a:p>
-          <a:endParaRPr lang="en-US"/>
+          <a:endParaRPr lang="en-US" sz="1600"/>
         </a:p>
       </dgm:t>
     </dgm:pt>
@@ -15488,7 +16236,7 @@
         <a:bodyPr/>
         <a:lstStyle/>
         <a:p>
-          <a:endParaRPr lang="en-US"/>
+          <a:endParaRPr lang="en-US" sz="1600"/>
         </a:p>
       </dgm:t>
     </dgm:pt>
@@ -15500,13 +16248,13 @@
         <a:lstStyle/>
         <a:p>
           <a:r>
-            <a:rPr lang="en-US" sz="1800" dirty="0" smtClean="0">
+            <a:rPr lang="en-US" sz="1600" dirty="0" smtClean="0">
               <a:latin typeface="Times New Roman" pitchFamily="18" charset="0"/>
               <a:cs typeface="Times New Roman" pitchFamily="18" charset="0"/>
             </a:rPr>
             <a:t>FSDB API provided by Verdi</a:t>
           </a:r>
-          <a:endParaRPr lang="en-US" sz="1800" dirty="0">
+          <a:endParaRPr lang="en-US" sz="1600" dirty="0">
             <a:latin typeface="Times New Roman" pitchFamily="18" charset="0"/>
             <a:cs typeface="Times New Roman" pitchFamily="18" charset="0"/>
           </a:endParaRPr>
@@ -15520,7 +16268,7 @@
         <a:bodyPr/>
         <a:lstStyle/>
         <a:p>
-          <a:endParaRPr lang="en-US"/>
+          <a:endParaRPr lang="en-US" sz="1600"/>
         </a:p>
       </dgm:t>
     </dgm:pt>
@@ -15531,7 +16279,7 @@
         <a:bodyPr/>
         <a:lstStyle/>
         <a:p>
-          <a:endParaRPr lang="en-US"/>
+          <a:endParaRPr lang="en-US" sz="1600"/>
         </a:p>
       </dgm:t>
     </dgm:pt>
@@ -15543,13 +16291,13 @@
         <a:lstStyle/>
         <a:p>
           <a:r>
-            <a:rPr lang="en-US" sz="1800" dirty="0" smtClean="0">
+            <a:rPr lang="en-US" sz="1600" dirty="0" smtClean="0">
               <a:latin typeface="Times New Roman" pitchFamily="18" charset="0"/>
               <a:cs typeface="Times New Roman" pitchFamily="18" charset="0"/>
             </a:rPr>
             <a:t>C++ routines to access FSDB values in time-based fashion</a:t>
           </a:r>
-          <a:endParaRPr lang="en-US" sz="1800" dirty="0">
+          <a:endParaRPr lang="en-US" sz="1600" dirty="0">
             <a:latin typeface="Times New Roman" pitchFamily="18" charset="0"/>
             <a:cs typeface="Times New Roman" pitchFamily="18" charset="0"/>
           </a:endParaRPr>
@@ -15563,7 +16311,7 @@
         <a:bodyPr/>
         <a:lstStyle/>
         <a:p>
-          <a:endParaRPr lang="en-US"/>
+          <a:endParaRPr lang="en-US" sz="1600"/>
         </a:p>
       </dgm:t>
     </dgm:pt>
@@ -15574,7 +16322,7 @@
         <a:bodyPr/>
         <a:lstStyle/>
         <a:p>
-          <a:endParaRPr lang="en-US"/>
+          <a:endParaRPr lang="en-US" sz="1600"/>
         </a:p>
       </dgm:t>
     </dgm:pt>
@@ -15586,20 +16334,20 @@
         <a:lstStyle/>
         <a:p>
           <a:r>
-            <a:rPr lang="en-US" sz="1800" dirty="0" err="1" smtClean="0">
+            <a:rPr lang="en-US" sz="1600" dirty="0" err="1" smtClean="0">
               <a:latin typeface="Times New Roman" pitchFamily="18" charset="0"/>
               <a:cs typeface="Times New Roman" pitchFamily="18" charset="0"/>
             </a:rPr>
             <a:t>Netlist</a:t>
           </a:r>
           <a:r>
-            <a:rPr lang="en-US" sz="1800" dirty="0" smtClean="0">
+            <a:rPr lang="en-US" sz="1600" dirty="0" smtClean="0">
               <a:latin typeface="Times New Roman" pitchFamily="18" charset="0"/>
               <a:cs typeface="Times New Roman" pitchFamily="18" charset="0"/>
             </a:rPr>
             <a:t> Simulation</a:t>
           </a:r>
-          <a:endParaRPr lang="en-US" sz="1800" dirty="0">
+          <a:endParaRPr lang="en-US" sz="1600" dirty="0">
             <a:latin typeface="Times New Roman" pitchFamily="18" charset="0"/>
             <a:cs typeface="Times New Roman" pitchFamily="18" charset="0"/>
           </a:endParaRPr>
@@ -15613,7 +16361,7 @@
         <a:bodyPr/>
         <a:lstStyle/>
         <a:p>
-          <a:endParaRPr lang="en-US"/>
+          <a:endParaRPr lang="en-US" sz="1600"/>
         </a:p>
       </dgm:t>
     </dgm:pt>
@@ -15624,7 +16372,7 @@
         <a:bodyPr/>
         <a:lstStyle/>
         <a:p>
-          <a:endParaRPr lang="en-US"/>
+          <a:endParaRPr lang="en-US" sz="1600"/>
         </a:p>
       </dgm:t>
     </dgm:pt>
@@ -15636,13 +16384,13 @@
         <a:lstStyle/>
         <a:p>
           <a:r>
-            <a:rPr lang="en-US" sz="1800" dirty="0" smtClean="0">
+            <a:rPr lang="en-US" sz="1600" dirty="0" smtClean="0">
               <a:latin typeface="Times New Roman" pitchFamily="18" charset="0"/>
               <a:cs typeface="Times New Roman" pitchFamily="18" charset="0"/>
             </a:rPr>
             <a:t>Convert values in FSDB format to DKI format</a:t>
           </a:r>
-          <a:endParaRPr lang="en-US" sz="1800" dirty="0">
+          <a:endParaRPr lang="en-US" sz="1600" dirty="0">
             <a:latin typeface="Times New Roman" pitchFamily="18" charset="0"/>
             <a:cs typeface="Times New Roman" pitchFamily="18" charset="0"/>
           </a:endParaRPr>
@@ -15656,7 +16404,7 @@
         <a:bodyPr/>
         <a:lstStyle/>
         <a:p>
-          <a:endParaRPr lang="en-US"/>
+          <a:endParaRPr lang="en-US" sz="1600"/>
         </a:p>
       </dgm:t>
     </dgm:pt>
@@ -15667,7 +16415,50 @@
         <a:bodyPr/>
         <a:lstStyle/>
         <a:p>
-          <a:endParaRPr lang="en-US"/>
+          <a:endParaRPr lang="en-US" sz="1600"/>
+        </a:p>
+      </dgm:t>
+    </dgm:pt>
+    <dgm:pt modelId="{591858FA-CEA1-49DB-AA82-438469D3826A}">
+      <dgm:prSet custT="1"/>
+      <dgm:spPr/>
+      <dgm:t>
+        <a:bodyPr/>
+        <a:lstStyle/>
+        <a:p>
+          <a:r>
+            <a:rPr lang="en-US" sz="1600" dirty="0" smtClean="0">
+              <a:latin typeface="Times New Roman" pitchFamily="18" charset="0"/>
+              <a:cs typeface="Times New Roman" pitchFamily="18" charset="0"/>
+            </a:rPr>
+            <a:t>PLI time based callbacks</a:t>
+          </a:r>
+          <a:endParaRPr lang="en-US" sz="1600" dirty="0">
+            <a:latin typeface="Times New Roman" pitchFamily="18" charset="0"/>
+            <a:cs typeface="Times New Roman" pitchFamily="18" charset="0"/>
+          </a:endParaRPr>
+        </a:p>
+      </dgm:t>
+    </dgm:pt>
+    <dgm:pt modelId="{BA6EE62F-8B1B-4509-930B-AF3B7537FCC1}" type="parTrans" cxnId="{7169B53C-752E-4DDC-818C-F8FCF96FD70D}">
+      <dgm:prSet/>
+      <dgm:spPr/>
+      <dgm:t>
+        <a:bodyPr/>
+        <a:lstStyle/>
+        <a:p>
+          <a:endParaRPr lang="en-US" sz="1600"/>
+        </a:p>
+      </dgm:t>
+    </dgm:pt>
+    <dgm:pt modelId="{9E1EB3D1-8528-4878-B3CD-6205482E52F0}" type="sibTrans" cxnId="{7169B53C-752E-4DDC-818C-F8FCF96FD70D}">
+      <dgm:prSet/>
+      <dgm:spPr/>
+      <dgm:t>
+        <a:bodyPr/>
+        <a:lstStyle/>
+        <a:p>
+          <a:endParaRPr lang="en-US" sz="1600"/>
         </a:p>
       </dgm:t>
     </dgm:pt>
@@ -15688,7 +16479,7 @@
       </dgm:t>
     </dgm:pt>
     <dgm:pt modelId="{636A51F0-6295-4CA8-96A6-0D169E362853}" type="pres">
-      <dgm:prSet presAssocID="{E25F5A64-D615-441D-871C-2F98FD45C38A}" presName="Name5" presStyleLbl="vennNode1" presStyleIdx="0" presStyleCnt="5">
+      <dgm:prSet presAssocID="{E25F5A64-D615-441D-871C-2F98FD45C38A}" presName="Name5" presStyleLbl="vennNode1" presStyleIdx="0" presStyleCnt="6">
         <dgm:presLayoutVars>
           <dgm:bulletEnabled val="1"/>
         </dgm:presLayoutVars>
@@ -15714,7 +16505,7 @@
       </dgm:t>
     </dgm:pt>
     <dgm:pt modelId="{2F16B66C-A703-43E0-A87B-BDB5F215B3EC}" type="pres">
-      <dgm:prSet presAssocID="{8D4367E3-2529-46A2-BC03-6C4D59C546CF}" presName="Name5" presStyleLbl="vennNode1" presStyleIdx="1" presStyleCnt="5">
+      <dgm:prSet presAssocID="{8D4367E3-2529-46A2-BC03-6C4D59C546CF}" presName="Name5" presStyleLbl="vennNode1" presStyleIdx="1" presStyleCnt="6">
         <dgm:presLayoutVars>
           <dgm:bulletEnabled val="1"/>
         </dgm:presLayoutVars>
@@ -15740,7 +16531,7 @@
       </dgm:t>
     </dgm:pt>
     <dgm:pt modelId="{ABFAB522-FA90-4144-98B8-19AD84267685}" type="pres">
-      <dgm:prSet presAssocID="{903A2478-20BB-4411-84C2-B0FA529AAB60}" presName="Name5" presStyleLbl="vennNode1" presStyleIdx="2" presStyleCnt="5">
+      <dgm:prSet presAssocID="{903A2478-20BB-4411-84C2-B0FA529AAB60}" presName="Name5" presStyleLbl="vennNode1" presStyleIdx="2" presStyleCnt="6">
         <dgm:presLayoutVars>
           <dgm:bulletEnabled val="1"/>
         </dgm:presLayoutVars>
@@ -15766,7 +16557,7 @@
       </dgm:t>
     </dgm:pt>
     <dgm:pt modelId="{3DD52E65-2217-47DF-A607-061BC38D9280}" type="pres">
-      <dgm:prSet presAssocID="{59EF23FB-0B82-43C1-9B8D-4699E675E0FB}" presName="Name5" presStyleLbl="vennNode1" presStyleIdx="3" presStyleCnt="5">
+      <dgm:prSet presAssocID="{59EF23FB-0B82-43C1-9B8D-4699E675E0FB}" presName="Name5" presStyleLbl="vennNode1" presStyleIdx="3" presStyleCnt="6">
         <dgm:presLayoutVars>
           <dgm:bulletEnabled val="1"/>
         </dgm:presLayoutVars>
@@ -15791,8 +16582,27 @@
         </a:p>
       </dgm:t>
     </dgm:pt>
+    <dgm:pt modelId="{0EB00A86-5C8D-4D03-B6AD-4EF11F5D25B3}" type="pres">
+      <dgm:prSet presAssocID="{591858FA-CEA1-49DB-AA82-438469D3826A}" presName="Name5" presStyleLbl="vennNode1" presStyleIdx="4" presStyleCnt="6">
+        <dgm:presLayoutVars>
+          <dgm:bulletEnabled val="1"/>
+        </dgm:presLayoutVars>
+      </dgm:prSet>
+      <dgm:spPr/>
+      <dgm:t>
+        <a:bodyPr/>
+        <a:lstStyle/>
+        <a:p>
+          <a:endParaRPr lang="en-US"/>
+        </a:p>
+      </dgm:t>
+    </dgm:pt>
+    <dgm:pt modelId="{A9BD37DC-F47F-4D86-8F35-A88C1940B8E0}" type="pres">
+      <dgm:prSet presAssocID="{9E1EB3D1-8528-4878-B3CD-6205482E52F0}" presName="space" presStyleCnt="0"/>
+      <dgm:spPr/>
+    </dgm:pt>
     <dgm:pt modelId="{A9CDDF6E-DECC-441B-AB37-2DFAEC4BAD99}" type="pres">
-      <dgm:prSet presAssocID="{3A89A78D-EEE5-4464-ADCA-9AE16F74A365}" presName="Name5" presStyleLbl="vennNode1" presStyleIdx="4" presStyleCnt="5">
+      <dgm:prSet presAssocID="{3A89A78D-EEE5-4464-ADCA-9AE16F74A365}" presName="Name5" presStyleLbl="vennNode1" presStyleIdx="5" presStyleCnt="6">
         <dgm:presLayoutVars>
           <dgm:bulletEnabled val="1"/>
         </dgm:presLayoutVars>
@@ -15815,10 +16625,12 @@
     <dgm:cxn modelId="{6AF896A6-0BAA-4ABD-BAAB-3FA15BC652A6}" type="presOf" srcId="{831A9A8B-77DF-458C-89B9-01BFAFC31E59}" destId="{094B4B43-B41C-40A1-B00E-AA52CC6575B8}" srcOrd="0" destOrd="0" presId="urn:microsoft.com/office/officeart/2005/8/layout/venn3"/>
     <dgm:cxn modelId="{31ADECD6-5F27-47CB-BCD0-8F4E585D7057}" type="presOf" srcId="{3A89A78D-EEE5-4464-ADCA-9AE16F74A365}" destId="{A9CDDF6E-DECC-441B-AB37-2DFAEC4BAD99}" srcOrd="0" destOrd="0" presId="urn:microsoft.com/office/officeart/2005/8/layout/venn3"/>
     <dgm:cxn modelId="{F8E55061-8FDB-4783-9BF9-6A540F478B05}" srcId="{831A9A8B-77DF-458C-89B9-01BFAFC31E59}" destId="{E25F5A64-D615-441D-871C-2F98FD45C38A}" srcOrd="0" destOrd="0" parTransId="{B8EE3BAE-AA5D-4B1B-9C07-8397D778A849}" sibTransId="{1963EF57-0EF1-4E2B-AB07-F7B9A2C9E0FB}"/>
-    <dgm:cxn modelId="{90C85B38-1D44-49ED-8A2B-0A933E964438}" srcId="{831A9A8B-77DF-458C-89B9-01BFAFC31E59}" destId="{3A89A78D-EEE5-4464-ADCA-9AE16F74A365}" srcOrd="4" destOrd="0" parTransId="{74F48581-1E01-4A29-BA3D-9E7CE457BE5D}" sibTransId="{F75D59D3-2836-48C5-A1BA-1DE86FCF6BD4}"/>
+    <dgm:cxn modelId="{90C85B38-1D44-49ED-8A2B-0A933E964438}" srcId="{831A9A8B-77DF-458C-89B9-01BFAFC31E59}" destId="{3A89A78D-EEE5-4464-ADCA-9AE16F74A365}" srcOrd="5" destOrd="0" parTransId="{74F48581-1E01-4A29-BA3D-9E7CE457BE5D}" sibTransId="{F75D59D3-2836-48C5-A1BA-1DE86FCF6BD4}"/>
+    <dgm:cxn modelId="{CBEB3635-8FE8-4607-8764-B3043095733F}" type="presOf" srcId="{591858FA-CEA1-49DB-AA82-438469D3826A}" destId="{0EB00A86-5C8D-4D03-B6AD-4EF11F5D25B3}" srcOrd="0" destOrd="0" presId="urn:microsoft.com/office/officeart/2005/8/layout/venn3"/>
     <dgm:cxn modelId="{043F98C3-41AC-4DA4-9386-54A271E4117E}" srcId="{831A9A8B-77DF-458C-89B9-01BFAFC31E59}" destId="{59EF23FB-0B82-43C1-9B8D-4699E675E0FB}" srcOrd="3" destOrd="0" parTransId="{815E8CDB-5D28-42DA-ABE4-32730E73959A}" sibTransId="{832EE177-EFB4-48EF-8E82-41D14DE19A0A}"/>
     <dgm:cxn modelId="{0B6C47A8-1E54-409E-9D64-3A3DBE8B3CD0}" type="presOf" srcId="{903A2478-20BB-4411-84C2-B0FA529AAB60}" destId="{ABFAB522-FA90-4144-98B8-19AD84267685}" srcOrd="0" destOrd="0" presId="urn:microsoft.com/office/officeart/2005/8/layout/venn3"/>
     <dgm:cxn modelId="{DAC2B495-1E4A-4377-9782-74C5FE6A6270}" srcId="{831A9A8B-77DF-458C-89B9-01BFAFC31E59}" destId="{903A2478-20BB-4411-84C2-B0FA529AAB60}" srcOrd="2" destOrd="0" parTransId="{BA30126A-2109-450B-A7E9-C81E535B66B5}" sibTransId="{02820742-A529-4E00-A6F6-204773384FF8}"/>
+    <dgm:cxn modelId="{7169B53C-752E-4DDC-818C-F8FCF96FD70D}" srcId="{831A9A8B-77DF-458C-89B9-01BFAFC31E59}" destId="{591858FA-CEA1-49DB-AA82-438469D3826A}" srcOrd="4" destOrd="0" parTransId="{BA6EE62F-8B1B-4509-930B-AF3B7537FCC1}" sibTransId="{9E1EB3D1-8528-4878-B3CD-6205482E52F0}"/>
     <dgm:cxn modelId="{48646377-5B48-4CC9-AF37-9D3EC4045BFC}" type="presParOf" srcId="{094B4B43-B41C-40A1-B00E-AA52CC6575B8}" destId="{636A51F0-6295-4CA8-96A6-0D169E362853}" srcOrd="0" destOrd="0" presId="urn:microsoft.com/office/officeart/2005/8/layout/venn3"/>
     <dgm:cxn modelId="{85421499-732C-44DD-9DF3-85297A0C4015}" type="presParOf" srcId="{094B4B43-B41C-40A1-B00E-AA52CC6575B8}" destId="{B03C5855-C102-4D49-B477-DE1D3ABA0085}" srcOrd="1" destOrd="0" presId="urn:microsoft.com/office/officeart/2005/8/layout/venn3"/>
     <dgm:cxn modelId="{272054C9-3737-4F8C-AF50-B7BCC830A9DC}" type="presParOf" srcId="{094B4B43-B41C-40A1-B00E-AA52CC6575B8}" destId="{2F16B66C-A703-43E0-A87B-BDB5F215B3EC}" srcOrd="2" destOrd="0" presId="urn:microsoft.com/office/officeart/2005/8/layout/venn3"/>
@@ -15827,7 +16639,9 @@
     <dgm:cxn modelId="{A96B9452-8B22-42D0-ACB3-698820568762}" type="presParOf" srcId="{094B4B43-B41C-40A1-B00E-AA52CC6575B8}" destId="{B469077B-DCE2-41AD-A4E5-288EC13F9980}" srcOrd="5" destOrd="0" presId="urn:microsoft.com/office/officeart/2005/8/layout/venn3"/>
     <dgm:cxn modelId="{CCF27CFF-1E87-4A11-899E-337359C29F46}" type="presParOf" srcId="{094B4B43-B41C-40A1-B00E-AA52CC6575B8}" destId="{3DD52E65-2217-47DF-A607-061BC38D9280}" srcOrd="6" destOrd="0" presId="urn:microsoft.com/office/officeart/2005/8/layout/venn3"/>
     <dgm:cxn modelId="{0DC167EF-B0EB-4D4D-9195-F9E7CA672D72}" type="presParOf" srcId="{094B4B43-B41C-40A1-B00E-AA52CC6575B8}" destId="{1F3BE61F-DC6A-4B1E-BE4D-051018D41823}" srcOrd="7" destOrd="0" presId="urn:microsoft.com/office/officeart/2005/8/layout/venn3"/>
-    <dgm:cxn modelId="{598DB3B1-0C0A-4480-B01D-9D48B3E48E16}" type="presParOf" srcId="{094B4B43-B41C-40A1-B00E-AA52CC6575B8}" destId="{A9CDDF6E-DECC-441B-AB37-2DFAEC4BAD99}" srcOrd="8" destOrd="0" presId="urn:microsoft.com/office/officeart/2005/8/layout/venn3"/>
+    <dgm:cxn modelId="{9927FF2A-05C8-47F7-8DC7-07DD5870DA6F}" type="presParOf" srcId="{094B4B43-B41C-40A1-B00E-AA52CC6575B8}" destId="{0EB00A86-5C8D-4D03-B6AD-4EF11F5D25B3}" srcOrd="8" destOrd="0" presId="urn:microsoft.com/office/officeart/2005/8/layout/venn3"/>
+    <dgm:cxn modelId="{FB0E5377-21D2-4BED-96B7-CED7200B6530}" type="presParOf" srcId="{094B4B43-B41C-40A1-B00E-AA52CC6575B8}" destId="{A9BD37DC-F47F-4D86-8F35-A88C1940B8E0}" srcOrd="9" destOrd="0" presId="urn:microsoft.com/office/officeart/2005/8/layout/venn3"/>
+    <dgm:cxn modelId="{598DB3B1-0C0A-4480-B01D-9D48B3E48E16}" type="presParOf" srcId="{094B4B43-B41C-40A1-B00E-AA52CC6575B8}" destId="{A9CDDF6E-DECC-441B-AB37-2DFAEC4BAD99}" srcOrd="10" destOrd="0" presId="urn:microsoft.com/office/officeart/2005/8/layout/venn3"/>
   </dgm:cxnLst>
   <dgm:bg/>
   <dgm:whole/>
@@ -16040,6 +16854,591 @@
     <dgm:cxn modelId="{AE20B47C-9640-4760-A9C3-2D94C5021A87}" type="presParOf" srcId="{E9C5A999-3778-4121-B93D-10AC77B59712}" destId="{60818678-16B8-424C-B058-4B37B19986DD}" srcOrd="1" destOrd="0" presId="urn:microsoft.com/office/officeart/2005/8/layout/radial5"/>
     <dgm:cxn modelId="{41B22264-8350-486C-A543-4FB3E75FCFAA}" type="presParOf" srcId="{60818678-16B8-424C-B058-4B37B19986DD}" destId="{515CDF60-CC45-4FBD-BFD0-1A94A474E676}" srcOrd="0" destOrd="0" presId="urn:microsoft.com/office/officeart/2005/8/layout/radial5"/>
     <dgm:cxn modelId="{2F43E4FD-E844-47FE-93B8-C46DF7C07DFA}" type="presParOf" srcId="{E9C5A999-3778-4121-B93D-10AC77B59712}" destId="{4EAF56E9-1DD7-4CB7-87A1-A24E0435FB05}" srcOrd="2" destOrd="0" presId="urn:microsoft.com/office/officeart/2005/8/layout/radial5"/>
+  </dgm:cxnLst>
+  <dgm:bg/>
+  <dgm:whole/>
+  <dgm:extLst>
+    <a:ext uri="http://schemas.microsoft.com/office/drawing/2008/diagram">
+      <dsp:dataModelExt xmlns:dsp="http://schemas.microsoft.com/office/drawing/2008/diagram" xmlns="" relId="rId7" minVer="http://schemas.openxmlformats.org/drawingml/2006/diagram"/>
+    </a:ext>
+  </dgm:extLst>
+</dgm:dataModel>
+</file>
+
+<file path=ppt/diagrams/data18.xml><?xml version="1.0" encoding="utf-8"?>
+<dgm:dataModel xmlns:dgm="http://schemas.openxmlformats.org/drawingml/2006/diagram" xmlns:a="http://schemas.openxmlformats.org/drawingml/2006/main">
+  <dgm:ptLst>
+    <dgm:pt modelId="{0263801E-6BF4-4BC6-88F6-3A681B6F0256}" type="doc">
+      <dgm:prSet loTypeId="urn:microsoft.com/office/officeart/2005/8/layout/hProcess6" loCatId="process" qsTypeId="urn:microsoft.com/office/officeart/2005/8/quickstyle/simple1" qsCatId="simple" csTypeId="urn:microsoft.com/office/officeart/2005/8/colors/accent1_2" csCatId="accent1" phldr="1"/>
+      <dgm:spPr/>
+      <dgm:t>
+        <a:bodyPr/>
+        <a:lstStyle/>
+        <a:p>
+          <a:endParaRPr lang="en-US"/>
+        </a:p>
+      </dgm:t>
+    </dgm:pt>
+    <dgm:pt modelId="{0D53AE23-7B1D-4F75-B0C9-811ADD1450E5}">
+      <dgm:prSet phldrT="[Text]"/>
+      <dgm:spPr/>
+      <dgm:t>
+        <a:bodyPr/>
+        <a:lstStyle/>
+        <a:p>
+          <a:r>
+            <a:rPr lang="en-US" dirty="0" smtClean="0"/>
+            <a:t>Time </a:t>
+          </a:r>
+          <a:r>
+            <a:rPr lang="en-US" dirty="0" smtClean="0"/>
+            <a:t>‘M’</a:t>
+          </a:r>
+          <a:endParaRPr lang="en-US" dirty="0"/>
+        </a:p>
+      </dgm:t>
+    </dgm:pt>
+    <dgm:pt modelId="{B3190658-5D0B-48A2-A545-BB51AA06FA98}" type="parTrans" cxnId="{1233550D-C6C3-4196-A684-C3854D2ABC54}">
+      <dgm:prSet/>
+      <dgm:spPr/>
+      <dgm:t>
+        <a:bodyPr/>
+        <a:lstStyle/>
+        <a:p>
+          <a:endParaRPr lang="en-US"/>
+        </a:p>
+      </dgm:t>
+    </dgm:pt>
+    <dgm:pt modelId="{F96C9355-A67A-4A46-A16F-5C578B20ACE8}" type="sibTrans" cxnId="{1233550D-C6C3-4196-A684-C3854D2ABC54}">
+      <dgm:prSet/>
+      <dgm:spPr/>
+      <dgm:t>
+        <a:bodyPr/>
+        <a:lstStyle/>
+        <a:p>
+          <a:endParaRPr lang="en-US"/>
+        </a:p>
+      </dgm:t>
+    </dgm:pt>
+    <dgm:pt modelId="{42914ECB-5E6C-47FC-81AC-C7B39E261CA1}">
+      <dgm:prSet phldrT="[Text]"/>
+      <dgm:spPr/>
+      <dgm:t>
+        <a:bodyPr/>
+        <a:lstStyle/>
+        <a:p>
+          <a:r>
+            <a:rPr lang="en-US" dirty="0" smtClean="0"/>
+            <a:t>Apply Stimulus</a:t>
+          </a:r>
+          <a:endParaRPr lang="en-US" dirty="0"/>
+        </a:p>
+      </dgm:t>
+    </dgm:pt>
+    <dgm:pt modelId="{C59DD97D-EF86-481A-9CD8-0E48CA3429CD}" type="parTrans" cxnId="{BABF9A86-9440-4EF0-AD1C-A244B024DCED}">
+      <dgm:prSet/>
+      <dgm:spPr/>
+      <dgm:t>
+        <a:bodyPr/>
+        <a:lstStyle/>
+        <a:p>
+          <a:endParaRPr lang="en-US"/>
+        </a:p>
+      </dgm:t>
+    </dgm:pt>
+    <dgm:pt modelId="{2C9D62BB-5518-4933-B246-B80C666EC721}" type="sibTrans" cxnId="{BABF9A86-9440-4EF0-AD1C-A244B024DCED}">
+      <dgm:prSet/>
+      <dgm:spPr/>
+      <dgm:t>
+        <a:bodyPr/>
+        <a:lstStyle/>
+        <a:p>
+          <a:endParaRPr lang="en-US"/>
+        </a:p>
+      </dgm:t>
+    </dgm:pt>
+    <dgm:pt modelId="{38B1D2F8-D4C9-4A1E-825D-21E7A5CB8BD1}">
+      <dgm:prSet phldrT="[Text]"/>
+      <dgm:spPr/>
+      <dgm:t>
+        <a:bodyPr/>
+        <a:lstStyle/>
+        <a:p>
+          <a:r>
+            <a:rPr lang="en-US" dirty="0" smtClean="0"/>
+            <a:t>Simulation Proceeds</a:t>
+          </a:r>
+          <a:endParaRPr lang="en-US" dirty="0"/>
+        </a:p>
+      </dgm:t>
+    </dgm:pt>
+    <dgm:pt modelId="{9BBFA439-77D4-4339-ACB7-CD36D005FA14}" type="parTrans" cxnId="{DAB32686-8279-4417-B321-F5EDF66703C6}">
+      <dgm:prSet/>
+      <dgm:spPr/>
+      <dgm:t>
+        <a:bodyPr/>
+        <a:lstStyle/>
+        <a:p>
+          <a:endParaRPr lang="en-US"/>
+        </a:p>
+      </dgm:t>
+    </dgm:pt>
+    <dgm:pt modelId="{CD6B4CBD-B420-4C45-A6F6-470370C462DB}" type="sibTrans" cxnId="{DAB32686-8279-4417-B321-F5EDF66703C6}">
+      <dgm:prSet/>
+      <dgm:spPr/>
+      <dgm:t>
+        <a:bodyPr/>
+        <a:lstStyle/>
+        <a:p>
+          <a:endParaRPr lang="en-US"/>
+        </a:p>
+      </dgm:t>
+    </dgm:pt>
+    <dgm:pt modelId="{3C11C1AF-E6EE-411B-88E8-52243CAB3C93}">
+      <dgm:prSet phldrT="[Text]"/>
+      <dgm:spPr/>
+      <dgm:t>
+        <a:bodyPr/>
+        <a:lstStyle/>
+        <a:p>
+          <a:r>
+            <a:rPr lang="en-US" smtClean="0"/>
+            <a:t>Time </a:t>
+          </a:r>
+          <a:r>
+            <a:rPr lang="en-US" smtClean="0"/>
+            <a:t>‘N’</a:t>
+          </a:r>
+          <a:endParaRPr lang="en-US" dirty="0"/>
+        </a:p>
+      </dgm:t>
+    </dgm:pt>
+    <dgm:pt modelId="{D4DEEC40-F684-413A-915E-2AD82B476D56}" type="parTrans" cxnId="{4673D825-82BB-4C22-B461-EFB4AE59F674}">
+      <dgm:prSet/>
+      <dgm:spPr/>
+      <dgm:t>
+        <a:bodyPr/>
+        <a:lstStyle/>
+        <a:p>
+          <a:endParaRPr lang="en-US"/>
+        </a:p>
+      </dgm:t>
+    </dgm:pt>
+    <dgm:pt modelId="{6608512F-F81E-4FD4-A1AC-4DC4DA0B7F77}" type="sibTrans" cxnId="{4673D825-82BB-4C22-B461-EFB4AE59F674}">
+      <dgm:prSet/>
+      <dgm:spPr/>
+      <dgm:t>
+        <a:bodyPr/>
+        <a:lstStyle/>
+        <a:p>
+          <a:endParaRPr lang="en-US"/>
+        </a:p>
+      </dgm:t>
+    </dgm:pt>
+    <dgm:pt modelId="{B17D05E7-8ED9-4D6A-9FE0-4E0747431AED}">
+      <dgm:prSet phldrT="[Text]"/>
+      <dgm:spPr/>
+      <dgm:t>
+        <a:bodyPr/>
+        <a:lstStyle/>
+        <a:p>
+          <a:r>
+            <a:rPr lang="en-US" dirty="0" smtClean="0"/>
+            <a:t>Apply Stimulus</a:t>
+          </a:r>
+          <a:endParaRPr lang="en-US" dirty="0"/>
+        </a:p>
+      </dgm:t>
+    </dgm:pt>
+    <dgm:pt modelId="{1BCC5187-AE54-4029-9199-818B5313270E}" type="parTrans" cxnId="{1D877D71-3A86-4B82-8A6F-E1C6A49F95DA}">
+      <dgm:prSet/>
+      <dgm:spPr/>
+      <dgm:t>
+        <a:bodyPr/>
+        <a:lstStyle/>
+        <a:p>
+          <a:endParaRPr lang="en-US"/>
+        </a:p>
+      </dgm:t>
+    </dgm:pt>
+    <dgm:pt modelId="{39D7020D-2BB0-42E7-8F2C-FCACE3BAB6C9}" type="sibTrans" cxnId="{1D877D71-3A86-4B82-8A6F-E1C6A49F95DA}">
+      <dgm:prSet/>
+      <dgm:spPr/>
+      <dgm:t>
+        <a:bodyPr/>
+        <a:lstStyle/>
+        <a:p>
+          <a:endParaRPr lang="en-US"/>
+        </a:p>
+      </dgm:t>
+    </dgm:pt>
+    <dgm:pt modelId="{929F9DB8-9416-4334-B242-69059376EDFC}">
+      <dgm:prSet phldrT="[Text]"/>
+      <dgm:spPr/>
+      <dgm:t>
+        <a:bodyPr/>
+        <a:lstStyle/>
+        <a:p>
+          <a:r>
+            <a:rPr lang="en-US" dirty="0" smtClean="0"/>
+            <a:t>Time ‘O’</a:t>
+          </a:r>
+          <a:endParaRPr lang="en-US" dirty="0"/>
+        </a:p>
+      </dgm:t>
+    </dgm:pt>
+    <dgm:pt modelId="{AEC81C9B-FB75-41D4-9C76-22B2C79014B7}" type="parTrans" cxnId="{9E344696-9115-4EE2-AC21-60EF4EFB2934}">
+      <dgm:prSet/>
+      <dgm:spPr/>
+      <dgm:t>
+        <a:bodyPr/>
+        <a:lstStyle/>
+        <a:p>
+          <a:endParaRPr lang="en-US"/>
+        </a:p>
+      </dgm:t>
+    </dgm:pt>
+    <dgm:pt modelId="{ADEC5062-3FAB-4B9A-96C9-2DC24F1EB5B1}" type="sibTrans" cxnId="{9E344696-9115-4EE2-AC21-60EF4EFB2934}">
+      <dgm:prSet/>
+      <dgm:spPr/>
+      <dgm:t>
+        <a:bodyPr/>
+        <a:lstStyle/>
+        <a:p>
+          <a:endParaRPr lang="en-US"/>
+        </a:p>
+      </dgm:t>
+    </dgm:pt>
+    <dgm:pt modelId="{08531574-C7F4-4000-ACA3-E3567FC97767}">
+      <dgm:prSet phldrT="[Text]"/>
+      <dgm:spPr/>
+      <dgm:t>
+        <a:bodyPr/>
+        <a:lstStyle/>
+        <a:p>
+          <a:r>
+            <a:rPr lang="en-US" dirty="0" smtClean="0"/>
+            <a:t>Apply Stimulus</a:t>
+          </a:r>
+          <a:endParaRPr lang="en-US" dirty="0"/>
+        </a:p>
+      </dgm:t>
+    </dgm:pt>
+    <dgm:pt modelId="{7562AA60-AC18-490F-91EE-A19AB12B95B7}" type="parTrans" cxnId="{8FA76765-026A-4B37-A6D7-71DE5D300848}">
+      <dgm:prSet/>
+      <dgm:spPr/>
+      <dgm:t>
+        <a:bodyPr/>
+        <a:lstStyle/>
+        <a:p>
+          <a:endParaRPr lang="en-US"/>
+        </a:p>
+      </dgm:t>
+    </dgm:pt>
+    <dgm:pt modelId="{BFD84242-63E0-4D87-965C-D6967130E7EC}" type="sibTrans" cxnId="{8FA76765-026A-4B37-A6D7-71DE5D300848}">
+      <dgm:prSet/>
+      <dgm:spPr/>
+      <dgm:t>
+        <a:bodyPr/>
+        <a:lstStyle/>
+        <a:p>
+          <a:endParaRPr lang="en-US"/>
+        </a:p>
+      </dgm:t>
+    </dgm:pt>
+    <dgm:pt modelId="{A5D6D5DF-8EF6-4A5B-A2E6-988236E641F7}">
+      <dgm:prSet phldrT="[Text]"/>
+      <dgm:spPr/>
+      <dgm:t>
+        <a:bodyPr/>
+        <a:lstStyle/>
+        <a:p>
+          <a:r>
+            <a:rPr lang="en-US" dirty="0" smtClean="0"/>
+            <a:t>Simulation Proceeds</a:t>
+          </a:r>
+          <a:endParaRPr lang="en-US" dirty="0"/>
+        </a:p>
+      </dgm:t>
+    </dgm:pt>
+    <dgm:pt modelId="{F5748C27-6B58-4766-8E2A-D2EC4BC35795}" type="parTrans" cxnId="{41E6588D-23B8-4908-B273-06E0C5E7B31F}">
+      <dgm:prSet/>
+      <dgm:spPr/>
+      <dgm:t>
+        <a:bodyPr/>
+        <a:lstStyle/>
+        <a:p>
+          <a:endParaRPr lang="en-US"/>
+        </a:p>
+      </dgm:t>
+    </dgm:pt>
+    <dgm:pt modelId="{B93F171A-7547-4967-809A-AC07B543F6A1}" type="sibTrans" cxnId="{41E6588D-23B8-4908-B273-06E0C5E7B31F}">
+      <dgm:prSet/>
+      <dgm:spPr/>
+      <dgm:t>
+        <a:bodyPr/>
+        <a:lstStyle/>
+        <a:p>
+          <a:endParaRPr lang="en-US"/>
+        </a:p>
+      </dgm:t>
+    </dgm:pt>
+    <dgm:pt modelId="{C85AADFB-788B-4406-A789-D88511352C92}">
+      <dgm:prSet phldrT="[Text]"/>
+      <dgm:spPr/>
+      <dgm:t>
+        <a:bodyPr/>
+        <a:lstStyle/>
+        <a:p>
+          <a:r>
+            <a:rPr lang="en-US" dirty="0" smtClean="0"/>
+            <a:t>Simulation Proceeds</a:t>
+          </a:r>
+          <a:endParaRPr lang="en-US" dirty="0"/>
+        </a:p>
+      </dgm:t>
+    </dgm:pt>
+    <dgm:pt modelId="{5FBE1F1E-31E9-4CCA-9AB1-83536B9F308F}" type="parTrans" cxnId="{0364C46C-22B7-4453-A81B-789061C4A11F}">
+      <dgm:prSet/>
+      <dgm:spPr/>
+      <dgm:t>
+        <a:bodyPr/>
+        <a:lstStyle/>
+        <a:p>
+          <a:endParaRPr lang="en-US"/>
+        </a:p>
+      </dgm:t>
+    </dgm:pt>
+    <dgm:pt modelId="{E7671341-7F65-43D8-ADB8-F37F53BC3148}" type="sibTrans" cxnId="{0364C46C-22B7-4453-A81B-789061C4A11F}">
+      <dgm:prSet/>
+      <dgm:spPr/>
+      <dgm:t>
+        <a:bodyPr/>
+        <a:lstStyle/>
+        <a:p>
+          <a:endParaRPr lang="en-US"/>
+        </a:p>
+      </dgm:t>
+    </dgm:pt>
+    <dgm:pt modelId="{13D32241-9504-4A2C-BAB7-34EEB6A6FE2D}" type="pres">
+      <dgm:prSet presAssocID="{0263801E-6BF4-4BC6-88F6-3A681B6F0256}" presName="theList" presStyleCnt="0">
+        <dgm:presLayoutVars>
+          <dgm:dir/>
+          <dgm:animLvl val="lvl"/>
+          <dgm:resizeHandles val="exact"/>
+        </dgm:presLayoutVars>
+      </dgm:prSet>
+      <dgm:spPr/>
+      <dgm:t>
+        <a:bodyPr/>
+        <a:lstStyle/>
+        <a:p>
+          <a:endParaRPr lang="en-US"/>
+        </a:p>
+      </dgm:t>
+    </dgm:pt>
+    <dgm:pt modelId="{DC3626AE-C1D3-4C4C-B518-68309FA5659C}" type="pres">
+      <dgm:prSet presAssocID="{0D53AE23-7B1D-4F75-B0C9-811ADD1450E5}" presName="compNode" presStyleCnt="0"/>
+      <dgm:spPr/>
+    </dgm:pt>
+    <dgm:pt modelId="{F10A0DA3-072E-4396-B002-FB0BE956C380}" type="pres">
+      <dgm:prSet presAssocID="{0D53AE23-7B1D-4F75-B0C9-811ADD1450E5}" presName="noGeometry" presStyleCnt="0"/>
+      <dgm:spPr/>
+    </dgm:pt>
+    <dgm:pt modelId="{7B806281-0297-4181-9E3F-131037759B04}" type="pres">
+      <dgm:prSet presAssocID="{0D53AE23-7B1D-4F75-B0C9-811ADD1450E5}" presName="childTextVisible" presStyleLbl="bgAccFollowNode1" presStyleIdx="0" presStyleCnt="3">
+        <dgm:presLayoutVars>
+          <dgm:bulletEnabled val="1"/>
+        </dgm:presLayoutVars>
+      </dgm:prSet>
+      <dgm:spPr/>
+      <dgm:t>
+        <a:bodyPr/>
+        <a:lstStyle/>
+        <a:p>
+          <a:endParaRPr lang="en-US"/>
+        </a:p>
+      </dgm:t>
+    </dgm:pt>
+    <dgm:pt modelId="{1B83ADFA-209B-4B28-B17F-D10A6D3801E6}" type="pres">
+      <dgm:prSet presAssocID="{0D53AE23-7B1D-4F75-B0C9-811ADD1450E5}" presName="childTextHidden" presStyleLbl="bgAccFollowNode1" presStyleIdx="0" presStyleCnt="3"/>
+      <dgm:spPr/>
+      <dgm:t>
+        <a:bodyPr/>
+        <a:lstStyle/>
+        <a:p>
+          <a:endParaRPr lang="en-US"/>
+        </a:p>
+      </dgm:t>
+    </dgm:pt>
+    <dgm:pt modelId="{3323C78C-5959-43A3-8333-6291B30DB1C7}" type="pres">
+      <dgm:prSet presAssocID="{0D53AE23-7B1D-4F75-B0C9-811ADD1450E5}" presName="parentText" presStyleLbl="node1" presStyleIdx="0" presStyleCnt="3">
+        <dgm:presLayoutVars>
+          <dgm:chMax val="1"/>
+          <dgm:bulletEnabled val="1"/>
+        </dgm:presLayoutVars>
+      </dgm:prSet>
+      <dgm:spPr/>
+      <dgm:t>
+        <a:bodyPr/>
+        <a:lstStyle/>
+        <a:p>
+          <a:endParaRPr lang="en-US"/>
+        </a:p>
+      </dgm:t>
+    </dgm:pt>
+    <dgm:pt modelId="{24C8E639-88BA-4B84-B5D7-FB2A54E1887B}" type="pres">
+      <dgm:prSet presAssocID="{0D53AE23-7B1D-4F75-B0C9-811ADD1450E5}" presName="aSpace" presStyleCnt="0"/>
+      <dgm:spPr/>
+    </dgm:pt>
+    <dgm:pt modelId="{F0F3EC9E-FBD5-43AB-8AD5-3C7578BC2EE3}" type="pres">
+      <dgm:prSet presAssocID="{3C11C1AF-E6EE-411B-88E8-52243CAB3C93}" presName="compNode" presStyleCnt="0"/>
+      <dgm:spPr/>
+    </dgm:pt>
+    <dgm:pt modelId="{F1BAAFBE-587D-42C7-A8D2-E7634332A0EF}" type="pres">
+      <dgm:prSet presAssocID="{3C11C1AF-E6EE-411B-88E8-52243CAB3C93}" presName="noGeometry" presStyleCnt="0"/>
+      <dgm:spPr/>
+    </dgm:pt>
+    <dgm:pt modelId="{2DDD2D22-A762-45A0-9949-31828912D06C}" type="pres">
+      <dgm:prSet presAssocID="{3C11C1AF-E6EE-411B-88E8-52243CAB3C93}" presName="childTextVisible" presStyleLbl="bgAccFollowNode1" presStyleIdx="1" presStyleCnt="3">
+        <dgm:presLayoutVars>
+          <dgm:bulletEnabled val="1"/>
+        </dgm:presLayoutVars>
+      </dgm:prSet>
+      <dgm:spPr/>
+      <dgm:t>
+        <a:bodyPr/>
+        <a:lstStyle/>
+        <a:p>
+          <a:endParaRPr lang="en-US"/>
+        </a:p>
+      </dgm:t>
+    </dgm:pt>
+    <dgm:pt modelId="{DB11807E-0A9B-4417-B0A2-EF636835E252}" type="pres">
+      <dgm:prSet presAssocID="{3C11C1AF-E6EE-411B-88E8-52243CAB3C93}" presName="childTextHidden" presStyleLbl="bgAccFollowNode1" presStyleIdx="1" presStyleCnt="3"/>
+      <dgm:spPr/>
+      <dgm:t>
+        <a:bodyPr/>
+        <a:lstStyle/>
+        <a:p>
+          <a:endParaRPr lang="en-US"/>
+        </a:p>
+      </dgm:t>
+    </dgm:pt>
+    <dgm:pt modelId="{A0B10877-C878-4F97-B58E-16E374CAD393}" type="pres">
+      <dgm:prSet presAssocID="{3C11C1AF-E6EE-411B-88E8-52243CAB3C93}" presName="parentText" presStyleLbl="node1" presStyleIdx="1" presStyleCnt="3">
+        <dgm:presLayoutVars>
+          <dgm:chMax val="1"/>
+          <dgm:bulletEnabled val="1"/>
+        </dgm:presLayoutVars>
+      </dgm:prSet>
+      <dgm:spPr/>
+      <dgm:t>
+        <a:bodyPr/>
+        <a:lstStyle/>
+        <a:p>
+          <a:endParaRPr lang="en-US"/>
+        </a:p>
+      </dgm:t>
+    </dgm:pt>
+    <dgm:pt modelId="{6EFF165C-470B-40D4-883A-FCE41B1B514D}" type="pres">
+      <dgm:prSet presAssocID="{3C11C1AF-E6EE-411B-88E8-52243CAB3C93}" presName="aSpace" presStyleCnt="0"/>
+      <dgm:spPr/>
+    </dgm:pt>
+    <dgm:pt modelId="{B2603BB4-7BF0-42C4-B17E-181E7F271895}" type="pres">
+      <dgm:prSet presAssocID="{929F9DB8-9416-4334-B242-69059376EDFC}" presName="compNode" presStyleCnt="0"/>
+      <dgm:spPr/>
+    </dgm:pt>
+    <dgm:pt modelId="{8548B971-A876-4E86-B84F-3B26187F028E}" type="pres">
+      <dgm:prSet presAssocID="{929F9DB8-9416-4334-B242-69059376EDFC}" presName="noGeometry" presStyleCnt="0"/>
+      <dgm:spPr/>
+    </dgm:pt>
+    <dgm:pt modelId="{4E60EA4B-21DD-4DDC-875F-3BE12FB00CDE}" type="pres">
+      <dgm:prSet presAssocID="{929F9DB8-9416-4334-B242-69059376EDFC}" presName="childTextVisible" presStyleLbl="bgAccFollowNode1" presStyleIdx="2" presStyleCnt="3">
+        <dgm:presLayoutVars>
+          <dgm:bulletEnabled val="1"/>
+        </dgm:presLayoutVars>
+      </dgm:prSet>
+      <dgm:spPr/>
+      <dgm:t>
+        <a:bodyPr/>
+        <a:lstStyle/>
+        <a:p>
+          <a:endParaRPr lang="en-US"/>
+        </a:p>
+      </dgm:t>
+    </dgm:pt>
+    <dgm:pt modelId="{5F067820-4173-4DCA-A79E-37F297BCA2A9}" type="pres">
+      <dgm:prSet presAssocID="{929F9DB8-9416-4334-B242-69059376EDFC}" presName="childTextHidden" presStyleLbl="bgAccFollowNode1" presStyleIdx="2" presStyleCnt="3"/>
+      <dgm:spPr/>
+      <dgm:t>
+        <a:bodyPr/>
+        <a:lstStyle/>
+        <a:p>
+          <a:endParaRPr lang="en-US"/>
+        </a:p>
+      </dgm:t>
+    </dgm:pt>
+    <dgm:pt modelId="{9EDE3C6D-A507-4130-BB59-0BE7C8A78BE8}" type="pres">
+      <dgm:prSet presAssocID="{929F9DB8-9416-4334-B242-69059376EDFC}" presName="parentText" presStyleLbl="node1" presStyleIdx="2" presStyleCnt="3">
+        <dgm:presLayoutVars>
+          <dgm:chMax val="1"/>
+          <dgm:bulletEnabled val="1"/>
+        </dgm:presLayoutVars>
+      </dgm:prSet>
+      <dgm:spPr/>
+      <dgm:t>
+        <a:bodyPr/>
+        <a:lstStyle/>
+        <a:p>
+          <a:endParaRPr lang="en-US"/>
+        </a:p>
+      </dgm:t>
+    </dgm:pt>
+  </dgm:ptLst>
+  <dgm:cxnLst>
+    <dgm:cxn modelId="{29D49475-1E9F-492A-BCF6-56E6F8F92951}" type="presOf" srcId="{C85AADFB-788B-4406-A789-D88511352C92}" destId="{4E60EA4B-21DD-4DDC-875F-3BE12FB00CDE}" srcOrd="0" destOrd="1" presId="urn:microsoft.com/office/officeart/2005/8/layout/hProcess6"/>
+    <dgm:cxn modelId="{AC2FCF21-904C-4488-B8AA-83F0DC6967ED}" type="presOf" srcId="{0263801E-6BF4-4BC6-88F6-3A681B6F0256}" destId="{13D32241-9504-4A2C-BAB7-34EEB6A6FE2D}" srcOrd="0" destOrd="0" presId="urn:microsoft.com/office/officeart/2005/8/layout/hProcess6"/>
+    <dgm:cxn modelId="{1B020AD7-40FB-4112-92DF-4D16CF7D01CE}" type="presOf" srcId="{42914ECB-5E6C-47FC-81AC-C7B39E261CA1}" destId="{7B806281-0297-4181-9E3F-131037759B04}" srcOrd="0" destOrd="0" presId="urn:microsoft.com/office/officeart/2005/8/layout/hProcess6"/>
+    <dgm:cxn modelId="{A7BF8CF3-F294-4D8A-943F-D90BCFB0D975}" type="presOf" srcId="{C85AADFB-788B-4406-A789-D88511352C92}" destId="{5F067820-4173-4DCA-A79E-37F297BCA2A9}" srcOrd="1" destOrd="1" presId="urn:microsoft.com/office/officeart/2005/8/layout/hProcess6"/>
+    <dgm:cxn modelId="{C8BB9639-69F5-4B87-9012-948986D00CAF}" type="presOf" srcId="{42914ECB-5E6C-47FC-81AC-C7B39E261CA1}" destId="{1B83ADFA-209B-4B28-B17F-D10A6D3801E6}" srcOrd="1" destOrd="0" presId="urn:microsoft.com/office/officeart/2005/8/layout/hProcess6"/>
+    <dgm:cxn modelId="{4F5D213B-E6DC-4808-AA74-B68D3C24218D}" type="presOf" srcId="{3C11C1AF-E6EE-411B-88E8-52243CAB3C93}" destId="{A0B10877-C878-4F97-B58E-16E374CAD393}" srcOrd="0" destOrd="0" presId="urn:microsoft.com/office/officeart/2005/8/layout/hProcess6"/>
+    <dgm:cxn modelId="{74968756-B7C1-4BC9-8C2B-74AAEE1A4481}" type="presOf" srcId="{38B1D2F8-D4C9-4A1E-825D-21E7A5CB8BD1}" destId="{7B806281-0297-4181-9E3F-131037759B04}" srcOrd="0" destOrd="1" presId="urn:microsoft.com/office/officeart/2005/8/layout/hProcess6"/>
+    <dgm:cxn modelId="{DAB32686-8279-4417-B321-F5EDF66703C6}" srcId="{0D53AE23-7B1D-4F75-B0C9-811ADD1450E5}" destId="{38B1D2F8-D4C9-4A1E-825D-21E7A5CB8BD1}" srcOrd="1" destOrd="0" parTransId="{9BBFA439-77D4-4339-ACB7-CD36D005FA14}" sibTransId="{CD6B4CBD-B420-4C45-A6F6-470370C462DB}"/>
+    <dgm:cxn modelId="{EDFE3AF9-FCA8-4366-9AD8-85C1521027EA}" type="presOf" srcId="{A5D6D5DF-8EF6-4A5B-A2E6-988236E641F7}" destId="{2DDD2D22-A762-45A0-9949-31828912D06C}" srcOrd="0" destOrd="1" presId="urn:microsoft.com/office/officeart/2005/8/layout/hProcess6"/>
+    <dgm:cxn modelId="{9E344696-9115-4EE2-AC21-60EF4EFB2934}" srcId="{0263801E-6BF4-4BC6-88F6-3A681B6F0256}" destId="{929F9DB8-9416-4334-B242-69059376EDFC}" srcOrd="2" destOrd="0" parTransId="{AEC81C9B-FB75-41D4-9C76-22B2C79014B7}" sibTransId="{ADEC5062-3FAB-4B9A-96C9-2DC24F1EB5B1}"/>
+    <dgm:cxn modelId="{41E6588D-23B8-4908-B273-06E0C5E7B31F}" srcId="{3C11C1AF-E6EE-411B-88E8-52243CAB3C93}" destId="{A5D6D5DF-8EF6-4A5B-A2E6-988236E641F7}" srcOrd="1" destOrd="0" parTransId="{F5748C27-6B58-4766-8E2A-D2EC4BC35795}" sibTransId="{B93F171A-7547-4967-809A-AC07B543F6A1}"/>
+    <dgm:cxn modelId="{BABF9A86-9440-4EF0-AD1C-A244B024DCED}" srcId="{0D53AE23-7B1D-4F75-B0C9-811ADD1450E5}" destId="{42914ECB-5E6C-47FC-81AC-C7B39E261CA1}" srcOrd="0" destOrd="0" parTransId="{C59DD97D-EF86-481A-9CD8-0E48CA3429CD}" sibTransId="{2C9D62BB-5518-4933-B246-B80C666EC721}"/>
+    <dgm:cxn modelId="{141DB2DB-A59F-4176-8090-EE68B32994B6}" type="presOf" srcId="{08531574-C7F4-4000-ACA3-E3567FC97767}" destId="{4E60EA4B-21DD-4DDC-875F-3BE12FB00CDE}" srcOrd="0" destOrd="0" presId="urn:microsoft.com/office/officeart/2005/8/layout/hProcess6"/>
+    <dgm:cxn modelId="{BFC94A15-D636-458C-B9D4-9C5B907DB6FF}" type="presOf" srcId="{A5D6D5DF-8EF6-4A5B-A2E6-988236E641F7}" destId="{DB11807E-0A9B-4417-B0A2-EF636835E252}" srcOrd="1" destOrd="1" presId="urn:microsoft.com/office/officeart/2005/8/layout/hProcess6"/>
+    <dgm:cxn modelId="{5B7126CB-694A-4072-926F-40D6E2EE25A2}" type="presOf" srcId="{929F9DB8-9416-4334-B242-69059376EDFC}" destId="{9EDE3C6D-A507-4130-BB59-0BE7C8A78BE8}" srcOrd="0" destOrd="0" presId="urn:microsoft.com/office/officeart/2005/8/layout/hProcess6"/>
+    <dgm:cxn modelId="{7B7B3683-D798-4D21-BBB2-576500785B33}" type="presOf" srcId="{B17D05E7-8ED9-4D6A-9FE0-4E0747431AED}" destId="{DB11807E-0A9B-4417-B0A2-EF636835E252}" srcOrd="1" destOrd="0" presId="urn:microsoft.com/office/officeart/2005/8/layout/hProcess6"/>
+    <dgm:cxn modelId="{4673D825-82BB-4C22-B461-EFB4AE59F674}" srcId="{0263801E-6BF4-4BC6-88F6-3A681B6F0256}" destId="{3C11C1AF-E6EE-411B-88E8-52243CAB3C93}" srcOrd="1" destOrd="0" parTransId="{D4DEEC40-F684-413A-915E-2AD82B476D56}" sibTransId="{6608512F-F81E-4FD4-A1AC-4DC4DA0B7F77}"/>
+    <dgm:cxn modelId="{84C744F5-6149-4B9A-BC28-E83D7606BCD3}" type="presOf" srcId="{38B1D2F8-D4C9-4A1E-825D-21E7A5CB8BD1}" destId="{1B83ADFA-209B-4B28-B17F-D10A6D3801E6}" srcOrd="1" destOrd="1" presId="urn:microsoft.com/office/officeart/2005/8/layout/hProcess6"/>
+    <dgm:cxn modelId="{1233550D-C6C3-4196-A684-C3854D2ABC54}" srcId="{0263801E-6BF4-4BC6-88F6-3A681B6F0256}" destId="{0D53AE23-7B1D-4F75-B0C9-811ADD1450E5}" srcOrd="0" destOrd="0" parTransId="{B3190658-5D0B-48A2-A545-BB51AA06FA98}" sibTransId="{F96C9355-A67A-4A46-A16F-5C578B20ACE8}"/>
+    <dgm:cxn modelId="{0364C46C-22B7-4453-A81B-789061C4A11F}" srcId="{929F9DB8-9416-4334-B242-69059376EDFC}" destId="{C85AADFB-788B-4406-A789-D88511352C92}" srcOrd="1" destOrd="0" parTransId="{5FBE1F1E-31E9-4CCA-9AB1-83536B9F308F}" sibTransId="{E7671341-7F65-43D8-ADB8-F37F53BC3148}"/>
+    <dgm:cxn modelId="{7AFF0E17-20E6-4648-8BB0-EA8378895D1F}" type="presOf" srcId="{08531574-C7F4-4000-ACA3-E3567FC97767}" destId="{5F067820-4173-4DCA-A79E-37F297BCA2A9}" srcOrd="1" destOrd="0" presId="urn:microsoft.com/office/officeart/2005/8/layout/hProcess6"/>
+    <dgm:cxn modelId="{595A0C0F-5D9F-4C8A-8B75-11F9701B7725}" type="presOf" srcId="{B17D05E7-8ED9-4D6A-9FE0-4E0747431AED}" destId="{2DDD2D22-A762-45A0-9949-31828912D06C}" srcOrd="0" destOrd="0" presId="urn:microsoft.com/office/officeart/2005/8/layout/hProcess6"/>
+    <dgm:cxn modelId="{CC5252A4-F556-4C61-850D-DEA877DE8731}" type="presOf" srcId="{0D53AE23-7B1D-4F75-B0C9-811ADD1450E5}" destId="{3323C78C-5959-43A3-8333-6291B30DB1C7}" srcOrd="0" destOrd="0" presId="urn:microsoft.com/office/officeart/2005/8/layout/hProcess6"/>
+    <dgm:cxn modelId="{8FA76765-026A-4B37-A6D7-71DE5D300848}" srcId="{929F9DB8-9416-4334-B242-69059376EDFC}" destId="{08531574-C7F4-4000-ACA3-E3567FC97767}" srcOrd="0" destOrd="0" parTransId="{7562AA60-AC18-490F-91EE-A19AB12B95B7}" sibTransId="{BFD84242-63E0-4D87-965C-D6967130E7EC}"/>
+    <dgm:cxn modelId="{1D877D71-3A86-4B82-8A6F-E1C6A49F95DA}" srcId="{3C11C1AF-E6EE-411B-88E8-52243CAB3C93}" destId="{B17D05E7-8ED9-4D6A-9FE0-4E0747431AED}" srcOrd="0" destOrd="0" parTransId="{1BCC5187-AE54-4029-9199-818B5313270E}" sibTransId="{39D7020D-2BB0-42E7-8F2C-FCACE3BAB6C9}"/>
+    <dgm:cxn modelId="{46639185-AFB8-4075-8E1F-8F082F574D46}" type="presParOf" srcId="{13D32241-9504-4A2C-BAB7-34EEB6A6FE2D}" destId="{DC3626AE-C1D3-4C4C-B518-68309FA5659C}" srcOrd="0" destOrd="0" presId="urn:microsoft.com/office/officeart/2005/8/layout/hProcess6"/>
+    <dgm:cxn modelId="{688D6119-CE0D-4B19-8E90-B109045D2600}" type="presParOf" srcId="{DC3626AE-C1D3-4C4C-B518-68309FA5659C}" destId="{F10A0DA3-072E-4396-B002-FB0BE956C380}" srcOrd="0" destOrd="0" presId="urn:microsoft.com/office/officeart/2005/8/layout/hProcess6"/>
+    <dgm:cxn modelId="{BE7CBC16-118C-4B44-8AF2-9E66051359DF}" type="presParOf" srcId="{DC3626AE-C1D3-4C4C-B518-68309FA5659C}" destId="{7B806281-0297-4181-9E3F-131037759B04}" srcOrd="1" destOrd="0" presId="urn:microsoft.com/office/officeart/2005/8/layout/hProcess6"/>
+    <dgm:cxn modelId="{E2EA17F7-8E3B-4260-BA58-235A2B818035}" type="presParOf" srcId="{DC3626AE-C1D3-4C4C-B518-68309FA5659C}" destId="{1B83ADFA-209B-4B28-B17F-D10A6D3801E6}" srcOrd="2" destOrd="0" presId="urn:microsoft.com/office/officeart/2005/8/layout/hProcess6"/>
+    <dgm:cxn modelId="{0D7BA918-CBDF-4566-A703-3371B39DD4DA}" type="presParOf" srcId="{DC3626AE-C1D3-4C4C-B518-68309FA5659C}" destId="{3323C78C-5959-43A3-8333-6291B30DB1C7}" srcOrd="3" destOrd="0" presId="urn:microsoft.com/office/officeart/2005/8/layout/hProcess6"/>
+    <dgm:cxn modelId="{9AB9BB1C-745B-43D2-9CCC-3140BDBDE878}" type="presParOf" srcId="{13D32241-9504-4A2C-BAB7-34EEB6A6FE2D}" destId="{24C8E639-88BA-4B84-B5D7-FB2A54E1887B}" srcOrd="1" destOrd="0" presId="urn:microsoft.com/office/officeart/2005/8/layout/hProcess6"/>
+    <dgm:cxn modelId="{0467A2D6-C1CC-4AF0-9644-B25C5B1211B5}" type="presParOf" srcId="{13D32241-9504-4A2C-BAB7-34EEB6A6FE2D}" destId="{F0F3EC9E-FBD5-43AB-8AD5-3C7578BC2EE3}" srcOrd="2" destOrd="0" presId="urn:microsoft.com/office/officeart/2005/8/layout/hProcess6"/>
+    <dgm:cxn modelId="{CDB62C57-D707-475D-8071-430B7F4916C2}" type="presParOf" srcId="{F0F3EC9E-FBD5-43AB-8AD5-3C7578BC2EE3}" destId="{F1BAAFBE-587D-42C7-A8D2-E7634332A0EF}" srcOrd="0" destOrd="0" presId="urn:microsoft.com/office/officeart/2005/8/layout/hProcess6"/>
+    <dgm:cxn modelId="{0B9F1F88-3AD0-452E-92C0-CAF414418373}" type="presParOf" srcId="{F0F3EC9E-FBD5-43AB-8AD5-3C7578BC2EE3}" destId="{2DDD2D22-A762-45A0-9949-31828912D06C}" srcOrd="1" destOrd="0" presId="urn:microsoft.com/office/officeart/2005/8/layout/hProcess6"/>
+    <dgm:cxn modelId="{454558C9-B4BD-4748-8D94-86A8171C1DDB}" type="presParOf" srcId="{F0F3EC9E-FBD5-43AB-8AD5-3C7578BC2EE3}" destId="{DB11807E-0A9B-4417-B0A2-EF636835E252}" srcOrd="2" destOrd="0" presId="urn:microsoft.com/office/officeart/2005/8/layout/hProcess6"/>
+    <dgm:cxn modelId="{0AA65989-1FB5-4FBA-B5FE-930836083306}" type="presParOf" srcId="{F0F3EC9E-FBD5-43AB-8AD5-3C7578BC2EE3}" destId="{A0B10877-C878-4F97-B58E-16E374CAD393}" srcOrd="3" destOrd="0" presId="urn:microsoft.com/office/officeart/2005/8/layout/hProcess6"/>
+    <dgm:cxn modelId="{6D4DEEFB-64DF-4B29-BB62-0F9B475B1F1F}" type="presParOf" srcId="{13D32241-9504-4A2C-BAB7-34EEB6A6FE2D}" destId="{6EFF165C-470B-40D4-883A-FCE41B1B514D}" srcOrd="3" destOrd="0" presId="urn:microsoft.com/office/officeart/2005/8/layout/hProcess6"/>
+    <dgm:cxn modelId="{6DE4A83E-0A85-45B9-A54A-E889CA577970}" type="presParOf" srcId="{13D32241-9504-4A2C-BAB7-34EEB6A6FE2D}" destId="{B2603BB4-7BF0-42C4-B17E-181E7F271895}" srcOrd="4" destOrd="0" presId="urn:microsoft.com/office/officeart/2005/8/layout/hProcess6"/>
+    <dgm:cxn modelId="{56D47E41-8C32-4250-B524-C568D57CF433}" type="presParOf" srcId="{B2603BB4-7BF0-42C4-B17E-181E7F271895}" destId="{8548B971-A876-4E86-B84F-3B26187F028E}" srcOrd="0" destOrd="0" presId="urn:microsoft.com/office/officeart/2005/8/layout/hProcess6"/>
+    <dgm:cxn modelId="{2BC14F95-047B-4F7D-974E-233A3471AC88}" type="presParOf" srcId="{B2603BB4-7BF0-42C4-B17E-181E7F271895}" destId="{4E60EA4B-21DD-4DDC-875F-3BE12FB00CDE}" srcOrd="1" destOrd="0" presId="urn:microsoft.com/office/officeart/2005/8/layout/hProcess6"/>
+    <dgm:cxn modelId="{75A8024E-06D0-40B2-A509-49FABDD715CE}" type="presParOf" srcId="{B2603BB4-7BF0-42C4-B17E-181E7F271895}" destId="{5F067820-4173-4DCA-A79E-37F297BCA2A9}" srcOrd="2" destOrd="0" presId="urn:microsoft.com/office/officeart/2005/8/layout/hProcess6"/>
+    <dgm:cxn modelId="{D30A6197-9076-4E56-9BFB-9CB950FCC2D8}" type="presParOf" srcId="{B2603BB4-7BF0-42C4-B17E-181E7F271895}" destId="{9EDE3C6D-A507-4130-BB59-0BE7C8A78BE8}" srcOrd="3" destOrd="0" presId="urn:microsoft.com/office/officeart/2005/8/layout/hProcess6"/>
   </dgm:cxnLst>
   <dgm:bg/>
   <dgm:whole/>
@@ -16677,8 +18076,8 @@
     <dgm:cxn modelId="{5F869347-E138-4CB8-AB6E-C343C0009BAA}" type="presOf" srcId="{284B9274-2047-4B8C-9936-F9913333047C}" destId="{29AA9764-D645-4913-BA66-1A208AC75DAF}" srcOrd="0" destOrd="0" presId="urn:microsoft.com/office/officeart/2005/8/layout/radial4"/>
     <dgm:cxn modelId="{5C9438A1-7A30-4550-BB8B-90C0BDEBABC4}" type="presOf" srcId="{A6C49565-F519-4542-BF98-870261B124FA}" destId="{58C112E9-B04B-49F3-8D98-591AEB55C9C0}" srcOrd="0" destOrd="0" presId="urn:microsoft.com/office/officeart/2005/8/layout/radial4"/>
     <dgm:cxn modelId="{0772E6F0-39BA-44D5-9D2F-3A90A62E3B47}" type="presOf" srcId="{51404F99-6616-492C-86CE-352231288269}" destId="{A8D681BB-369D-4769-9F03-109FF3C39C96}" srcOrd="0" destOrd="0" presId="urn:microsoft.com/office/officeart/2005/8/layout/radial4"/>
+    <dgm:cxn modelId="{065FFCAA-41E6-4C85-AFAC-64A9EE77B730}" srcId="{F24FEC6D-07A1-47A1-96FC-ED8C83255B09}" destId="{4959CA43-C147-403A-AEC2-1032C38D1C08}" srcOrd="3" destOrd="0" parTransId="{284B9274-2047-4B8C-9936-F9913333047C}" sibTransId="{25FB47C5-60B0-40C1-819C-1A8643099C4B}"/>
     <dgm:cxn modelId="{9FFFD23D-47B5-47E1-AF28-88DE763D3267}" type="presOf" srcId="{0EE9F469-090F-46E1-ABC2-09BD96234DF3}" destId="{FBE4C170-3664-419C-B0EB-3DCEFB167F5C}" srcOrd="0" destOrd="0" presId="urn:microsoft.com/office/officeart/2005/8/layout/radial4"/>
-    <dgm:cxn modelId="{065FFCAA-41E6-4C85-AFAC-64A9EE77B730}" srcId="{F24FEC6D-07A1-47A1-96FC-ED8C83255B09}" destId="{4959CA43-C147-403A-AEC2-1032C38D1C08}" srcOrd="3" destOrd="0" parTransId="{284B9274-2047-4B8C-9936-F9913333047C}" sibTransId="{25FB47C5-60B0-40C1-819C-1A8643099C4B}"/>
     <dgm:cxn modelId="{419510B4-33AD-4C25-A6EC-430446607831}" srcId="{F24FEC6D-07A1-47A1-96FC-ED8C83255B09}" destId="{51404F99-6616-492C-86CE-352231288269}" srcOrd="1" destOrd="0" parTransId="{0EE9F469-090F-46E1-ABC2-09BD96234DF3}" sibTransId="{C57ABC00-3475-4454-BBE5-AF6787BAF720}"/>
     <dgm:cxn modelId="{4536C01F-ACD1-4559-97D8-F47ACB34EB8F}" type="presOf" srcId="{4959CA43-C147-403A-AEC2-1032C38D1C08}" destId="{EE01AE8D-B608-4914-9828-57481EE0CDA9}" srcOrd="0" destOrd="0" presId="urn:microsoft.com/office/officeart/2005/8/layout/radial4"/>
     <dgm:cxn modelId="{214E35C2-7D65-478A-8A8F-F36CB2AFBF83}" type="presOf" srcId="{23F37D44-4B1A-4BD6-9E75-C62E7D900C4A}" destId="{3A8DB876-3295-4771-915B-47CA1FB93B42}" srcOrd="0" destOrd="0" presId="urn:microsoft.com/office/officeart/2005/8/layout/radial4"/>
@@ -20497,8 +21896,8 @@
       </dsp:nvSpPr>
       <dsp:spPr>
         <a:xfrm>
-          <a:off x="1004" y="1283506"/>
-          <a:ext cx="1958950" cy="1958950"/>
+          <a:off x="1004" y="149348"/>
+          <a:ext cx="1645518" cy="1645518"/>
         </a:xfrm>
         <a:prstGeom prst="ellipse">
           <a:avLst/>
@@ -20578,12 +21977,12 @@
         </a:fontRef>
       </dsp:style>
       <dsp:txBody>
-        <a:bodyPr spcFirstLastPara="0" vert="horz" wrap="square" lIns="107808" tIns="22860" rIns="107808" bIns="22860" numCol="1" spcCol="1270" anchor="ctr" anchorCtr="0">
+        <a:bodyPr spcFirstLastPara="0" vert="horz" wrap="square" lIns="90558" tIns="20320" rIns="90558" bIns="20320" numCol="1" spcCol="1270" anchor="ctr" anchorCtr="0">
           <a:noAutofit/>
         </a:bodyPr>
         <a:lstStyle/>
         <a:p>
-          <a:pPr lvl="0" algn="ctr" defTabSz="800100">
+          <a:pPr lvl="0" algn="ctr" defTabSz="711200">
             <a:lnSpc>
               <a:spcPct val="90000"/>
             </a:lnSpc>
@@ -20595,21 +21994,21 @@
             </a:spcAft>
           </a:pPr>
           <a:r>
-            <a:rPr lang="en-US" sz="1800" kern="1200" dirty="0" smtClean="0">
+            <a:rPr lang="en-US" sz="1600" kern="1200" dirty="0" smtClean="0">
               <a:latin typeface="Times New Roman" pitchFamily="18" charset="0"/>
               <a:cs typeface="Times New Roman" pitchFamily="18" charset="0"/>
             </a:rPr>
             <a:t>FSDB</a:t>
           </a:r>
-          <a:endParaRPr lang="en-US" sz="1800" kern="1200" dirty="0">
+          <a:endParaRPr lang="en-US" sz="1600" kern="1200" dirty="0">
             <a:latin typeface="Times New Roman" pitchFamily="18" charset="0"/>
             <a:cs typeface="Times New Roman" pitchFamily="18" charset="0"/>
           </a:endParaRPr>
         </a:p>
       </dsp:txBody>
       <dsp:txXfrm>
-        <a:off x="1004" y="1283506"/>
-        <a:ext cx="1958950" cy="1958950"/>
+        <a:off x="1004" y="149348"/>
+        <a:ext cx="1645518" cy="1645518"/>
       </dsp:txXfrm>
     </dsp:sp>
     <dsp:sp modelId="{2F16B66C-A703-43E0-A87B-BDB5F215B3EC}">
@@ -20619,8 +22018,8 @@
       </dsp:nvSpPr>
       <dsp:spPr>
         <a:xfrm>
-          <a:off x="1568164" y="1283506"/>
-          <a:ext cx="1958950" cy="1958950"/>
+          <a:off x="1317419" y="149348"/>
+          <a:ext cx="1645518" cy="1645518"/>
         </a:xfrm>
         <a:prstGeom prst="ellipse">
           <a:avLst/>
@@ -20700,12 +22099,12 @@
         </a:fontRef>
       </dsp:style>
       <dsp:txBody>
-        <a:bodyPr spcFirstLastPara="0" vert="horz" wrap="square" lIns="107808" tIns="22860" rIns="107808" bIns="22860" numCol="1" spcCol="1270" anchor="ctr" anchorCtr="0">
+        <a:bodyPr spcFirstLastPara="0" vert="horz" wrap="square" lIns="90558" tIns="20320" rIns="90558" bIns="20320" numCol="1" spcCol="1270" anchor="ctr" anchorCtr="0">
           <a:noAutofit/>
         </a:bodyPr>
         <a:lstStyle/>
         <a:p>
-          <a:pPr lvl="0" algn="ctr" defTabSz="800100">
+          <a:pPr lvl="0" algn="ctr" defTabSz="711200">
             <a:lnSpc>
               <a:spcPct val="90000"/>
             </a:lnSpc>
@@ -20717,21 +22116,21 @@
             </a:spcAft>
           </a:pPr>
           <a:r>
-            <a:rPr lang="en-US" sz="1800" kern="1200" dirty="0" smtClean="0">
+            <a:rPr lang="en-US" sz="1600" kern="1200" dirty="0" smtClean="0">
               <a:latin typeface="Times New Roman" pitchFamily="18" charset="0"/>
               <a:cs typeface="Times New Roman" pitchFamily="18" charset="0"/>
             </a:rPr>
             <a:t>FSDB API provided by Verdi</a:t>
           </a:r>
-          <a:endParaRPr lang="en-US" sz="1800" kern="1200" dirty="0">
+          <a:endParaRPr lang="en-US" sz="1600" kern="1200" dirty="0">
             <a:latin typeface="Times New Roman" pitchFamily="18" charset="0"/>
             <a:cs typeface="Times New Roman" pitchFamily="18" charset="0"/>
           </a:endParaRPr>
         </a:p>
       </dsp:txBody>
       <dsp:txXfrm>
-        <a:off x="1568164" y="1283506"/>
-        <a:ext cx="1958950" cy="1958950"/>
+        <a:off x="1317419" y="149348"/>
+        <a:ext cx="1645518" cy="1645518"/>
       </dsp:txXfrm>
     </dsp:sp>
     <dsp:sp modelId="{ABFAB522-FA90-4144-98B8-19AD84267685}">
@@ -20741,8 +22140,8 @@
       </dsp:nvSpPr>
       <dsp:spPr>
         <a:xfrm>
-          <a:off x="3135324" y="1283506"/>
-          <a:ext cx="1958950" cy="1958950"/>
+          <a:off x="2633833" y="149348"/>
+          <a:ext cx="1645518" cy="1645518"/>
         </a:xfrm>
         <a:prstGeom prst="ellipse">
           <a:avLst/>
@@ -20822,12 +22221,12 @@
         </a:fontRef>
       </dsp:style>
       <dsp:txBody>
-        <a:bodyPr spcFirstLastPara="0" vert="horz" wrap="square" lIns="107808" tIns="22860" rIns="107808" bIns="22860" numCol="1" spcCol="1270" anchor="ctr" anchorCtr="0">
+        <a:bodyPr spcFirstLastPara="0" vert="horz" wrap="square" lIns="90558" tIns="20320" rIns="90558" bIns="20320" numCol="1" spcCol="1270" anchor="ctr" anchorCtr="0">
           <a:noAutofit/>
         </a:bodyPr>
         <a:lstStyle/>
         <a:p>
-          <a:pPr lvl="0" algn="ctr" defTabSz="800100">
+          <a:pPr lvl="0" algn="ctr" defTabSz="711200">
             <a:lnSpc>
               <a:spcPct val="90000"/>
             </a:lnSpc>
@@ -20839,21 +22238,21 @@
             </a:spcAft>
           </a:pPr>
           <a:r>
-            <a:rPr lang="en-US" sz="1800" kern="1200" dirty="0" smtClean="0">
+            <a:rPr lang="en-US" sz="1600" kern="1200" dirty="0" smtClean="0">
               <a:latin typeface="Times New Roman" pitchFamily="18" charset="0"/>
               <a:cs typeface="Times New Roman" pitchFamily="18" charset="0"/>
             </a:rPr>
             <a:t>C++ routines to access FSDB values in time-based fashion</a:t>
           </a:r>
-          <a:endParaRPr lang="en-US" sz="1800" kern="1200" dirty="0">
+          <a:endParaRPr lang="en-US" sz="1600" kern="1200" dirty="0">
             <a:latin typeface="Times New Roman" pitchFamily="18" charset="0"/>
             <a:cs typeface="Times New Roman" pitchFamily="18" charset="0"/>
           </a:endParaRPr>
         </a:p>
       </dsp:txBody>
       <dsp:txXfrm>
-        <a:off x="3135324" y="1283506"/>
-        <a:ext cx="1958950" cy="1958950"/>
+        <a:off x="2633833" y="149348"/>
+        <a:ext cx="1645518" cy="1645518"/>
       </dsp:txXfrm>
     </dsp:sp>
     <dsp:sp modelId="{3DD52E65-2217-47DF-A607-061BC38D9280}">
@@ -20863,8 +22262,8 @@
       </dsp:nvSpPr>
       <dsp:spPr>
         <a:xfrm>
-          <a:off x="4702485" y="1283506"/>
-          <a:ext cx="1958950" cy="1958950"/>
+          <a:off x="3950248" y="149348"/>
+          <a:ext cx="1645518" cy="1645518"/>
         </a:xfrm>
         <a:prstGeom prst="ellipse">
           <a:avLst/>
@@ -20944,12 +22343,12 @@
         </a:fontRef>
       </dsp:style>
       <dsp:txBody>
-        <a:bodyPr spcFirstLastPara="0" vert="horz" wrap="square" lIns="107808" tIns="22860" rIns="107808" bIns="22860" numCol="1" spcCol="1270" anchor="ctr" anchorCtr="0">
+        <a:bodyPr spcFirstLastPara="0" vert="horz" wrap="square" lIns="90558" tIns="20320" rIns="90558" bIns="20320" numCol="1" spcCol="1270" anchor="ctr" anchorCtr="0">
           <a:noAutofit/>
         </a:bodyPr>
         <a:lstStyle/>
         <a:p>
-          <a:pPr lvl="0" algn="ctr" defTabSz="800100">
+          <a:pPr lvl="0" algn="ctr" defTabSz="711200">
             <a:lnSpc>
               <a:spcPct val="90000"/>
             </a:lnSpc>
@@ -20961,32 +22360,32 @@
             </a:spcAft>
           </a:pPr>
           <a:r>
-            <a:rPr lang="en-US" sz="1800" kern="1200" dirty="0" smtClean="0">
+            <a:rPr lang="en-US" sz="1600" kern="1200" dirty="0" smtClean="0">
               <a:latin typeface="Times New Roman" pitchFamily="18" charset="0"/>
               <a:cs typeface="Times New Roman" pitchFamily="18" charset="0"/>
             </a:rPr>
             <a:t>Convert values in FSDB format to DKI format</a:t>
           </a:r>
-          <a:endParaRPr lang="en-US" sz="1800" kern="1200" dirty="0">
+          <a:endParaRPr lang="en-US" sz="1600" kern="1200" dirty="0">
             <a:latin typeface="Times New Roman" pitchFamily="18" charset="0"/>
             <a:cs typeface="Times New Roman" pitchFamily="18" charset="0"/>
           </a:endParaRPr>
         </a:p>
       </dsp:txBody>
       <dsp:txXfrm>
-        <a:off x="4702485" y="1283506"/>
-        <a:ext cx="1958950" cy="1958950"/>
+        <a:off x="3950248" y="149348"/>
+        <a:ext cx="1645518" cy="1645518"/>
       </dsp:txXfrm>
     </dsp:sp>
-    <dsp:sp modelId="{A9CDDF6E-DECC-441B-AB37-2DFAEC4BAD99}">
+    <dsp:sp modelId="{0EB00A86-5C8D-4D03-B6AD-4EF11F5D25B3}">
       <dsp:nvSpPr>
         <dsp:cNvPr id="0" name=""/>
         <dsp:cNvSpPr/>
       </dsp:nvSpPr>
       <dsp:spPr>
         <a:xfrm>
-          <a:off x="6269645" y="1283506"/>
-          <a:ext cx="1958950" cy="1958950"/>
+          <a:off x="5266662" y="149348"/>
+          <a:ext cx="1645518" cy="1645518"/>
         </a:xfrm>
         <a:prstGeom prst="ellipse">
           <a:avLst/>
@@ -21066,12 +22465,12 @@
         </a:fontRef>
       </dsp:style>
       <dsp:txBody>
-        <a:bodyPr spcFirstLastPara="0" vert="horz" wrap="square" lIns="107808" tIns="22860" rIns="107808" bIns="22860" numCol="1" spcCol="1270" anchor="ctr" anchorCtr="0">
+        <a:bodyPr spcFirstLastPara="0" vert="horz" wrap="square" lIns="90558" tIns="20320" rIns="90558" bIns="20320" numCol="1" spcCol="1270" anchor="ctr" anchorCtr="0">
           <a:noAutofit/>
         </a:bodyPr>
         <a:lstStyle/>
         <a:p>
-          <a:pPr lvl="0" algn="ctr" defTabSz="800100">
+          <a:pPr lvl="0" algn="ctr" defTabSz="711200">
             <a:lnSpc>
               <a:spcPct val="90000"/>
             </a:lnSpc>
@@ -21083,28 +22482,150 @@
             </a:spcAft>
           </a:pPr>
           <a:r>
-            <a:rPr lang="en-US" sz="1800" kern="1200" dirty="0" err="1" smtClean="0">
+            <a:rPr lang="en-US" sz="1600" kern="1200" dirty="0" smtClean="0">
+              <a:latin typeface="Times New Roman" pitchFamily="18" charset="0"/>
+              <a:cs typeface="Times New Roman" pitchFamily="18" charset="0"/>
+            </a:rPr>
+            <a:t>PLI time based callbacks</a:t>
+          </a:r>
+          <a:endParaRPr lang="en-US" sz="1600" kern="1200" dirty="0">
+            <a:latin typeface="Times New Roman" pitchFamily="18" charset="0"/>
+            <a:cs typeface="Times New Roman" pitchFamily="18" charset="0"/>
+          </a:endParaRPr>
+        </a:p>
+      </dsp:txBody>
+      <dsp:txXfrm>
+        <a:off x="5266662" y="149348"/>
+        <a:ext cx="1645518" cy="1645518"/>
+      </dsp:txXfrm>
+    </dsp:sp>
+    <dsp:sp modelId="{A9CDDF6E-DECC-441B-AB37-2DFAEC4BAD99}">
+      <dsp:nvSpPr>
+        <dsp:cNvPr id="0" name=""/>
+        <dsp:cNvSpPr/>
+      </dsp:nvSpPr>
+      <dsp:spPr>
+        <a:xfrm>
+          <a:off x="6583077" y="149348"/>
+          <a:ext cx="1645518" cy="1645518"/>
+        </a:xfrm>
+        <a:prstGeom prst="ellipse">
+          <a:avLst/>
+        </a:prstGeom>
+        <a:gradFill rotWithShape="0">
+          <a:gsLst>
+            <a:gs pos="0">
+              <a:schemeClr val="accent1">
+                <a:alpha val="50000"/>
+                <a:hueOff val="0"/>
+                <a:satOff val="0"/>
+                <a:lumOff val="0"/>
+                <a:alphaOff val="0"/>
+                <a:shade val="51000"/>
+                <a:satMod val="130000"/>
+              </a:schemeClr>
+            </a:gs>
+            <a:gs pos="80000">
+              <a:schemeClr val="accent1">
+                <a:alpha val="50000"/>
+                <a:hueOff val="0"/>
+                <a:satOff val="0"/>
+                <a:lumOff val="0"/>
+                <a:alphaOff val="0"/>
+                <a:shade val="93000"/>
+                <a:satMod val="130000"/>
+              </a:schemeClr>
+            </a:gs>
+            <a:gs pos="100000">
+              <a:schemeClr val="accent1">
+                <a:alpha val="50000"/>
+                <a:hueOff val="0"/>
+                <a:satOff val="0"/>
+                <a:lumOff val="0"/>
+                <a:alphaOff val="0"/>
+                <a:shade val="94000"/>
+                <a:satMod val="135000"/>
+              </a:schemeClr>
+            </a:gs>
+          </a:gsLst>
+          <a:lin ang="16200000" scaled="0"/>
+        </a:gradFill>
+        <a:ln>
+          <a:noFill/>
+        </a:ln>
+        <a:effectLst>
+          <a:outerShdw blurRad="40000" dist="23000" dir="5400000" rotWithShape="0">
+            <a:srgbClr val="000000">
+              <a:alpha val="35000"/>
+            </a:srgbClr>
+          </a:outerShdw>
+        </a:effectLst>
+        <a:scene3d>
+          <a:camera prst="orthographicFront">
+            <a:rot lat="0" lon="0" rev="0"/>
+          </a:camera>
+          <a:lightRig rig="threePt" dir="t">
+            <a:rot lat="0" lon="0" rev="1200000"/>
+          </a:lightRig>
+        </a:scene3d>
+        <a:sp3d>
+          <a:bevelT w="63500" h="25400"/>
+        </a:sp3d>
+      </dsp:spPr>
+      <dsp:style>
+        <a:lnRef idx="0">
+          <a:scrgbClr r="0" g="0" b="0"/>
+        </a:lnRef>
+        <a:fillRef idx="3">
+          <a:scrgbClr r="0" g="0" b="0"/>
+        </a:fillRef>
+        <a:effectRef idx="3">
+          <a:scrgbClr r="0" g="0" b="0"/>
+        </a:effectRef>
+        <a:fontRef idx="minor">
+          <a:schemeClr val="tx1"/>
+        </a:fontRef>
+      </dsp:style>
+      <dsp:txBody>
+        <a:bodyPr spcFirstLastPara="0" vert="horz" wrap="square" lIns="90558" tIns="20320" rIns="90558" bIns="20320" numCol="1" spcCol="1270" anchor="ctr" anchorCtr="0">
+          <a:noAutofit/>
+        </a:bodyPr>
+        <a:lstStyle/>
+        <a:p>
+          <a:pPr lvl="0" algn="ctr" defTabSz="711200">
+            <a:lnSpc>
+              <a:spcPct val="90000"/>
+            </a:lnSpc>
+            <a:spcBef>
+              <a:spcPct val="0"/>
+            </a:spcBef>
+            <a:spcAft>
+              <a:spcPct val="35000"/>
+            </a:spcAft>
+          </a:pPr>
+          <a:r>
+            <a:rPr lang="en-US" sz="1600" kern="1200" dirty="0" err="1" smtClean="0">
               <a:latin typeface="Times New Roman" pitchFamily="18" charset="0"/>
               <a:cs typeface="Times New Roman" pitchFamily="18" charset="0"/>
             </a:rPr>
             <a:t>Netlist</a:t>
           </a:r>
           <a:r>
-            <a:rPr lang="en-US" sz="1800" kern="1200" dirty="0" smtClean="0">
+            <a:rPr lang="en-US" sz="1600" kern="1200" dirty="0" smtClean="0">
               <a:latin typeface="Times New Roman" pitchFamily="18" charset="0"/>
               <a:cs typeface="Times New Roman" pitchFamily="18" charset="0"/>
             </a:rPr>
             <a:t> Simulation</a:t>
           </a:r>
-          <a:endParaRPr lang="en-US" sz="1800" kern="1200" dirty="0">
+          <a:endParaRPr lang="en-US" sz="1600" kern="1200" dirty="0">
             <a:latin typeface="Times New Roman" pitchFamily="18" charset="0"/>
             <a:cs typeface="Times New Roman" pitchFamily="18" charset="0"/>
           </a:endParaRPr>
         </a:p>
       </dsp:txBody>
       <dsp:txXfrm>
-        <a:off x="6269645" y="1283506"/>
-        <a:ext cx="1958950" cy="1958950"/>
+        <a:off x="6583077" y="149348"/>
+        <a:ext cx="1645518" cy="1645518"/>
       </dsp:txXfrm>
     </dsp:sp>
   </dsp:spTree>
@@ -21420,6 +22941,563 @@
       <dsp:txXfrm>
         <a:off x="537377" y="1600"/>
         <a:ext cx="1539376" cy="1539376"/>
+      </dsp:txXfrm>
+    </dsp:sp>
+  </dsp:spTree>
+</dsp:drawing>
+</file>
+
+<file path=ppt/diagrams/drawing18.xml><?xml version="1.0" encoding="utf-8"?>
+<dsp:drawing xmlns:dgm="http://schemas.openxmlformats.org/drawingml/2006/diagram" xmlns:a="http://schemas.openxmlformats.org/drawingml/2006/main" xmlns:dsp="http://schemas.microsoft.com/office/drawing/2008/diagram">
+  <dsp:spTree>
+    <dsp:nvGrpSpPr>
+      <dsp:cNvPr id="0" name=""/>
+      <dsp:cNvGrpSpPr/>
+    </dsp:nvGrpSpPr>
+    <dsp:grpSpPr/>
+    <dsp:sp modelId="{7B806281-0297-4181-9E3F-131037759B04}">
+      <dsp:nvSpPr>
+        <dsp:cNvPr id="0" name=""/>
+        <dsp:cNvSpPr/>
+      </dsp:nvSpPr>
+      <dsp:spPr>
+        <a:xfrm>
+          <a:off x="542450" y="74789"/>
+          <a:ext cx="2153489" cy="1882420"/>
+        </a:xfrm>
+        <a:prstGeom prst="rightArrow">
+          <a:avLst>
+            <a:gd name="adj1" fmla="val 70000"/>
+            <a:gd name="adj2" fmla="val 50000"/>
+          </a:avLst>
+        </a:prstGeom>
+        <a:solidFill>
+          <a:schemeClr val="accent1">
+            <a:alpha val="90000"/>
+            <a:tint val="40000"/>
+            <a:hueOff val="0"/>
+            <a:satOff val="0"/>
+            <a:lumOff val="0"/>
+            <a:alphaOff val="0"/>
+          </a:schemeClr>
+        </a:solidFill>
+        <a:ln w="25400" cap="flat" cmpd="sng" algn="ctr">
+          <a:solidFill>
+            <a:schemeClr val="accent1">
+              <a:alpha val="90000"/>
+              <a:tint val="40000"/>
+              <a:hueOff val="0"/>
+              <a:satOff val="0"/>
+              <a:lumOff val="0"/>
+              <a:alphaOff val="0"/>
+            </a:schemeClr>
+          </a:solidFill>
+          <a:prstDash val="solid"/>
+        </a:ln>
+        <a:effectLst/>
+      </dsp:spPr>
+      <dsp:style>
+        <a:lnRef idx="2">
+          <a:scrgbClr r="0" g="0" b="0"/>
+        </a:lnRef>
+        <a:fillRef idx="1">
+          <a:scrgbClr r="0" g="0" b="0"/>
+        </a:fillRef>
+        <a:effectRef idx="0">
+          <a:scrgbClr r="0" g="0" b="0"/>
+        </a:effectRef>
+        <a:fontRef idx="minor"/>
+      </dsp:style>
+      <dsp:txBody>
+        <a:bodyPr spcFirstLastPara="0" vert="horz" wrap="square" lIns="38100" tIns="9525" rIns="19050" bIns="9525" numCol="1" spcCol="1270" anchor="ctr" anchorCtr="0">
+          <a:noAutofit/>
+        </a:bodyPr>
+        <a:lstStyle/>
+        <a:p>
+          <a:pPr marL="114300" lvl="1" indent="-114300" algn="l" defTabSz="666750">
+            <a:lnSpc>
+              <a:spcPct val="90000"/>
+            </a:lnSpc>
+            <a:spcBef>
+              <a:spcPct val="0"/>
+            </a:spcBef>
+            <a:spcAft>
+              <a:spcPct val="15000"/>
+            </a:spcAft>
+            <a:buChar char="••"/>
+          </a:pPr>
+          <a:r>
+            <a:rPr lang="en-US" sz="1500" kern="1200" dirty="0" smtClean="0"/>
+            <a:t>Apply Stimulus</a:t>
+          </a:r>
+          <a:endParaRPr lang="en-US" sz="1500" kern="1200" dirty="0"/>
+        </a:p>
+        <a:p>
+          <a:pPr marL="114300" lvl="1" indent="-114300" algn="l" defTabSz="666750">
+            <a:lnSpc>
+              <a:spcPct val="90000"/>
+            </a:lnSpc>
+            <a:spcBef>
+              <a:spcPct val="0"/>
+            </a:spcBef>
+            <a:spcAft>
+              <a:spcPct val="15000"/>
+            </a:spcAft>
+            <a:buChar char="••"/>
+          </a:pPr>
+          <a:r>
+            <a:rPr lang="en-US" sz="1500" kern="1200" dirty="0" smtClean="0"/>
+            <a:t>Simulation Proceeds</a:t>
+          </a:r>
+          <a:endParaRPr lang="en-US" sz="1500" kern="1200" dirty="0"/>
+        </a:p>
+      </dsp:txBody>
+      <dsp:txXfrm>
+        <a:off x="1080823" y="74789"/>
+        <a:ext cx="1615116" cy="1882420"/>
+      </dsp:txXfrm>
+    </dsp:sp>
+    <dsp:sp modelId="{3323C78C-5959-43A3-8333-6291B30DB1C7}">
+      <dsp:nvSpPr>
+        <dsp:cNvPr id="0" name=""/>
+        <dsp:cNvSpPr/>
+      </dsp:nvSpPr>
+      <dsp:spPr>
+        <a:xfrm>
+          <a:off x="4078" y="477627"/>
+          <a:ext cx="1076744" cy="1076744"/>
+        </a:xfrm>
+        <a:prstGeom prst="ellipse">
+          <a:avLst/>
+        </a:prstGeom>
+        <a:solidFill>
+          <a:schemeClr val="accent1">
+            <a:hueOff val="0"/>
+            <a:satOff val="0"/>
+            <a:lumOff val="0"/>
+            <a:alphaOff val="0"/>
+          </a:schemeClr>
+        </a:solidFill>
+        <a:ln w="25400" cap="flat" cmpd="sng" algn="ctr">
+          <a:solidFill>
+            <a:schemeClr val="lt1">
+              <a:hueOff val="0"/>
+              <a:satOff val="0"/>
+              <a:lumOff val="0"/>
+              <a:alphaOff val="0"/>
+            </a:schemeClr>
+          </a:solidFill>
+          <a:prstDash val="solid"/>
+        </a:ln>
+        <a:effectLst/>
+      </dsp:spPr>
+      <dsp:style>
+        <a:lnRef idx="2">
+          <a:scrgbClr r="0" g="0" b="0"/>
+        </a:lnRef>
+        <a:fillRef idx="1">
+          <a:scrgbClr r="0" g="0" b="0"/>
+        </a:fillRef>
+        <a:effectRef idx="0">
+          <a:scrgbClr r="0" g="0" b="0"/>
+        </a:effectRef>
+        <a:fontRef idx="minor">
+          <a:schemeClr val="lt1"/>
+        </a:fontRef>
+      </dsp:style>
+      <dsp:txBody>
+        <a:bodyPr spcFirstLastPara="0" vert="horz" wrap="square" lIns="16510" tIns="16510" rIns="16510" bIns="16510" numCol="1" spcCol="1270" anchor="ctr" anchorCtr="0">
+          <a:noAutofit/>
+        </a:bodyPr>
+        <a:lstStyle/>
+        <a:p>
+          <a:pPr lvl="0" algn="ctr" defTabSz="1155700">
+            <a:lnSpc>
+              <a:spcPct val="90000"/>
+            </a:lnSpc>
+            <a:spcBef>
+              <a:spcPct val="0"/>
+            </a:spcBef>
+            <a:spcAft>
+              <a:spcPct val="35000"/>
+            </a:spcAft>
+          </a:pPr>
+          <a:r>
+            <a:rPr lang="en-US" sz="2600" kern="1200" dirty="0" smtClean="0"/>
+            <a:t>Time </a:t>
+          </a:r>
+          <a:r>
+            <a:rPr lang="en-US" sz="2600" kern="1200" dirty="0" smtClean="0"/>
+            <a:t>‘M’</a:t>
+          </a:r>
+          <a:endParaRPr lang="en-US" sz="2600" kern="1200" dirty="0"/>
+        </a:p>
+      </dsp:txBody>
+      <dsp:txXfrm>
+        <a:off x="4078" y="477627"/>
+        <a:ext cx="1076744" cy="1076744"/>
+      </dsp:txXfrm>
+    </dsp:sp>
+    <dsp:sp modelId="{2DDD2D22-A762-45A0-9949-31828912D06C}">
+      <dsp:nvSpPr>
+        <dsp:cNvPr id="0" name=""/>
+        <dsp:cNvSpPr/>
+      </dsp:nvSpPr>
+      <dsp:spPr>
+        <a:xfrm>
+          <a:off x="3368905" y="74789"/>
+          <a:ext cx="2153489" cy="1882420"/>
+        </a:xfrm>
+        <a:prstGeom prst="rightArrow">
+          <a:avLst>
+            <a:gd name="adj1" fmla="val 70000"/>
+            <a:gd name="adj2" fmla="val 50000"/>
+          </a:avLst>
+        </a:prstGeom>
+        <a:solidFill>
+          <a:schemeClr val="accent1">
+            <a:alpha val="90000"/>
+            <a:tint val="40000"/>
+            <a:hueOff val="0"/>
+            <a:satOff val="0"/>
+            <a:lumOff val="0"/>
+            <a:alphaOff val="0"/>
+          </a:schemeClr>
+        </a:solidFill>
+        <a:ln w="25400" cap="flat" cmpd="sng" algn="ctr">
+          <a:solidFill>
+            <a:schemeClr val="accent1">
+              <a:alpha val="90000"/>
+              <a:tint val="40000"/>
+              <a:hueOff val="0"/>
+              <a:satOff val="0"/>
+              <a:lumOff val="0"/>
+              <a:alphaOff val="0"/>
+            </a:schemeClr>
+          </a:solidFill>
+          <a:prstDash val="solid"/>
+        </a:ln>
+        <a:effectLst/>
+      </dsp:spPr>
+      <dsp:style>
+        <a:lnRef idx="2">
+          <a:scrgbClr r="0" g="0" b="0"/>
+        </a:lnRef>
+        <a:fillRef idx="1">
+          <a:scrgbClr r="0" g="0" b="0"/>
+        </a:fillRef>
+        <a:effectRef idx="0">
+          <a:scrgbClr r="0" g="0" b="0"/>
+        </a:effectRef>
+        <a:fontRef idx="minor"/>
+      </dsp:style>
+      <dsp:txBody>
+        <a:bodyPr spcFirstLastPara="0" vert="horz" wrap="square" lIns="38100" tIns="9525" rIns="19050" bIns="9525" numCol="1" spcCol="1270" anchor="ctr" anchorCtr="0">
+          <a:noAutofit/>
+        </a:bodyPr>
+        <a:lstStyle/>
+        <a:p>
+          <a:pPr marL="114300" lvl="1" indent="-114300" algn="l" defTabSz="666750">
+            <a:lnSpc>
+              <a:spcPct val="90000"/>
+            </a:lnSpc>
+            <a:spcBef>
+              <a:spcPct val="0"/>
+            </a:spcBef>
+            <a:spcAft>
+              <a:spcPct val="15000"/>
+            </a:spcAft>
+            <a:buChar char="••"/>
+          </a:pPr>
+          <a:r>
+            <a:rPr lang="en-US" sz="1500" kern="1200" dirty="0" smtClean="0"/>
+            <a:t>Apply Stimulus</a:t>
+          </a:r>
+          <a:endParaRPr lang="en-US" sz="1500" kern="1200" dirty="0"/>
+        </a:p>
+        <a:p>
+          <a:pPr marL="114300" lvl="1" indent="-114300" algn="l" defTabSz="666750">
+            <a:lnSpc>
+              <a:spcPct val="90000"/>
+            </a:lnSpc>
+            <a:spcBef>
+              <a:spcPct val="0"/>
+            </a:spcBef>
+            <a:spcAft>
+              <a:spcPct val="15000"/>
+            </a:spcAft>
+            <a:buChar char="••"/>
+          </a:pPr>
+          <a:r>
+            <a:rPr lang="en-US" sz="1500" kern="1200" dirty="0" smtClean="0"/>
+            <a:t>Simulation Proceeds</a:t>
+          </a:r>
+          <a:endParaRPr lang="en-US" sz="1500" kern="1200" dirty="0"/>
+        </a:p>
+      </dsp:txBody>
+      <dsp:txXfrm>
+        <a:off x="3907277" y="74789"/>
+        <a:ext cx="1615116" cy="1882420"/>
+      </dsp:txXfrm>
+    </dsp:sp>
+    <dsp:sp modelId="{A0B10877-C878-4F97-B58E-16E374CAD393}">
+      <dsp:nvSpPr>
+        <dsp:cNvPr id="0" name=""/>
+        <dsp:cNvSpPr/>
+      </dsp:nvSpPr>
+      <dsp:spPr>
+        <a:xfrm>
+          <a:off x="2830533" y="477627"/>
+          <a:ext cx="1076744" cy="1076744"/>
+        </a:xfrm>
+        <a:prstGeom prst="ellipse">
+          <a:avLst/>
+        </a:prstGeom>
+        <a:solidFill>
+          <a:schemeClr val="accent1">
+            <a:hueOff val="0"/>
+            <a:satOff val="0"/>
+            <a:lumOff val="0"/>
+            <a:alphaOff val="0"/>
+          </a:schemeClr>
+        </a:solidFill>
+        <a:ln w="25400" cap="flat" cmpd="sng" algn="ctr">
+          <a:solidFill>
+            <a:schemeClr val="lt1">
+              <a:hueOff val="0"/>
+              <a:satOff val="0"/>
+              <a:lumOff val="0"/>
+              <a:alphaOff val="0"/>
+            </a:schemeClr>
+          </a:solidFill>
+          <a:prstDash val="solid"/>
+        </a:ln>
+        <a:effectLst/>
+      </dsp:spPr>
+      <dsp:style>
+        <a:lnRef idx="2">
+          <a:scrgbClr r="0" g="0" b="0"/>
+        </a:lnRef>
+        <a:fillRef idx="1">
+          <a:scrgbClr r="0" g="0" b="0"/>
+        </a:fillRef>
+        <a:effectRef idx="0">
+          <a:scrgbClr r="0" g="0" b="0"/>
+        </a:effectRef>
+        <a:fontRef idx="minor">
+          <a:schemeClr val="lt1"/>
+        </a:fontRef>
+      </dsp:style>
+      <dsp:txBody>
+        <a:bodyPr spcFirstLastPara="0" vert="horz" wrap="square" lIns="16510" tIns="16510" rIns="16510" bIns="16510" numCol="1" spcCol="1270" anchor="ctr" anchorCtr="0">
+          <a:noAutofit/>
+        </a:bodyPr>
+        <a:lstStyle/>
+        <a:p>
+          <a:pPr lvl="0" algn="ctr" defTabSz="1155700">
+            <a:lnSpc>
+              <a:spcPct val="90000"/>
+            </a:lnSpc>
+            <a:spcBef>
+              <a:spcPct val="0"/>
+            </a:spcBef>
+            <a:spcAft>
+              <a:spcPct val="35000"/>
+            </a:spcAft>
+          </a:pPr>
+          <a:r>
+            <a:rPr lang="en-US" sz="2600" kern="1200" smtClean="0"/>
+            <a:t>Time </a:t>
+          </a:r>
+          <a:r>
+            <a:rPr lang="en-US" sz="2600" kern="1200" smtClean="0"/>
+            <a:t>‘N’</a:t>
+          </a:r>
+          <a:endParaRPr lang="en-US" sz="2600" kern="1200" dirty="0"/>
+        </a:p>
+      </dsp:txBody>
+      <dsp:txXfrm>
+        <a:off x="2830533" y="477627"/>
+        <a:ext cx="1076744" cy="1076744"/>
+      </dsp:txXfrm>
+    </dsp:sp>
+    <dsp:sp modelId="{4E60EA4B-21DD-4DDC-875F-3BE12FB00CDE}">
+      <dsp:nvSpPr>
+        <dsp:cNvPr id="0" name=""/>
+        <dsp:cNvSpPr/>
+      </dsp:nvSpPr>
+      <dsp:spPr>
+        <a:xfrm>
+          <a:off x="6195360" y="74789"/>
+          <a:ext cx="2153489" cy="1882420"/>
+        </a:xfrm>
+        <a:prstGeom prst="rightArrow">
+          <a:avLst>
+            <a:gd name="adj1" fmla="val 70000"/>
+            <a:gd name="adj2" fmla="val 50000"/>
+          </a:avLst>
+        </a:prstGeom>
+        <a:solidFill>
+          <a:schemeClr val="accent1">
+            <a:alpha val="90000"/>
+            <a:tint val="40000"/>
+            <a:hueOff val="0"/>
+            <a:satOff val="0"/>
+            <a:lumOff val="0"/>
+            <a:alphaOff val="0"/>
+          </a:schemeClr>
+        </a:solidFill>
+        <a:ln w="25400" cap="flat" cmpd="sng" algn="ctr">
+          <a:solidFill>
+            <a:schemeClr val="accent1">
+              <a:alpha val="90000"/>
+              <a:tint val="40000"/>
+              <a:hueOff val="0"/>
+              <a:satOff val="0"/>
+              <a:lumOff val="0"/>
+              <a:alphaOff val="0"/>
+            </a:schemeClr>
+          </a:solidFill>
+          <a:prstDash val="solid"/>
+        </a:ln>
+        <a:effectLst/>
+      </dsp:spPr>
+      <dsp:style>
+        <a:lnRef idx="2">
+          <a:scrgbClr r="0" g="0" b="0"/>
+        </a:lnRef>
+        <a:fillRef idx="1">
+          <a:scrgbClr r="0" g="0" b="0"/>
+        </a:fillRef>
+        <a:effectRef idx="0">
+          <a:scrgbClr r="0" g="0" b="0"/>
+        </a:effectRef>
+        <a:fontRef idx="minor"/>
+      </dsp:style>
+      <dsp:txBody>
+        <a:bodyPr spcFirstLastPara="0" vert="horz" wrap="square" lIns="38100" tIns="9525" rIns="19050" bIns="9525" numCol="1" spcCol="1270" anchor="ctr" anchorCtr="0">
+          <a:noAutofit/>
+        </a:bodyPr>
+        <a:lstStyle/>
+        <a:p>
+          <a:pPr marL="114300" lvl="1" indent="-114300" algn="l" defTabSz="666750">
+            <a:lnSpc>
+              <a:spcPct val="90000"/>
+            </a:lnSpc>
+            <a:spcBef>
+              <a:spcPct val="0"/>
+            </a:spcBef>
+            <a:spcAft>
+              <a:spcPct val="15000"/>
+            </a:spcAft>
+            <a:buChar char="••"/>
+          </a:pPr>
+          <a:r>
+            <a:rPr lang="en-US" sz="1500" kern="1200" dirty="0" smtClean="0"/>
+            <a:t>Apply Stimulus</a:t>
+          </a:r>
+          <a:endParaRPr lang="en-US" sz="1500" kern="1200" dirty="0"/>
+        </a:p>
+        <a:p>
+          <a:pPr marL="114300" lvl="1" indent="-114300" algn="l" defTabSz="666750">
+            <a:lnSpc>
+              <a:spcPct val="90000"/>
+            </a:lnSpc>
+            <a:spcBef>
+              <a:spcPct val="0"/>
+            </a:spcBef>
+            <a:spcAft>
+              <a:spcPct val="15000"/>
+            </a:spcAft>
+            <a:buChar char="••"/>
+          </a:pPr>
+          <a:r>
+            <a:rPr lang="en-US" sz="1500" kern="1200" dirty="0" smtClean="0"/>
+            <a:t>Simulation Proceeds</a:t>
+          </a:r>
+          <a:endParaRPr lang="en-US" sz="1500" kern="1200" dirty="0"/>
+        </a:p>
+      </dsp:txBody>
+      <dsp:txXfrm>
+        <a:off x="6733732" y="74789"/>
+        <a:ext cx="1615116" cy="1882420"/>
+      </dsp:txXfrm>
+    </dsp:sp>
+    <dsp:sp modelId="{9EDE3C6D-A507-4130-BB59-0BE7C8A78BE8}">
+      <dsp:nvSpPr>
+        <dsp:cNvPr id="0" name=""/>
+        <dsp:cNvSpPr/>
+      </dsp:nvSpPr>
+      <dsp:spPr>
+        <a:xfrm>
+          <a:off x="5656987" y="477627"/>
+          <a:ext cx="1076744" cy="1076744"/>
+        </a:xfrm>
+        <a:prstGeom prst="ellipse">
+          <a:avLst/>
+        </a:prstGeom>
+        <a:solidFill>
+          <a:schemeClr val="accent1">
+            <a:hueOff val="0"/>
+            <a:satOff val="0"/>
+            <a:lumOff val="0"/>
+            <a:alphaOff val="0"/>
+          </a:schemeClr>
+        </a:solidFill>
+        <a:ln w="25400" cap="flat" cmpd="sng" algn="ctr">
+          <a:solidFill>
+            <a:schemeClr val="lt1">
+              <a:hueOff val="0"/>
+              <a:satOff val="0"/>
+              <a:lumOff val="0"/>
+              <a:alphaOff val="0"/>
+            </a:schemeClr>
+          </a:solidFill>
+          <a:prstDash val="solid"/>
+        </a:ln>
+        <a:effectLst/>
+      </dsp:spPr>
+      <dsp:style>
+        <a:lnRef idx="2">
+          <a:scrgbClr r="0" g="0" b="0"/>
+        </a:lnRef>
+        <a:fillRef idx="1">
+          <a:scrgbClr r="0" g="0" b="0"/>
+        </a:fillRef>
+        <a:effectRef idx="0">
+          <a:scrgbClr r="0" g="0" b="0"/>
+        </a:effectRef>
+        <a:fontRef idx="minor">
+          <a:schemeClr val="lt1"/>
+        </a:fontRef>
+      </dsp:style>
+      <dsp:txBody>
+        <a:bodyPr spcFirstLastPara="0" vert="horz" wrap="square" lIns="16510" tIns="16510" rIns="16510" bIns="16510" numCol="1" spcCol="1270" anchor="ctr" anchorCtr="0">
+          <a:noAutofit/>
+        </a:bodyPr>
+        <a:lstStyle/>
+        <a:p>
+          <a:pPr lvl="0" algn="ctr" defTabSz="1155700">
+            <a:lnSpc>
+              <a:spcPct val="90000"/>
+            </a:lnSpc>
+            <a:spcBef>
+              <a:spcPct val="0"/>
+            </a:spcBef>
+            <a:spcAft>
+              <a:spcPct val="35000"/>
+            </a:spcAft>
+          </a:pPr>
+          <a:r>
+            <a:rPr lang="en-US" sz="2600" kern="1200" dirty="0" smtClean="0"/>
+            <a:t>Time ‘O’</a:t>
+          </a:r>
+          <a:endParaRPr lang="en-US" sz="2600" kern="1200" dirty="0"/>
+        </a:p>
+      </dsp:txBody>
+      <dsp:txXfrm>
+        <a:off x="5656987" y="477627"/>
+        <a:ext cx="1076744" cy="1076744"/>
       </dsp:txXfrm>
     </dsp:sp>
   </dsp:spTree>
@@ -24930,6 +27008,300 @@
 </dgm:layoutDef>
 </file>
 
+<file path=ppt/diagrams/layout18.xml><?xml version="1.0" encoding="utf-8"?>
+<dgm:layoutDef xmlns:dgm="http://schemas.openxmlformats.org/drawingml/2006/diagram" xmlns:a="http://schemas.openxmlformats.org/drawingml/2006/main" uniqueId="urn:microsoft.com/office/officeart/2005/8/layout/hProcess6">
+  <dgm:title val=""/>
+  <dgm:desc val=""/>
+  <dgm:catLst>
+    <dgm:cat type="process" pri="7000"/>
+  </dgm:catLst>
+  <dgm:sampData>
+    <dgm:dataModel>
+      <dgm:ptLst>
+        <dgm:pt modelId="0" type="doc"/>
+        <dgm:pt modelId="1">
+          <dgm:prSet phldr="1"/>
+        </dgm:pt>
+        <dgm:pt modelId="11">
+          <dgm:prSet phldr="1"/>
+        </dgm:pt>
+        <dgm:pt modelId="12">
+          <dgm:prSet phldr="1"/>
+        </dgm:pt>
+        <dgm:pt modelId="2">
+          <dgm:prSet phldr="1"/>
+        </dgm:pt>
+        <dgm:pt modelId="21">
+          <dgm:prSet phldr="1"/>
+        </dgm:pt>
+        <dgm:pt modelId="22">
+          <dgm:prSet phldr="1"/>
+        </dgm:pt>
+        <dgm:pt modelId="3">
+          <dgm:prSet phldr="1"/>
+        </dgm:pt>
+        <dgm:pt modelId="31">
+          <dgm:prSet phldr="1"/>
+        </dgm:pt>
+        <dgm:pt modelId="32">
+          <dgm:prSet phldr="1"/>
+        </dgm:pt>
+      </dgm:ptLst>
+      <dgm:cxnLst>
+        <dgm:cxn modelId="4" srcId="0" destId="1" srcOrd="0" destOrd="0"/>
+        <dgm:cxn modelId="5" srcId="0" destId="2" srcOrd="1" destOrd="0"/>
+        <dgm:cxn modelId="13" srcId="1" destId="11" srcOrd="0" destOrd="0"/>
+        <dgm:cxn modelId="14" srcId="1" destId="12" srcOrd="0" destOrd="0"/>
+        <dgm:cxn modelId="23" srcId="2" destId="21" srcOrd="0" destOrd="0"/>
+        <dgm:cxn modelId="24" srcId="2" destId="22" srcOrd="0" destOrd="0"/>
+        <dgm:cxn modelId="33" srcId="3" destId="31" srcOrd="0" destOrd="0"/>
+        <dgm:cxn modelId="34" srcId="3" destId="32" srcOrd="0" destOrd="0"/>
+      </dgm:cxnLst>
+      <dgm:bg/>
+      <dgm:whole/>
+    </dgm:dataModel>
+  </dgm:sampData>
+  <dgm:styleData>
+    <dgm:dataModel>
+      <dgm:ptLst>
+        <dgm:pt modelId="0" type="doc"/>
+        <dgm:pt modelId="1"/>
+        <dgm:pt modelId="11"/>
+        <dgm:pt modelId="2"/>
+        <dgm:pt modelId="21"/>
+      </dgm:ptLst>
+      <dgm:cxnLst>
+        <dgm:cxn modelId="4" srcId="0" destId="1" srcOrd="0" destOrd="0"/>
+        <dgm:cxn modelId="5" srcId="0" destId="2" srcOrd="1" destOrd="0"/>
+        <dgm:cxn modelId="13" srcId="1" destId="11" srcOrd="0" destOrd="0"/>
+        <dgm:cxn modelId="23" srcId="2" destId="21" srcOrd="0" destOrd="0"/>
+      </dgm:cxnLst>
+      <dgm:bg/>
+      <dgm:whole/>
+    </dgm:dataModel>
+  </dgm:styleData>
+  <dgm:clrData>
+    <dgm:dataModel>
+      <dgm:ptLst>
+        <dgm:pt modelId="0" type="doc"/>
+        <dgm:pt modelId="1"/>
+        <dgm:pt modelId="11"/>
+        <dgm:pt modelId="2"/>
+        <dgm:pt modelId="21"/>
+        <dgm:pt modelId="3"/>
+        <dgm:pt modelId="31"/>
+        <dgm:pt modelId="4"/>
+        <dgm:pt modelId="41"/>
+      </dgm:ptLst>
+      <dgm:cxnLst>
+        <dgm:cxn modelId="5" srcId="0" destId="1" srcOrd="0" destOrd="0"/>
+        <dgm:cxn modelId="6" srcId="0" destId="2" srcOrd="1" destOrd="0"/>
+        <dgm:cxn modelId="7" srcId="0" destId="3" srcOrd="2" destOrd="0"/>
+        <dgm:cxn modelId="8" srcId="0" destId="4" srcOrd="3" destOrd="0"/>
+        <dgm:cxn modelId="13" srcId="1" destId="11" srcOrd="0" destOrd="0"/>
+        <dgm:cxn modelId="23" srcId="2" destId="21" srcOrd="0" destOrd="0"/>
+        <dgm:cxn modelId="33" srcId="3" destId="31" srcOrd="0" destOrd="0"/>
+        <dgm:cxn modelId="43" srcId="4" destId="41" srcOrd="0" destOrd="0"/>
+      </dgm:cxnLst>
+      <dgm:bg/>
+      <dgm:whole/>
+    </dgm:dataModel>
+  </dgm:clrData>
+  <dgm:layoutNode name="theList">
+    <dgm:varLst>
+      <dgm:dir/>
+      <dgm:animLvl val="lvl"/>
+      <dgm:resizeHandles val="exact"/>
+    </dgm:varLst>
+    <dgm:choose name="Name0">
+      <dgm:if name="Name1" func="var" arg="dir" op="equ" val="norm">
+        <dgm:alg type="lin">
+          <dgm:param type="linDir" val="fromL"/>
+          <dgm:param type="nodeHorzAlign" val="l"/>
+        </dgm:alg>
+      </dgm:if>
+      <dgm:else name="Name2">
+        <dgm:alg type="lin">
+          <dgm:param type="linDir" val="fromR"/>
+          <dgm:param type="nodeHorzAlign" val="r"/>
+        </dgm:alg>
+      </dgm:else>
+    </dgm:choose>
+    <dgm:shape xmlns:r="http://schemas.openxmlformats.org/officeDocument/2006/relationships" r:blip="">
+      <dgm:adjLst/>
+    </dgm:shape>
+    <dgm:presOf/>
+    <dgm:constrLst>
+      <dgm:constr type="w" for="ch" forName="compNode" refType="w"/>
+      <dgm:constr type="h" for="ch" forName="compNode" refType="w" refFor="ch" refForName="compNode" fact="0.7"/>
+      <dgm:constr type="ctrY" for="ch" forName="compNode" refType="h" fact="0.5"/>
+      <dgm:constr type="w" for="ch" forName="aSpace" refType="w" fact="0.05"/>
+      <dgm:constr type="primFontSz" for="des" forName="childTextHidden" op="equ" val="65"/>
+      <dgm:constr type="primFontSz" for="des" forName="parentText" op="equ"/>
+    </dgm:constrLst>
+    <dgm:ruleLst/>
+    <dgm:forEach name="aNodeForEach" axis="ch" ptType="node">
+      <dgm:layoutNode name="compNode">
+        <dgm:alg type="composite">
+          <dgm:param type="ar" val="1.43"/>
+        </dgm:alg>
+        <dgm:shape xmlns:r="http://schemas.openxmlformats.org/officeDocument/2006/relationships" r:blip="">
+          <dgm:adjLst/>
+        </dgm:shape>
+        <dgm:presOf/>
+        <dgm:choose name="Name3">
+          <dgm:if name="Name4" func="var" arg="dir" op="equ" val="norm">
+            <dgm:constrLst>
+              <dgm:constr type="w" for="ch" forName="childTextVisible" refType="w" fact="0.8"/>
+              <dgm:constr type="h" for="ch" forName="childTextVisible" refType="h"/>
+              <dgm:constr type="r" for="ch" forName="childTextVisible" refType="w"/>
+              <dgm:constr type="w" for="ch" forName="childTextHidden" refType="w" fact="0.6"/>
+              <dgm:constr type="h" for="ch" forName="childTextHidden" refType="h"/>
+              <dgm:constr type="r" for="ch" forName="childTextHidden" refType="w"/>
+              <dgm:constr type="l" for="ch" forName="parentText"/>
+              <dgm:constr type="w" for="ch" forName="parentText" refType="w" fact="0.4"/>
+              <dgm:constr type="h" for="ch" forName="parentText" refType="w" refFor="ch" refForName="parentText" op="equ"/>
+              <dgm:constr type="ctrY" for="ch" forName="parentText" refType="h" fact="0.5"/>
+            </dgm:constrLst>
+          </dgm:if>
+          <dgm:else name="Name5">
+            <dgm:constrLst>
+              <dgm:constr type="w" for="ch" forName="childTextVisible" refType="w" fact="0.8"/>
+              <dgm:constr type="h" for="ch" forName="childTextVisible" refType="h"/>
+              <dgm:constr type="l" for="ch" forName="childTextVisible"/>
+              <dgm:constr type="w" for="ch" forName="childTextHidden" refType="w" fact="0.6"/>
+              <dgm:constr type="h" for="ch" forName="childTextHidden" refType="h"/>
+              <dgm:constr type="l" for="ch" forName="childTextHidden"/>
+              <dgm:constr type="r" for="ch" forName="parentText" refType="w"/>
+              <dgm:constr type="w" for="ch" forName="parentText" refType="w" fact="0.4"/>
+              <dgm:constr type="h" for="ch" forName="parentText" refType="w" refFor="ch" refForName="parentText" op="equ"/>
+              <dgm:constr type="ctrY" for="ch" forName="parentText" refType="h" fact="0.5"/>
+            </dgm:constrLst>
+          </dgm:else>
+        </dgm:choose>
+        <dgm:ruleLst/>
+        <dgm:layoutNode name="noGeometry">
+          <dgm:alg type="sp"/>
+          <dgm:shape xmlns:r="http://schemas.openxmlformats.org/officeDocument/2006/relationships" r:blip="">
+            <dgm:adjLst/>
+          </dgm:shape>
+          <dgm:presOf/>
+          <dgm:constrLst/>
+          <dgm:ruleLst/>
+        </dgm:layoutNode>
+        <dgm:layoutNode name="childTextVisible" styleLbl="bgAccFollowNode1">
+          <dgm:varLst>
+            <dgm:bulletEnabled val="1"/>
+          </dgm:varLst>
+          <dgm:alg type="sp"/>
+          <dgm:choose name="Name6">
+            <dgm:if name="Name7" func="var" arg="dir" op="equ" val="norm">
+              <dgm:shape xmlns:r="http://schemas.openxmlformats.org/officeDocument/2006/relationships" type="rightArrow" r:blip="">
+                <dgm:adjLst>
+                  <dgm:adj idx="1" val="0.7"/>
+                  <dgm:adj idx="2" val="0.5"/>
+                </dgm:adjLst>
+              </dgm:shape>
+            </dgm:if>
+            <dgm:else name="Name8">
+              <dgm:shape xmlns:r="http://schemas.openxmlformats.org/officeDocument/2006/relationships" type="leftArrow" r:blip="">
+                <dgm:adjLst>
+                  <dgm:adj idx="1" val="0.7"/>
+                  <dgm:adj idx="2" val="0.5"/>
+                </dgm:adjLst>
+              </dgm:shape>
+            </dgm:else>
+          </dgm:choose>
+          <dgm:presOf axis="des" ptType="node"/>
+          <dgm:constrLst/>
+          <dgm:ruleLst/>
+        </dgm:layoutNode>
+        <dgm:layoutNode name="childTextHidden" styleLbl="bgAccFollowNode1">
+          <dgm:choose name="Name9">
+            <dgm:if name="Name10" axis="des followSib" ptType="node node" st="1 1" cnt="1 0" func="cnt" op="gte" val="1">
+              <dgm:alg type="tx">
+                <dgm:param type="stBulletLvl" val="1"/>
+                <dgm:param type="txAnchorVertCh" val="mid"/>
+              </dgm:alg>
+            </dgm:if>
+            <dgm:else name="Name11">
+              <dgm:alg type="tx">
+                <dgm:param type="stBulletLvl" val="2"/>
+                <dgm:param type="txAnchorVertCh" val="mid"/>
+              </dgm:alg>
+            </dgm:else>
+          </dgm:choose>
+          <dgm:choose name="Name12">
+            <dgm:if name="Name13" func="var" arg="dir" op="equ" val="norm">
+              <dgm:shape xmlns:r="http://schemas.openxmlformats.org/officeDocument/2006/relationships" type="rightArrow" r:blip="" hideGeom="1">
+                <dgm:adjLst>
+                  <dgm:adj idx="1" val="0.7"/>
+                  <dgm:adj idx="2" val="0.5"/>
+                </dgm:adjLst>
+              </dgm:shape>
+            </dgm:if>
+            <dgm:else name="Name14">
+              <dgm:shape xmlns:r="http://schemas.openxmlformats.org/officeDocument/2006/relationships" type="leftArrow" r:blip="" hideGeom="1">
+                <dgm:adjLst>
+                  <dgm:adj idx="1" val="0.7"/>
+                  <dgm:adj idx="2" val="0.5"/>
+                </dgm:adjLst>
+              </dgm:shape>
+            </dgm:else>
+          </dgm:choose>
+          <dgm:presOf axis="des" ptType="node"/>
+          <dgm:constrLst>
+            <dgm:constr type="secFontSz" refType="primFontSz"/>
+            <dgm:constr type="tMarg" refType="primFontSz" fact="0.05"/>
+            <dgm:constr type="bMarg" refType="primFontSz" fact="0.05"/>
+            <dgm:constr type="rMarg" refType="primFontSz" fact="0.1"/>
+            <dgm:constr type="lMarg" refType="primFontSz" fact="0.2"/>
+          </dgm:constrLst>
+          <dgm:ruleLst>
+            <dgm:rule type="primFontSz" val="5" fact="NaN" max="NaN"/>
+          </dgm:ruleLst>
+        </dgm:layoutNode>
+        <dgm:layoutNode name="parentText" styleLbl="node1">
+          <dgm:varLst>
+            <dgm:chMax val="1"/>
+            <dgm:bulletEnabled val="1"/>
+          </dgm:varLst>
+          <dgm:alg type="tx"/>
+          <dgm:shape xmlns:r="http://schemas.openxmlformats.org/officeDocument/2006/relationships" type="ellipse" r:blip="">
+            <dgm:adjLst/>
+          </dgm:shape>
+          <dgm:presOf axis="self"/>
+          <dgm:constrLst>
+            <dgm:constr type="primFontSz" val="65"/>
+            <dgm:constr type="tMarg" refType="primFontSz" fact="0.05"/>
+            <dgm:constr type="bMarg" refType="primFontSz" fact="0.05"/>
+            <dgm:constr type="lMarg" refType="primFontSz" fact="0.05"/>
+            <dgm:constr type="rMarg" refType="primFontSz" fact="0.05"/>
+          </dgm:constrLst>
+          <dgm:ruleLst>
+            <dgm:rule type="primFontSz" val="5" fact="NaN" max="NaN"/>
+          </dgm:ruleLst>
+        </dgm:layoutNode>
+      </dgm:layoutNode>
+      <dgm:choose name="Name15">
+        <dgm:if name="Name16" axis="self" ptType="node" func="revPos" op="gte" val="2">
+          <dgm:layoutNode name="aSpace">
+            <dgm:alg type="sp"/>
+            <dgm:shape xmlns:r="http://schemas.openxmlformats.org/officeDocument/2006/relationships" r:blip="">
+              <dgm:adjLst/>
+            </dgm:shape>
+            <dgm:presOf/>
+            <dgm:constrLst/>
+            <dgm:ruleLst/>
+          </dgm:layoutNode>
+        </dgm:if>
+        <dgm:else name="Name17"/>
+      </dgm:choose>
+    </dgm:forEach>
+  </dgm:layoutNode>
+</dgm:layoutDef>
+</file>
+
 <file path=ppt/diagrams/layout2.xml><?xml version="1.0" encoding="utf-8"?>
 <dgm:layoutDef xmlns:dgm="http://schemas.openxmlformats.org/drawingml/2006/diagram" xmlns:a="http://schemas.openxmlformats.org/drawingml/2006/main" uniqueId="urn:microsoft.com/office/officeart/2005/8/layout/chevron1">
   <dgm:title val=""/>
@@ -36153,6 +38525,1040 @@
 </dgm:styleDef>
 </file>
 
+<file path=ppt/diagrams/quickStyle18.xml><?xml version="1.0" encoding="utf-8"?>
+<dgm:styleDef xmlns:dgm="http://schemas.openxmlformats.org/drawingml/2006/diagram" xmlns:a="http://schemas.openxmlformats.org/drawingml/2006/main" uniqueId="urn:microsoft.com/office/officeart/2005/8/quickstyle/simple1">
+  <dgm:title val=""/>
+  <dgm:desc val=""/>
+  <dgm:catLst>
+    <dgm:cat type="simple" pri="10100"/>
+  </dgm:catLst>
+  <dgm:scene3d>
+    <a:camera prst="orthographicFront"/>
+    <a:lightRig rig="threePt" dir="t"/>
+  </dgm:scene3d>
+  <dgm:styleLbl name="node0">
+    <dgm:scene3d>
+      <a:camera prst="orthographicFront"/>
+      <a:lightRig rig="threePt" dir="t"/>
+    </dgm:scene3d>
+    <dgm:sp3d/>
+    <dgm:txPr/>
+    <dgm:style>
+      <a:lnRef idx="2">
+        <a:scrgbClr r="0" g="0" b="0"/>
+      </a:lnRef>
+      <a:fillRef idx="1">
+        <a:scrgbClr r="0" g="0" b="0"/>
+      </a:fillRef>
+      <a:effectRef idx="0">
+        <a:scrgbClr r="0" g="0" b="0"/>
+      </a:effectRef>
+      <a:fontRef idx="minor">
+        <a:schemeClr val="lt1"/>
+      </a:fontRef>
+    </dgm:style>
+  </dgm:styleLbl>
+  <dgm:styleLbl name="lnNode1">
+    <dgm:scene3d>
+      <a:camera prst="orthographicFront"/>
+      <a:lightRig rig="threePt" dir="t"/>
+    </dgm:scene3d>
+    <dgm:sp3d/>
+    <dgm:txPr/>
+    <dgm:style>
+      <a:lnRef idx="2">
+        <a:scrgbClr r="0" g="0" b="0"/>
+      </a:lnRef>
+      <a:fillRef idx="1">
+        <a:scrgbClr r="0" g="0" b="0"/>
+      </a:fillRef>
+      <a:effectRef idx="0">
+        <a:scrgbClr r="0" g="0" b="0"/>
+      </a:effectRef>
+      <a:fontRef idx="minor">
+        <a:schemeClr val="lt1"/>
+      </a:fontRef>
+    </dgm:style>
+  </dgm:styleLbl>
+  <dgm:styleLbl name="vennNode1">
+    <dgm:scene3d>
+      <a:camera prst="orthographicFront"/>
+      <a:lightRig rig="threePt" dir="t"/>
+    </dgm:scene3d>
+    <dgm:sp3d/>
+    <dgm:txPr/>
+    <dgm:style>
+      <a:lnRef idx="2">
+        <a:scrgbClr r="0" g="0" b="0"/>
+      </a:lnRef>
+      <a:fillRef idx="1">
+        <a:scrgbClr r="0" g="0" b="0"/>
+      </a:fillRef>
+      <a:effectRef idx="0">
+        <a:scrgbClr r="0" g="0" b="0"/>
+      </a:effectRef>
+      <a:fontRef idx="minor">
+        <a:schemeClr val="tx1"/>
+      </a:fontRef>
+    </dgm:style>
+  </dgm:styleLbl>
+  <dgm:styleLbl name="alignNode1">
+    <dgm:scene3d>
+      <a:camera prst="orthographicFront"/>
+      <a:lightRig rig="threePt" dir="t"/>
+    </dgm:scene3d>
+    <dgm:sp3d/>
+    <dgm:txPr/>
+    <dgm:style>
+      <a:lnRef idx="2">
+        <a:scrgbClr r="0" g="0" b="0"/>
+      </a:lnRef>
+      <a:fillRef idx="1">
+        <a:scrgbClr r="0" g="0" b="0"/>
+      </a:fillRef>
+      <a:effectRef idx="0">
+        <a:scrgbClr r="0" g="0" b="0"/>
+      </a:effectRef>
+      <a:fontRef idx="minor">
+        <a:schemeClr val="lt1"/>
+      </a:fontRef>
+    </dgm:style>
+  </dgm:styleLbl>
+  <dgm:styleLbl name="node1">
+    <dgm:scene3d>
+      <a:camera prst="orthographicFront"/>
+      <a:lightRig rig="threePt" dir="t"/>
+    </dgm:scene3d>
+    <dgm:sp3d/>
+    <dgm:txPr/>
+    <dgm:style>
+      <a:lnRef idx="2">
+        <a:scrgbClr r="0" g="0" b="0"/>
+      </a:lnRef>
+      <a:fillRef idx="1">
+        <a:scrgbClr r="0" g="0" b="0"/>
+      </a:fillRef>
+      <a:effectRef idx="0">
+        <a:scrgbClr r="0" g="0" b="0"/>
+      </a:effectRef>
+      <a:fontRef idx="minor">
+        <a:schemeClr val="lt1"/>
+      </a:fontRef>
+    </dgm:style>
+  </dgm:styleLbl>
+  <dgm:styleLbl name="node2">
+    <dgm:scene3d>
+      <a:camera prst="orthographicFront"/>
+      <a:lightRig rig="threePt" dir="t"/>
+    </dgm:scene3d>
+    <dgm:sp3d/>
+    <dgm:txPr/>
+    <dgm:style>
+      <a:lnRef idx="2">
+        <a:scrgbClr r="0" g="0" b="0"/>
+      </a:lnRef>
+      <a:fillRef idx="1">
+        <a:scrgbClr r="0" g="0" b="0"/>
+      </a:fillRef>
+      <a:effectRef idx="0">
+        <a:scrgbClr r="0" g="0" b="0"/>
+      </a:effectRef>
+      <a:fontRef idx="minor">
+        <a:schemeClr val="lt1"/>
+      </a:fontRef>
+    </dgm:style>
+  </dgm:styleLbl>
+  <dgm:styleLbl name="node3">
+    <dgm:scene3d>
+      <a:camera prst="orthographicFront"/>
+      <a:lightRig rig="threePt" dir="t"/>
+    </dgm:scene3d>
+    <dgm:sp3d/>
+    <dgm:txPr/>
+    <dgm:style>
+      <a:lnRef idx="2">
+        <a:scrgbClr r="0" g="0" b="0"/>
+      </a:lnRef>
+      <a:fillRef idx="1">
+        <a:scrgbClr r="0" g="0" b="0"/>
+      </a:fillRef>
+      <a:effectRef idx="0">
+        <a:scrgbClr r="0" g="0" b="0"/>
+      </a:effectRef>
+      <a:fontRef idx="minor">
+        <a:schemeClr val="lt1"/>
+      </a:fontRef>
+    </dgm:style>
+  </dgm:styleLbl>
+  <dgm:styleLbl name="node4">
+    <dgm:scene3d>
+      <a:camera prst="orthographicFront"/>
+      <a:lightRig rig="threePt" dir="t"/>
+    </dgm:scene3d>
+    <dgm:sp3d/>
+    <dgm:txPr/>
+    <dgm:style>
+      <a:lnRef idx="2">
+        <a:scrgbClr r="0" g="0" b="0"/>
+      </a:lnRef>
+      <a:fillRef idx="1">
+        <a:scrgbClr r="0" g="0" b="0"/>
+      </a:fillRef>
+      <a:effectRef idx="0">
+        <a:scrgbClr r="0" g="0" b="0"/>
+      </a:effectRef>
+      <a:fontRef idx="minor">
+        <a:schemeClr val="lt1"/>
+      </a:fontRef>
+    </dgm:style>
+  </dgm:styleLbl>
+  <dgm:styleLbl name="fgImgPlace1">
+    <dgm:scene3d>
+      <a:camera prst="orthographicFront"/>
+      <a:lightRig rig="threePt" dir="t"/>
+    </dgm:scene3d>
+    <dgm:sp3d/>
+    <dgm:txPr/>
+    <dgm:style>
+      <a:lnRef idx="2">
+        <a:scrgbClr r="0" g="0" b="0"/>
+      </a:lnRef>
+      <a:fillRef idx="1">
+        <a:scrgbClr r="0" g="0" b="0"/>
+      </a:fillRef>
+      <a:effectRef idx="0">
+        <a:scrgbClr r="0" g="0" b="0"/>
+      </a:effectRef>
+      <a:fontRef idx="minor"/>
+    </dgm:style>
+  </dgm:styleLbl>
+  <dgm:styleLbl name="alignImgPlace1">
+    <dgm:scene3d>
+      <a:camera prst="orthographicFront"/>
+      <a:lightRig rig="threePt" dir="t"/>
+    </dgm:scene3d>
+    <dgm:sp3d/>
+    <dgm:txPr/>
+    <dgm:style>
+      <a:lnRef idx="2">
+        <a:scrgbClr r="0" g="0" b="0"/>
+      </a:lnRef>
+      <a:fillRef idx="1">
+        <a:scrgbClr r="0" g="0" b="0"/>
+      </a:fillRef>
+      <a:effectRef idx="0">
+        <a:scrgbClr r="0" g="0" b="0"/>
+      </a:effectRef>
+      <a:fontRef idx="minor"/>
+    </dgm:style>
+  </dgm:styleLbl>
+  <dgm:styleLbl name="bgImgPlace1">
+    <dgm:scene3d>
+      <a:camera prst="orthographicFront"/>
+      <a:lightRig rig="threePt" dir="t"/>
+    </dgm:scene3d>
+    <dgm:sp3d/>
+    <dgm:txPr/>
+    <dgm:style>
+      <a:lnRef idx="2">
+        <a:scrgbClr r="0" g="0" b="0"/>
+      </a:lnRef>
+      <a:fillRef idx="1">
+        <a:scrgbClr r="0" g="0" b="0"/>
+      </a:fillRef>
+      <a:effectRef idx="0">
+        <a:scrgbClr r="0" g="0" b="0"/>
+      </a:effectRef>
+      <a:fontRef idx="minor"/>
+    </dgm:style>
+  </dgm:styleLbl>
+  <dgm:styleLbl name="sibTrans2D1">
+    <dgm:scene3d>
+      <a:camera prst="orthographicFront"/>
+      <a:lightRig rig="threePt" dir="t"/>
+    </dgm:scene3d>
+    <dgm:sp3d/>
+    <dgm:txPr/>
+    <dgm:style>
+      <a:lnRef idx="0">
+        <a:scrgbClr r="0" g="0" b="0"/>
+      </a:lnRef>
+      <a:fillRef idx="1">
+        <a:scrgbClr r="0" g="0" b="0"/>
+      </a:fillRef>
+      <a:effectRef idx="0">
+        <a:scrgbClr r="0" g="0" b="0"/>
+      </a:effectRef>
+      <a:fontRef idx="minor">
+        <a:schemeClr val="lt1"/>
+      </a:fontRef>
+    </dgm:style>
+  </dgm:styleLbl>
+  <dgm:styleLbl name="fgSibTrans2D1">
+    <dgm:scene3d>
+      <a:camera prst="orthographicFront"/>
+      <a:lightRig rig="threePt" dir="t"/>
+    </dgm:scene3d>
+    <dgm:sp3d/>
+    <dgm:txPr/>
+    <dgm:style>
+      <a:lnRef idx="0">
+        <a:scrgbClr r="0" g="0" b="0"/>
+      </a:lnRef>
+      <a:fillRef idx="1">
+        <a:scrgbClr r="0" g="0" b="0"/>
+      </a:fillRef>
+      <a:effectRef idx="0">
+        <a:scrgbClr r="0" g="0" b="0"/>
+      </a:effectRef>
+      <a:fontRef idx="minor">
+        <a:schemeClr val="lt1"/>
+      </a:fontRef>
+    </dgm:style>
+  </dgm:styleLbl>
+  <dgm:styleLbl name="bgSibTrans2D1">
+    <dgm:scene3d>
+      <a:camera prst="orthographicFront"/>
+      <a:lightRig rig="threePt" dir="t"/>
+    </dgm:scene3d>
+    <dgm:sp3d/>
+    <dgm:txPr/>
+    <dgm:style>
+      <a:lnRef idx="0">
+        <a:scrgbClr r="0" g="0" b="0"/>
+      </a:lnRef>
+      <a:fillRef idx="1">
+        <a:scrgbClr r="0" g="0" b="0"/>
+      </a:fillRef>
+      <a:effectRef idx="0">
+        <a:scrgbClr r="0" g="0" b="0"/>
+      </a:effectRef>
+      <a:fontRef idx="minor">
+        <a:schemeClr val="lt1"/>
+      </a:fontRef>
+    </dgm:style>
+  </dgm:styleLbl>
+  <dgm:styleLbl name="sibTrans1D1">
+    <dgm:scene3d>
+      <a:camera prst="orthographicFront"/>
+      <a:lightRig rig="threePt" dir="t"/>
+    </dgm:scene3d>
+    <dgm:sp3d/>
+    <dgm:txPr/>
+    <dgm:style>
+      <a:lnRef idx="1">
+        <a:scrgbClr r="0" g="0" b="0"/>
+      </a:lnRef>
+      <a:fillRef idx="0">
+        <a:scrgbClr r="0" g="0" b="0"/>
+      </a:fillRef>
+      <a:effectRef idx="0">
+        <a:scrgbClr r="0" g="0" b="0"/>
+      </a:effectRef>
+      <a:fontRef idx="minor"/>
+    </dgm:style>
+  </dgm:styleLbl>
+  <dgm:styleLbl name="callout">
+    <dgm:scene3d>
+      <a:camera prst="orthographicFront"/>
+      <a:lightRig rig="threePt" dir="t"/>
+    </dgm:scene3d>
+    <dgm:sp3d/>
+    <dgm:txPr/>
+    <dgm:style>
+      <a:lnRef idx="2">
+        <a:scrgbClr r="0" g="0" b="0"/>
+      </a:lnRef>
+      <a:fillRef idx="1">
+        <a:scrgbClr r="0" g="0" b="0"/>
+      </a:fillRef>
+      <a:effectRef idx="0">
+        <a:scrgbClr r="0" g="0" b="0"/>
+      </a:effectRef>
+      <a:fontRef idx="minor"/>
+    </dgm:style>
+  </dgm:styleLbl>
+  <dgm:styleLbl name="asst0">
+    <dgm:scene3d>
+      <a:camera prst="orthographicFront"/>
+      <a:lightRig rig="threePt" dir="t"/>
+    </dgm:scene3d>
+    <dgm:sp3d/>
+    <dgm:txPr/>
+    <dgm:style>
+      <a:lnRef idx="2">
+        <a:scrgbClr r="0" g="0" b="0"/>
+      </a:lnRef>
+      <a:fillRef idx="1">
+        <a:scrgbClr r="0" g="0" b="0"/>
+      </a:fillRef>
+      <a:effectRef idx="0">
+        <a:scrgbClr r="0" g="0" b="0"/>
+      </a:effectRef>
+      <a:fontRef idx="minor">
+        <a:schemeClr val="lt1"/>
+      </a:fontRef>
+    </dgm:style>
+  </dgm:styleLbl>
+  <dgm:styleLbl name="asst1">
+    <dgm:scene3d>
+      <a:camera prst="orthographicFront"/>
+      <a:lightRig rig="threePt" dir="t"/>
+    </dgm:scene3d>
+    <dgm:sp3d/>
+    <dgm:txPr/>
+    <dgm:style>
+      <a:lnRef idx="2">
+        <a:scrgbClr r="0" g="0" b="0"/>
+      </a:lnRef>
+      <a:fillRef idx="1">
+        <a:scrgbClr r="0" g="0" b="0"/>
+      </a:fillRef>
+      <a:effectRef idx="0">
+        <a:scrgbClr r="0" g="0" b="0"/>
+      </a:effectRef>
+      <a:fontRef idx="minor">
+        <a:schemeClr val="lt1"/>
+      </a:fontRef>
+    </dgm:style>
+  </dgm:styleLbl>
+  <dgm:styleLbl name="asst2">
+    <dgm:scene3d>
+      <a:camera prst="orthographicFront"/>
+      <a:lightRig rig="threePt" dir="t"/>
+    </dgm:scene3d>
+    <dgm:sp3d/>
+    <dgm:txPr/>
+    <dgm:style>
+      <a:lnRef idx="2">
+        <a:scrgbClr r="0" g="0" b="0"/>
+      </a:lnRef>
+      <a:fillRef idx="1">
+        <a:scrgbClr r="0" g="0" b="0"/>
+      </a:fillRef>
+      <a:effectRef idx="0">
+        <a:scrgbClr r="0" g="0" b="0"/>
+      </a:effectRef>
+      <a:fontRef idx="minor">
+        <a:schemeClr val="lt1"/>
+      </a:fontRef>
+    </dgm:style>
+  </dgm:styleLbl>
+  <dgm:styleLbl name="asst3">
+    <dgm:scene3d>
+      <a:camera prst="orthographicFront"/>
+      <a:lightRig rig="threePt" dir="t"/>
+    </dgm:scene3d>
+    <dgm:sp3d/>
+    <dgm:txPr/>
+    <dgm:style>
+      <a:lnRef idx="2">
+        <a:scrgbClr r="0" g="0" b="0"/>
+      </a:lnRef>
+      <a:fillRef idx="1">
+        <a:scrgbClr r="0" g="0" b="0"/>
+      </a:fillRef>
+      <a:effectRef idx="0">
+        <a:scrgbClr r="0" g="0" b="0"/>
+      </a:effectRef>
+      <a:fontRef idx="minor">
+        <a:schemeClr val="lt1"/>
+      </a:fontRef>
+    </dgm:style>
+  </dgm:styleLbl>
+  <dgm:styleLbl name="asst4">
+    <dgm:scene3d>
+      <a:camera prst="orthographicFront"/>
+      <a:lightRig rig="threePt" dir="t"/>
+    </dgm:scene3d>
+    <dgm:sp3d/>
+    <dgm:txPr/>
+    <dgm:style>
+      <a:lnRef idx="2">
+        <a:scrgbClr r="0" g="0" b="0"/>
+      </a:lnRef>
+      <a:fillRef idx="1">
+        <a:scrgbClr r="0" g="0" b="0"/>
+      </a:fillRef>
+      <a:effectRef idx="0">
+        <a:scrgbClr r="0" g="0" b="0"/>
+      </a:effectRef>
+      <a:fontRef idx="minor">
+        <a:schemeClr val="lt1"/>
+      </a:fontRef>
+    </dgm:style>
+  </dgm:styleLbl>
+  <dgm:styleLbl name="parChTrans2D1">
+    <dgm:scene3d>
+      <a:camera prst="orthographicFront"/>
+      <a:lightRig rig="threePt" dir="t"/>
+    </dgm:scene3d>
+    <dgm:sp3d/>
+    <dgm:txPr/>
+    <dgm:style>
+      <a:lnRef idx="2">
+        <a:scrgbClr r="0" g="0" b="0"/>
+      </a:lnRef>
+      <a:fillRef idx="1">
+        <a:scrgbClr r="0" g="0" b="0"/>
+      </a:fillRef>
+      <a:effectRef idx="0">
+        <a:scrgbClr r="0" g="0" b="0"/>
+      </a:effectRef>
+      <a:fontRef idx="minor">
+        <a:schemeClr val="lt1"/>
+      </a:fontRef>
+    </dgm:style>
+  </dgm:styleLbl>
+  <dgm:styleLbl name="parChTrans2D2">
+    <dgm:scene3d>
+      <a:camera prst="orthographicFront"/>
+      <a:lightRig rig="threePt" dir="t"/>
+    </dgm:scene3d>
+    <dgm:sp3d/>
+    <dgm:txPr/>
+    <dgm:style>
+      <a:lnRef idx="2">
+        <a:scrgbClr r="0" g="0" b="0"/>
+      </a:lnRef>
+      <a:fillRef idx="1">
+        <a:scrgbClr r="0" g="0" b="0"/>
+      </a:fillRef>
+      <a:effectRef idx="0">
+        <a:scrgbClr r="0" g="0" b="0"/>
+      </a:effectRef>
+      <a:fontRef idx="minor">
+        <a:schemeClr val="lt1"/>
+      </a:fontRef>
+    </dgm:style>
+  </dgm:styleLbl>
+  <dgm:styleLbl name="parChTrans2D3">
+    <dgm:scene3d>
+      <a:camera prst="orthographicFront"/>
+      <a:lightRig rig="threePt" dir="t"/>
+    </dgm:scene3d>
+    <dgm:sp3d/>
+    <dgm:txPr/>
+    <dgm:style>
+      <a:lnRef idx="2">
+        <a:scrgbClr r="0" g="0" b="0"/>
+      </a:lnRef>
+      <a:fillRef idx="1">
+        <a:scrgbClr r="0" g="0" b="0"/>
+      </a:fillRef>
+      <a:effectRef idx="0">
+        <a:scrgbClr r="0" g="0" b="0"/>
+      </a:effectRef>
+      <a:fontRef idx="minor">
+        <a:schemeClr val="lt1"/>
+      </a:fontRef>
+    </dgm:style>
+  </dgm:styleLbl>
+  <dgm:styleLbl name="parChTrans2D4">
+    <dgm:scene3d>
+      <a:camera prst="orthographicFront"/>
+      <a:lightRig rig="threePt" dir="t"/>
+    </dgm:scene3d>
+    <dgm:sp3d/>
+    <dgm:txPr/>
+    <dgm:style>
+      <a:lnRef idx="2">
+        <a:scrgbClr r="0" g="0" b="0"/>
+      </a:lnRef>
+      <a:fillRef idx="1">
+        <a:scrgbClr r="0" g="0" b="0"/>
+      </a:fillRef>
+      <a:effectRef idx="0">
+        <a:scrgbClr r="0" g="0" b="0"/>
+      </a:effectRef>
+      <a:fontRef idx="minor">
+        <a:schemeClr val="lt1"/>
+      </a:fontRef>
+    </dgm:style>
+  </dgm:styleLbl>
+  <dgm:styleLbl name="parChTrans1D1">
+    <dgm:scene3d>
+      <a:camera prst="orthographicFront"/>
+      <a:lightRig rig="threePt" dir="t"/>
+    </dgm:scene3d>
+    <dgm:sp3d/>
+    <dgm:txPr/>
+    <dgm:style>
+      <a:lnRef idx="2">
+        <a:scrgbClr r="0" g="0" b="0"/>
+      </a:lnRef>
+      <a:fillRef idx="0">
+        <a:scrgbClr r="0" g="0" b="0"/>
+      </a:fillRef>
+      <a:effectRef idx="0">
+        <a:scrgbClr r="0" g="0" b="0"/>
+      </a:effectRef>
+      <a:fontRef idx="minor"/>
+    </dgm:style>
+  </dgm:styleLbl>
+  <dgm:styleLbl name="parChTrans1D2">
+    <dgm:scene3d>
+      <a:camera prst="orthographicFront"/>
+      <a:lightRig rig="threePt" dir="t"/>
+    </dgm:scene3d>
+    <dgm:sp3d/>
+    <dgm:txPr/>
+    <dgm:style>
+      <a:lnRef idx="2">
+        <a:scrgbClr r="0" g="0" b="0"/>
+      </a:lnRef>
+      <a:fillRef idx="0">
+        <a:scrgbClr r="0" g="0" b="0"/>
+      </a:fillRef>
+      <a:effectRef idx="0">
+        <a:scrgbClr r="0" g="0" b="0"/>
+      </a:effectRef>
+      <a:fontRef idx="minor"/>
+    </dgm:style>
+  </dgm:styleLbl>
+  <dgm:styleLbl name="parChTrans1D3">
+    <dgm:scene3d>
+      <a:camera prst="orthographicFront"/>
+      <a:lightRig rig="threePt" dir="t"/>
+    </dgm:scene3d>
+    <dgm:sp3d/>
+    <dgm:txPr/>
+    <dgm:style>
+      <a:lnRef idx="2">
+        <a:scrgbClr r="0" g="0" b="0"/>
+      </a:lnRef>
+      <a:fillRef idx="0">
+        <a:scrgbClr r="0" g="0" b="0"/>
+      </a:fillRef>
+      <a:effectRef idx="0">
+        <a:scrgbClr r="0" g="0" b="0"/>
+      </a:effectRef>
+      <a:fontRef idx="minor"/>
+    </dgm:style>
+  </dgm:styleLbl>
+  <dgm:styleLbl name="parChTrans1D4">
+    <dgm:scene3d>
+      <a:camera prst="orthographicFront"/>
+      <a:lightRig rig="threePt" dir="t"/>
+    </dgm:scene3d>
+    <dgm:sp3d/>
+    <dgm:txPr/>
+    <dgm:style>
+      <a:lnRef idx="2">
+        <a:scrgbClr r="0" g="0" b="0"/>
+      </a:lnRef>
+      <a:fillRef idx="0">
+        <a:scrgbClr r="0" g="0" b="0"/>
+      </a:fillRef>
+      <a:effectRef idx="0">
+        <a:scrgbClr r="0" g="0" b="0"/>
+      </a:effectRef>
+      <a:fontRef idx="minor"/>
+    </dgm:style>
+  </dgm:styleLbl>
+  <dgm:styleLbl name="fgAcc1">
+    <dgm:scene3d>
+      <a:camera prst="orthographicFront"/>
+      <a:lightRig rig="threePt" dir="t"/>
+    </dgm:scene3d>
+    <dgm:sp3d/>
+    <dgm:txPr/>
+    <dgm:style>
+      <a:lnRef idx="2">
+        <a:scrgbClr r="0" g="0" b="0"/>
+      </a:lnRef>
+      <a:fillRef idx="1">
+        <a:scrgbClr r="0" g="0" b="0"/>
+      </a:fillRef>
+      <a:effectRef idx="0">
+        <a:scrgbClr r="0" g="0" b="0"/>
+      </a:effectRef>
+      <a:fontRef idx="minor"/>
+    </dgm:style>
+  </dgm:styleLbl>
+  <dgm:styleLbl name="conFgAcc1">
+    <dgm:scene3d>
+      <a:camera prst="orthographicFront"/>
+      <a:lightRig rig="threePt" dir="t"/>
+    </dgm:scene3d>
+    <dgm:sp3d/>
+    <dgm:txPr/>
+    <dgm:style>
+      <a:lnRef idx="2">
+        <a:scrgbClr r="0" g="0" b="0"/>
+      </a:lnRef>
+      <a:fillRef idx="1">
+        <a:scrgbClr r="0" g="0" b="0"/>
+      </a:fillRef>
+      <a:effectRef idx="0">
+        <a:scrgbClr r="0" g="0" b="0"/>
+      </a:effectRef>
+      <a:fontRef idx="minor"/>
+    </dgm:style>
+  </dgm:styleLbl>
+  <dgm:styleLbl name="alignAcc1">
+    <dgm:scene3d>
+      <a:camera prst="orthographicFront"/>
+      <a:lightRig rig="threePt" dir="t"/>
+    </dgm:scene3d>
+    <dgm:sp3d/>
+    <dgm:txPr/>
+    <dgm:style>
+      <a:lnRef idx="2">
+        <a:scrgbClr r="0" g="0" b="0"/>
+      </a:lnRef>
+      <a:fillRef idx="1">
+        <a:scrgbClr r="0" g="0" b="0"/>
+      </a:fillRef>
+      <a:effectRef idx="0">
+        <a:scrgbClr r="0" g="0" b="0"/>
+      </a:effectRef>
+      <a:fontRef idx="minor"/>
+    </dgm:style>
+  </dgm:styleLbl>
+  <dgm:styleLbl name="trAlignAcc1">
+    <dgm:scene3d>
+      <a:camera prst="orthographicFront"/>
+      <a:lightRig rig="threePt" dir="t"/>
+    </dgm:scene3d>
+    <dgm:sp3d/>
+    <dgm:txPr/>
+    <dgm:style>
+      <a:lnRef idx="1">
+        <a:scrgbClr r="0" g="0" b="0"/>
+      </a:lnRef>
+      <a:fillRef idx="1">
+        <a:scrgbClr r="0" g="0" b="0"/>
+      </a:fillRef>
+      <a:effectRef idx="0">
+        <a:scrgbClr r="0" g="0" b="0"/>
+      </a:effectRef>
+      <a:fontRef idx="minor"/>
+    </dgm:style>
+  </dgm:styleLbl>
+  <dgm:styleLbl name="bgAcc1">
+    <dgm:scene3d>
+      <a:camera prst="orthographicFront"/>
+      <a:lightRig rig="threePt" dir="t"/>
+    </dgm:scene3d>
+    <dgm:sp3d/>
+    <dgm:txPr/>
+    <dgm:style>
+      <a:lnRef idx="2">
+        <a:scrgbClr r="0" g="0" b="0"/>
+      </a:lnRef>
+      <a:fillRef idx="1">
+        <a:scrgbClr r="0" g="0" b="0"/>
+      </a:fillRef>
+      <a:effectRef idx="0">
+        <a:scrgbClr r="0" g="0" b="0"/>
+      </a:effectRef>
+      <a:fontRef idx="minor"/>
+    </dgm:style>
+  </dgm:styleLbl>
+  <dgm:styleLbl name="solidFgAcc1">
+    <dgm:scene3d>
+      <a:camera prst="orthographicFront"/>
+      <a:lightRig rig="threePt" dir="t"/>
+    </dgm:scene3d>
+    <dgm:sp3d/>
+    <dgm:txPr/>
+    <dgm:style>
+      <a:lnRef idx="2">
+        <a:scrgbClr r="0" g="0" b="0"/>
+      </a:lnRef>
+      <a:fillRef idx="1">
+        <a:scrgbClr r="0" g="0" b="0"/>
+      </a:fillRef>
+      <a:effectRef idx="0">
+        <a:scrgbClr r="0" g="0" b="0"/>
+      </a:effectRef>
+      <a:fontRef idx="minor"/>
+    </dgm:style>
+  </dgm:styleLbl>
+  <dgm:styleLbl name="solidAlignAcc1">
+    <dgm:scene3d>
+      <a:camera prst="orthographicFront"/>
+      <a:lightRig rig="threePt" dir="t"/>
+    </dgm:scene3d>
+    <dgm:sp3d/>
+    <dgm:txPr/>
+    <dgm:style>
+      <a:lnRef idx="2">
+        <a:scrgbClr r="0" g="0" b="0"/>
+      </a:lnRef>
+      <a:fillRef idx="1">
+        <a:scrgbClr r="0" g="0" b="0"/>
+      </a:fillRef>
+      <a:effectRef idx="0">
+        <a:scrgbClr r="0" g="0" b="0"/>
+      </a:effectRef>
+      <a:fontRef idx="minor"/>
+    </dgm:style>
+  </dgm:styleLbl>
+  <dgm:styleLbl name="solidBgAcc1">
+    <dgm:scene3d>
+      <a:camera prst="orthographicFront"/>
+      <a:lightRig rig="threePt" dir="t"/>
+    </dgm:scene3d>
+    <dgm:sp3d/>
+    <dgm:txPr/>
+    <dgm:style>
+      <a:lnRef idx="2">
+        <a:scrgbClr r="0" g="0" b="0"/>
+      </a:lnRef>
+      <a:fillRef idx="1">
+        <a:scrgbClr r="0" g="0" b="0"/>
+      </a:fillRef>
+      <a:effectRef idx="0">
+        <a:scrgbClr r="0" g="0" b="0"/>
+      </a:effectRef>
+      <a:fontRef idx="minor"/>
+    </dgm:style>
+  </dgm:styleLbl>
+  <dgm:styleLbl name="fgAccFollowNode1">
+    <dgm:scene3d>
+      <a:camera prst="orthographicFront"/>
+      <a:lightRig rig="threePt" dir="t"/>
+    </dgm:scene3d>
+    <dgm:sp3d/>
+    <dgm:txPr/>
+    <dgm:style>
+      <a:lnRef idx="2">
+        <a:scrgbClr r="0" g="0" b="0"/>
+      </a:lnRef>
+      <a:fillRef idx="1">
+        <a:scrgbClr r="0" g="0" b="0"/>
+      </a:fillRef>
+      <a:effectRef idx="0">
+        <a:scrgbClr r="0" g="0" b="0"/>
+      </a:effectRef>
+      <a:fontRef idx="minor"/>
+    </dgm:style>
+  </dgm:styleLbl>
+  <dgm:styleLbl name="alignAccFollowNode1">
+    <dgm:scene3d>
+      <a:camera prst="orthographicFront"/>
+      <a:lightRig rig="threePt" dir="t"/>
+    </dgm:scene3d>
+    <dgm:sp3d/>
+    <dgm:txPr/>
+    <dgm:style>
+      <a:lnRef idx="2">
+        <a:scrgbClr r="0" g="0" b="0"/>
+      </a:lnRef>
+      <a:fillRef idx="1">
+        <a:scrgbClr r="0" g="0" b="0"/>
+      </a:fillRef>
+      <a:effectRef idx="0">
+        <a:scrgbClr r="0" g="0" b="0"/>
+      </a:effectRef>
+      <a:fontRef idx="minor"/>
+    </dgm:style>
+  </dgm:styleLbl>
+  <dgm:styleLbl name="bgAccFollowNode1">
+    <dgm:scene3d>
+      <a:camera prst="orthographicFront"/>
+      <a:lightRig rig="threePt" dir="t"/>
+    </dgm:scene3d>
+    <dgm:sp3d/>
+    <dgm:txPr/>
+    <dgm:style>
+      <a:lnRef idx="2">
+        <a:scrgbClr r="0" g="0" b="0"/>
+      </a:lnRef>
+      <a:fillRef idx="1">
+        <a:scrgbClr r="0" g="0" b="0"/>
+      </a:fillRef>
+      <a:effectRef idx="0">
+        <a:scrgbClr r="0" g="0" b="0"/>
+      </a:effectRef>
+      <a:fontRef idx="minor"/>
+    </dgm:style>
+  </dgm:styleLbl>
+  <dgm:styleLbl name="fgAcc0">
+    <dgm:scene3d>
+      <a:camera prst="orthographicFront"/>
+      <a:lightRig rig="threePt" dir="t"/>
+    </dgm:scene3d>
+    <dgm:sp3d/>
+    <dgm:txPr/>
+    <dgm:style>
+      <a:lnRef idx="2">
+        <a:scrgbClr r="0" g="0" b="0"/>
+      </a:lnRef>
+      <a:fillRef idx="1">
+        <a:scrgbClr r="0" g="0" b="0"/>
+      </a:fillRef>
+      <a:effectRef idx="0">
+        <a:scrgbClr r="0" g="0" b="0"/>
+      </a:effectRef>
+      <a:fontRef idx="minor"/>
+    </dgm:style>
+  </dgm:styleLbl>
+  <dgm:styleLbl name="fgAcc2">
+    <dgm:scene3d>
+      <a:camera prst="orthographicFront"/>
+      <a:lightRig rig="threePt" dir="t"/>
+    </dgm:scene3d>
+    <dgm:sp3d/>
+    <dgm:txPr/>
+    <dgm:style>
+      <a:lnRef idx="2">
+        <a:scrgbClr r="0" g="0" b="0"/>
+      </a:lnRef>
+      <a:fillRef idx="1">
+        <a:scrgbClr r="0" g="0" b="0"/>
+      </a:fillRef>
+      <a:effectRef idx="0">
+        <a:scrgbClr r="0" g="0" b="0"/>
+      </a:effectRef>
+      <a:fontRef idx="minor"/>
+    </dgm:style>
+  </dgm:styleLbl>
+  <dgm:styleLbl name="fgAcc3">
+    <dgm:scene3d>
+      <a:camera prst="orthographicFront"/>
+      <a:lightRig rig="threePt" dir="t"/>
+    </dgm:scene3d>
+    <dgm:sp3d/>
+    <dgm:txPr/>
+    <dgm:style>
+      <a:lnRef idx="2">
+        <a:scrgbClr r="0" g="0" b="0"/>
+      </a:lnRef>
+      <a:fillRef idx="1">
+        <a:scrgbClr r="0" g="0" b="0"/>
+      </a:fillRef>
+      <a:effectRef idx="0">
+        <a:scrgbClr r="0" g="0" b="0"/>
+      </a:effectRef>
+      <a:fontRef idx="minor"/>
+    </dgm:style>
+  </dgm:styleLbl>
+  <dgm:styleLbl name="fgAcc4">
+    <dgm:scene3d>
+      <a:camera prst="orthographicFront"/>
+      <a:lightRig rig="threePt" dir="t"/>
+    </dgm:scene3d>
+    <dgm:sp3d/>
+    <dgm:txPr/>
+    <dgm:style>
+      <a:lnRef idx="2">
+        <a:scrgbClr r="0" g="0" b="0"/>
+      </a:lnRef>
+      <a:fillRef idx="1">
+        <a:scrgbClr r="0" g="0" b="0"/>
+      </a:fillRef>
+      <a:effectRef idx="0">
+        <a:scrgbClr r="0" g="0" b="0"/>
+      </a:effectRef>
+      <a:fontRef idx="minor"/>
+    </dgm:style>
+  </dgm:styleLbl>
+  <dgm:styleLbl name="bgShp">
+    <dgm:scene3d>
+      <a:camera prst="orthographicFront"/>
+      <a:lightRig rig="threePt" dir="t"/>
+    </dgm:scene3d>
+    <dgm:sp3d/>
+    <dgm:txPr/>
+    <dgm:style>
+      <a:lnRef idx="0">
+        <a:scrgbClr r="0" g="0" b="0"/>
+      </a:lnRef>
+      <a:fillRef idx="1">
+        <a:scrgbClr r="0" g="0" b="0"/>
+      </a:fillRef>
+      <a:effectRef idx="0">
+        <a:scrgbClr r="0" g="0" b="0"/>
+      </a:effectRef>
+      <a:fontRef idx="minor"/>
+    </dgm:style>
+  </dgm:styleLbl>
+  <dgm:styleLbl name="dkBgShp">
+    <dgm:scene3d>
+      <a:camera prst="orthographicFront"/>
+      <a:lightRig rig="threePt" dir="t"/>
+    </dgm:scene3d>
+    <dgm:sp3d/>
+    <dgm:txPr/>
+    <dgm:style>
+      <a:lnRef idx="0">
+        <a:scrgbClr r="0" g="0" b="0"/>
+      </a:lnRef>
+      <a:fillRef idx="1">
+        <a:scrgbClr r="0" g="0" b="0"/>
+      </a:fillRef>
+      <a:effectRef idx="0">
+        <a:scrgbClr r="0" g="0" b="0"/>
+      </a:effectRef>
+      <a:fontRef idx="minor"/>
+    </dgm:style>
+  </dgm:styleLbl>
+  <dgm:styleLbl name="trBgShp">
+    <dgm:scene3d>
+      <a:camera prst="orthographicFront"/>
+      <a:lightRig rig="threePt" dir="t"/>
+    </dgm:scene3d>
+    <dgm:sp3d/>
+    <dgm:txPr/>
+    <dgm:style>
+      <a:lnRef idx="0">
+        <a:scrgbClr r="0" g="0" b="0"/>
+      </a:lnRef>
+      <a:fillRef idx="1">
+        <a:scrgbClr r="0" g="0" b="0"/>
+      </a:fillRef>
+      <a:effectRef idx="0">
+        <a:scrgbClr r="0" g="0" b="0"/>
+      </a:effectRef>
+      <a:fontRef idx="minor"/>
+    </dgm:style>
+  </dgm:styleLbl>
+  <dgm:styleLbl name="fgShp">
+    <dgm:scene3d>
+      <a:camera prst="orthographicFront"/>
+      <a:lightRig rig="threePt" dir="t"/>
+    </dgm:scene3d>
+    <dgm:sp3d/>
+    <dgm:txPr/>
+    <dgm:style>
+      <a:lnRef idx="2">
+        <a:scrgbClr r="0" g="0" b="0"/>
+      </a:lnRef>
+      <a:fillRef idx="1">
+        <a:scrgbClr r="0" g="0" b="0"/>
+      </a:fillRef>
+      <a:effectRef idx="0">
+        <a:scrgbClr r="0" g="0" b="0"/>
+      </a:effectRef>
+      <a:fontRef idx="minor"/>
+    </dgm:style>
+  </dgm:styleLbl>
+  <dgm:styleLbl name="revTx">
+    <dgm:scene3d>
+      <a:camera prst="orthographicFront"/>
+      <a:lightRig rig="threePt" dir="t"/>
+    </dgm:scene3d>
+    <dgm:sp3d/>
+    <dgm:txPr/>
+    <dgm:style>
+      <a:lnRef idx="0">
+        <a:scrgbClr r="0" g="0" b="0"/>
+      </a:lnRef>
+      <a:fillRef idx="0">
+        <a:scrgbClr r="0" g="0" b="0"/>
+      </a:fillRef>
+      <a:effectRef idx="0">
+        <a:scrgbClr r="0" g="0" b="0"/>
+      </a:effectRef>
+      <a:fontRef idx="minor"/>
+    </dgm:style>
+  </dgm:styleLbl>
+</dgm:styleDef>
+</file>
+
 <file path=ppt/diagrams/quickStyle2.xml><?xml version="1.0" encoding="utf-8"?>
 <dgm:styleDef xmlns:dgm="http://schemas.openxmlformats.org/drawingml/2006/diagram" xmlns:a="http://schemas.openxmlformats.org/drawingml/2006/main" uniqueId="urn:microsoft.com/office/officeart/2005/8/quickstyle/simple1">
   <dgm:title val=""/>
@@ -44845,7 +48251,7 @@
     </p:spTree>
     <p:extLst>
       <p:ext uri="{BB962C8B-B14F-4D97-AF65-F5344CB8AC3E}">
-        <p14:creationId xmlns:p14="http://schemas.microsoft.com/office/powerpoint/2010/main" xmlns="" val="2837288555"/>
+        <p14:creationId xmlns="" xmlns:p14="http://schemas.microsoft.com/office/powerpoint/2010/main" val="2837288555"/>
       </p:ext>
     </p:extLst>
   </p:cSld>
@@ -46175,6 +49581,88 @@
 </p:notes>
 </file>
 
+<file path=ppt/notesSlides/notesSlide23.xml><?xml version="1.0" encoding="utf-8"?>
+<p:notes xmlns:a="http://schemas.openxmlformats.org/drawingml/2006/main" xmlns:r="http://schemas.openxmlformats.org/officeDocument/2006/relationships" xmlns:p="http://schemas.openxmlformats.org/presentationml/2006/main">
+  <p:cSld>
+    <p:spTree>
+      <p:nvGrpSpPr>
+        <p:cNvPr id="1" name=""/>
+        <p:cNvGrpSpPr/>
+        <p:nvPr/>
+      </p:nvGrpSpPr>
+      <p:grpSpPr>
+        <a:xfrm>
+          <a:off x="0" y="0"/>
+          <a:ext cx="0" cy="0"/>
+          <a:chOff x="0" y="0"/>
+          <a:chExt cx="0" cy="0"/>
+        </a:xfrm>
+      </p:grpSpPr>
+      <p:sp>
+        <p:nvSpPr>
+          <p:cNvPr id="2" name="Slide Image Placeholder 1"/>
+          <p:cNvSpPr>
+            <a:spLocks noGrp="1" noRot="1" noChangeAspect="1"/>
+          </p:cNvSpPr>
+          <p:nvPr>
+            <p:ph type="sldImg"/>
+          </p:nvPr>
+        </p:nvSpPr>
+        <p:spPr/>
+      </p:sp>
+      <p:sp>
+        <p:nvSpPr>
+          <p:cNvPr id="3" name="Notes Placeholder 2"/>
+          <p:cNvSpPr>
+            <a:spLocks noGrp="1"/>
+          </p:cNvSpPr>
+          <p:nvPr>
+            <p:ph type="body" idx="1"/>
+          </p:nvPr>
+        </p:nvSpPr>
+        <p:spPr/>
+        <p:txBody>
+          <a:bodyPr>
+            <a:normAutofit/>
+          </a:bodyPr>
+          <a:lstStyle/>
+          <a:p>
+            <a:endParaRPr lang="en-US"/>
+          </a:p>
+        </p:txBody>
+      </p:sp>
+      <p:sp>
+        <p:nvSpPr>
+          <p:cNvPr id="4" name="Slide Number Placeholder 3"/>
+          <p:cNvSpPr>
+            <a:spLocks noGrp="1"/>
+          </p:cNvSpPr>
+          <p:nvPr>
+            <p:ph type="sldNum" sz="quarter" idx="10"/>
+          </p:nvPr>
+        </p:nvSpPr>
+        <p:spPr/>
+        <p:txBody>
+          <a:bodyPr/>
+          <a:lstStyle/>
+          <a:p>
+            <a:fld id="{C7638540-05FF-4C33-A664-B971BAFF3076}" type="slidenum">
+              <a:rPr lang="en-US" smtClean="0"/>
+              <a:pPr/>
+              <a:t>23</a:t>
+            </a:fld>
+            <a:endParaRPr lang="en-US"/>
+          </a:p>
+        </p:txBody>
+      </p:sp>
+    </p:spTree>
+  </p:cSld>
+  <p:clrMapOvr>
+    <a:masterClrMapping/>
+  </p:clrMapOvr>
+</p:notes>
+</file>
+
 <file path=ppt/notesSlides/notesSlide3.xml><?xml version="1.0" encoding="utf-8"?>
 <p:notes xmlns:a="http://schemas.openxmlformats.org/drawingml/2006/main" xmlns:r="http://schemas.openxmlformats.org/officeDocument/2006/relationships" xmlns:p="http://schemas.openxmlformats.org/presentationml/2006/main">
   <p:cSld>
@@ -46983,7 +50471,7 @@
     </p:spTree>
     <p:extLst>
       <p:ext uri="{BB962C8B-B14F-4D97-AF65-F5344CB8AC3E}">
-        <p14:creationId xmlns:p14="http://schemas.microsoft.com/office/powerpoint/2010/main" xmlns="" val="1359784228"/>
+        <p14:creationId xmlns="" xmlns:p14="http://schemas.microsoft.com/office/powerpoint/2010/main" val="1359784228"/>
       </p:ext>
     </p:extLst>
   </p:cSld>
@@ -47155,7 +50643,7 @@
     </p:spTree>
     <p:extLst>
       <p:ext uri="{BB962C8B-B14F-4D97-AF65-F5344CB8AC3E}">
-        <p14:creationId xmlns:p14="http://schemas.microsoft.com/office/powerpoint/2010/main" xmlns="" val="1535817038"/>
+        <p14:creationId xmlns="" xmlns:p14="http://schemas.microsoft.com/office/powerpoint/2010/main" val="1535817038"/>
       </p:ext>
     </p:extLst>
   </p:cSld>
@@ -47337,7 +50825,7 @@
     </p:spTree>
     <p:extLst>
       <p:ext uri="{BB962C8B-B14F-4D97-AF65-F5344CB8AC3E}">
-        <p14:creationId xmlns:p14="http://schemas.microsoft.com/office/powerpoint/2010/main" xmlns="" val="3305786099"/>
+        <p14:creationId xmlns="" xmlns:p14="http://schemas.microsoft.com/office/powerpoint/2010/main" val="3305786099"/>
       </p:ext>
     </p:extLst>
   </p:cSld>
@@ -47509,7 +50997,7 @@
     </p:spTree>
     <p:extLst>
       <p:ext uri="{BB962C8B-B14F-4D97-AF65-F5344CB8AC3E}">
-        <p14:creationId xmlns:p14="http://schemas.microsoft.com/office/powerpoint/2010/main" xmlns="" val="2808464794"/>
+        <p14:creationId xmlns="" xmlns:p14="http://schemas.microsoft.com/office/powerpoint/2010/main" val="2808464794"/>
       </p:ext>
     </p:extLst>
   </p:cSld>
@@ -47757,7 +51245,7 @@
     </p:spTree>
     <p:extLst>
       <p:ext uri="{BB962C8B-B14F-4D97-AF65-F5344CB8AC3E}">
-        <p14:creationId xmlns:p14="http://schemas.microsoft.com/office/powerpoint/2010/main" xmlns="" val="3350234395"/>
+        <p14:creationId xmlns="" xmlns:p14="http://schemas.microsoft.com/office/powerpoint/2010/main" val="3350234395"/>
       </p:ext>
     </p:extLst>
   </p:cSld>
@@ -48047,7 +51535,7 @@
     </p:spTree>
     <p:extLst>
       <p:ext uri="{BB962C8B-B14F-4D97-AF65-F5344CB8AC3E}">
-        <p14:creationId xmlns:p14="http://schemas.microsoft.com/office/powerpoint/2010/main" xmlns="" val="2876325978"/>
+        <p14:creationId xmlns="" xmlns:p14="http://schemas.microsoft.com/office/powerpoint/2010/main" val="2876325978"/>
       </p:ext>
     </p:extLst>
   </p:cSld>
@@ -48471,7 +51959,7 @@
     </p:spTree>
     <p:extLst>
       <p:ext uri="{BB962C8B-B14F-4D97-AF65-F5344CB8AC3E}">
-        <p14:creationId xmlns:p14="http://schemas.microsoft.com/office/powerpoint/2010/main" xmlns="" val="2581016330"/>
+        <p14:creationId xmlns="" xmlns:p14="http://schemas.microsoft.com/office/powerpoint/2010/main" val="2581016330"/>
       </p:ext>
     </p:extLst>
   </p:cSld>
@@ -48591,7 +52079,7 @@
     </p:spTree>
     <p:extLst>
       <p:ext uri="{BB962C8B-B14F-4D97-AF65-F5344CB8AC3E}">
-        <p14:creationId xmlns:p14="http://schemas.microsoft.com/office/powerpoint/2010/main" xmlns="" val="2219315351"/>
+        <p14:creationId xmlns="" xmlns:p14="http://schemas.microsoft.com/office/powerpoint/2010/main" val="2219315351"/>
       </p:ext>
     </p:extLst>
   </p:cSld>
@@ -48688,7 +52176,7 @@
     </p:spTree>
     <p:extLst>
       <p:ext uri="{BB962C8B-B14F-4D97-AF65-F5344CB8AC3E}">
-        <p14:creationId xmlns:p14="http://schemas.microsoft.com/office/powerpoint/2010/main" xmlns="" val="4149962164"/>
+        <p14:creationId xmlns="" xmlns:p14="http://schemas.microsoft.com/office/powerpoint/2010/main" val="4149962164"/>
       </p:ext>
     </p:extLst>
   </p:cSld>
@@ -48967,7 +52455,7 @@
     </p:spTree>
     <p:extLst>
       <p:ext uri="{BB962C8B-B14F-4D97-AF65-F5344CB8AC3E}">
-        <p14:creationId xmlns:p14="http://schemas.microsoft.com/office/powerpoint/2010/main" xmlns="" val="2318772332"/>
+        <p14:creationId xmlns="" xmlns:p14="http://schemas.microsoft.com/office/powerpoint/2010/main" val="2318772332"/>
       </p:ext>
     </p:extLst>
   </p:cSld>
@@ -49222,7 +52710,7 @@
     </p:spTree>
     <p:extLst>
       <p:ext uri="{BB962C8B-B14F-4D97-AF65-F5344CB8AC3E}">
-        <p14:creationId xmlns:p14="http://schemas.microsoft.com/office/powerpoint/2010/main" xmlns="" val="2574223405"/>
+        <p14:creationId xmlns="" xmlns:p14="http://schemas.microsoft.com/office/powerpoint/2010/main" val="2574223405"/>
       </p:ext>
     </p:extLst>
   </p:cSld>
@@ -49473,7 +52961,7 @@
     </p:spTree>
     <p:extLst>
       <p:ext uri="{BB962C8B-B14F-4D97-AF65-F5344CB8AC3E}">
-        <p14:creationId xmlns:p14="http://schemas.microsoft.com/office/powerpoint/2010/main" xmlns="" val="3383897187"/>
+        <p14:creationId xmlns="" xmlns:p14="http://schemas.microsoft.com/office/powerpoint/2010/main" val="3383897187"/>
       </p:ext>
     </p:extLst>
   </p:cSld>
@@ -49802,7 +53290,7 @@
     </p:spTree>
     <p:extLst>
       <p:ext uri="{BB962C8B-B14F-4D97-AF65-F5344CB8AC3E}">
-        <p14:creationId xmlns:p14="http://schemas.microsoft.com/office/powerpoint/2010/main" xmlns="" val="2398501569"/>
+        <p14:creationId xmlns="" xmlns:p14="http://schemas.microsoft.com/office/powerpoint/2010/main" val="2398501569"/>
       </p:ext>
     </p:extLst>
   </p:cSld>
@@ -50495,7 +53983,7 @@
     </p:spTree>
     <p:extLst>
       <p:ext uri="{BB962C8B-B14F-4D97-AF65-F5344CB8AC3E}">
-        <p14:creationId xmlns:p14="http://schemas.microsoft.com/office/powerpoint/2010/main" xmlns="" val="2601577110"/>
+        <p14:creationId xmlns="" xmlns:p14="http://schemas.microsoft.com/office/powerpoint/2010/main" val="2601577110"/>
       </p:ext>
     </p:extLst>
   </p:cSld>
@@ -50558,7 +54046,7 @@
             <p:ph idx="1"/>
             <p:extLst>
               <p:ext uri="{D42A27DB-BD31-4B8C-83A1-F6EECF244321}">
-                <p14:modId xmlns:p14="http://schemas.microsoft.com/office/powerpoint/2010/main" xmlns="" val="2177100673"/>
+                <p14:modId xmlns="" xmlns:p14="http://schemas.microsoft.com/office/powerpoint/2010/main" val="2177100673"/>
               </p:ext>
             </p:extLst>
           </p:nvPr>
@@ -50582,7 +54070,7 @@
           <p:nvPr>
             <p:extLst>
               <p:ext uri="{D42A27DB-BD31-4B8C-83A1-F6EECF244321}">
-                <p14:modId xmlns:p14="http://schemas.microsoft.com/office/powerpoint/2010/main" xmlns="" val="3880500600"/>
+                <p14:modId xmlns="" xmlns:p14="http://schemas.microsoft.com/office/powerpoint/2010/main" val="3880500600"/>
               </p:ext>
             </p:extLst>
           </p:nvPr>
@@ -50720,7 +54208,7 @@
     </p:spTree>
     <p:extLst>
       <p:ext uri="{BB962C8B-B14F-4D97-AF65-F5344CB8AC3E}">
-        <p14:creationId xmlns:p14="http://schemas.microsoft.com/office/powerpoint/2010/main" xmlns="" val="686433211"/>
+        <p14:creationId xmlns="" xmlns:p14="http://schemas.microsoft.com/office/powerpoint/2010/main" val="686433211"/>
       </p:ext>
     </p:extLst>
   </p:cSld>
@@ -50794,7 +54282,7 @@
             <p:ph idx="1"/>
             <p:extLst>
               <p:ext uri="{D42A27DB-BD31-4B8C-83A1-F6EECF244321}">
-                <p14:modId xmlns:p14="http://schemas.microsoft.com/office/powerpoint/2010/main" xmlns="" val="545708058"/>
+                <p14:modId xmlns="" xmlns:p14="http://schemas.microsoft.com/office/powerpoint/2010/main" val="545708058"/>
               </p:ext>
             </p:extLst>
           </p:nvPr>
@@ -50812,7 +54300,7 @@
     </p:spTree>
     <p:extLst>
       <p:ext uri="{BB962C8B-B14F-4D97-AF65-F5344CB8AC3E}">
-        <p14:creationId xmlns:p14="http://schemas.microsoft.com/office/powerpoint/2010/main" xmlns="" val="2992830619"/>
+        <p14:creationId xmlns="" xmlns:p14="http://schemas.microsoft.com/office/powerpoint/2010/main" val="2992830619"/>
       </p:ext>
     </p:extLst>
   </p:cSld>
@@ -50893,7 +54381,7 @@
           <p:nvPr>
             <p:extLst>
               <p:ext uri="{D42A27DB-BD31-4B8C-83A1-F6EECF244321}">
-                <p14:modId xmlns:p14="http://schemas.microsoft.com/office/powerpoint/2010/main" xmlns="" val="2621353938"/>
+                <p14:modId xmlns="" xmlns:p14="http://schemas.microsoft.com/office/powerpoint/2010/main" val="2621353938"/>
               </p:ext>
             </p:extLst>
           </p:nvPr>
@@ -50917,7 +54405,7 @@
           <p:nvPr>
             <p:extLst>
               <p:ext uri="{D42A27DB-BD31-4B8C-83A1-F6EECF244321}">
-                <p14:modId xmlns:p14="http://schemas.microsoft.com/office/powerpoint/2010/main" xmlns="" val="1248215537"/>
+                <p14:modId xmlns="" xmlns:p14="http://schemas.microsoft.com/office/powerpoint/2010/main" val="1248215537"/>
               </p:ext>
             </p:extLst>
           </p:nvPr>
@@ -51027,7 +54515,7 @@
     </p:spTree>
     <p:extLst>
       <p:ext uri="{BB962C8B-B14F-4D97-AF65-F5344CB8AC3E}">
-        <p14:creationId xmlns:p14="http://schemas.microsoft.com/office/powerpoint/2010/main" xmlns="" val="1557959741"/>
+        <p14:creationId xmlns="" xmlns:p14="http://schemas.microsoft.com/office/powerpoint/2010/main" val="1557959741"/>
       </p:ext>
     </p:extLst>
   </p:cSld>
@@ -51090,14 +54578,14 @@
             <p:ph idx="1"/>
             <p:extLst>
               <p:ext uri="{D42A27DB-BD31-4B8C-83A1-F6EECF244321}">
-                <p14:modId xmlns:p14="http://schemas.microsoft.com/office/powerpoint/2010/main" xmlns="" val="3607291589"/>
+                <p14:modId xmlns="" xmlns:p14="http://schemas.microsoft.com/office/powerpoint/2010/main" val="3607291589"/>
               </p:ext>
             </p:extLst>
           </p:nvPr>
         </p:nvGraphicFramePr>
         <p:xfrm>
-          <a:off x="457200" y="1600200"/>
-          <a:ext cx="8229600" cy="4525963"/>
+          <a:off x="457200" y="2420889"/>
+          <a:ext cx="8229600" cy="1944215"/>
         </p:xfrm>
         <a:graphic>
           <a:graphicData uri="http://schemas.openxmlformats.org/drawingml/2006/diagram">
@@ -51108,7 +54596,7 @@
     </p:spTree>
     <p:extLst>
       <p:ext uri="{BB962C8B-B14F-4D97-AF65-F5344CB8AC3E}">
-        <p14:creationId xmlns:p14="http://schemas.microsoft.com/office/powerpoint/2010/main" xmlns="" val="704232541"/>
+        <p14:creationId xmlns="" xmlns:p14="http://schemas.microsoft.com/office/powerpoint/2010/main" val="704232541"/>
       </p:ext>
     </p:extLst>
   </p:cSld>
@@ -53336,7 +56824,7 @@
     </p:spTree>
     <p:extLst>
       <p:ext uri="{BB962C8B-B14F-4D97-AF65-F5344CB8AC3E}">
-        <p14:creationId xmlns:p14="http://schemas.microsoft.com/office/powerpoint/2010/main" xmlns="" val="1650756672"/>
+        <p14:creationId xmlns="" xmlns:p14="http://schemas.microsoft.com/office/powerpoint/2010/main" val="1650756672"/>
       </p:ext>
     </p:extLst>
   </p:cSld>
@@ -53720,7 +57208,7 @@
     </p:spTree>
     <p:extLst>
       <p:ext uri="{BB962C8B-B14F-4D97-AF65-F5344CB8AC3E}">
-        <p14:creationId xmlns:p14="http://schemas.microsoft.com/office/powerpoint/2010/main" xmlns="" val="2269612353"/>
+        <p14:creationId xmlns="" xmlns:p14="http://schemas.microsoft.com/office/powerpoint/2010/main" val="2269612353"/>
       </p:ext>
     </p:extLst>
   </p:cSld>
@@ -53800,7 +57288,7 @@
             <p:nvPr>
               <p:extLst>
                 <p:ext uri="{D42A27DB-BD31-4B8C-83A1-F6EECF244321}">
-                  <p14:modId xmlns:p14="http://schemas.microsoft.com/office/powerpoint/2010/main" xmlns="" val="2598465583"/>
+                  <p14:modId xmlns="" xmlns:p14="http://schemas.microsoft.com/office/powerpoint/2010/main" val="2598465583"/>
                 </p:ext>
               </p:extLst>
             </p:nvPr>
@@ -54981,7 +58469,7 @@
     </p:spTree>
     <p:extLst>
       <p:ext uri="{BB962C8B-B14F-4D97-AF65-F5344CB8AC3E}">
-        <p14:creationId xmlns:p14="http://schemas.microsoft.com/office/powerpoint/2010/main" xmlns="" val="1633000113"/>
+        <p14:creationId xmlns="" xmlns:p14="http://schemas.microsoft.com/office/powerpoint/2010/main" val="1633000113"/>
       </p:ext>
     </p:extLst>
   </p:cSld>
@@ -55044,7 +58532,7 @@
             <p:ph idx="1"/>
             <p:extLst>
               <p:ext uri="{D42A27DB-BD31-4B8C-83A1-F6EECF244321}">
-                <p14:modId xmlns:p14="http://schemas.microsoft.com/office/powerpoint/2010/main" xmlns="" val="812163987"/>
+                <p14:modId xmlns="" xmlns:p14="http://schemas.microsoft.com/office/powerpoint/2010/main" val="812163987"/>
               </p:ext>
             </p:extLst>
           </p:nvPr>
@@ -55097,7 +58585,7 @@
     </p:spTree>
     <p:extLst>
       <p:ext uri="{BB962C8B-B14F-4D97-AF65-F5344CB8AC3E}">
-        <p14:creationId xmlns:p14="http://schemas.microsoft.com/office/powerpoint/2010/main" xmlns="" val="3929008511"/>
+        <p14:creationId xmlns="" xmlns:p14="http://schemas.microsoft.com/office/powerpoint/2010/main" val="3929008511"/>
       </p:ext>
     </p:extLst>
   </p:cSld>
@@ -55115,6 +58603,77 @@
 </file>
 
 <file path=ppt/slides/slide20.xml><?xml version="1.0" encoding="utf-8"?>
+<p:sld xmlns:a="http://schemas.openxmlformats.org/drawingml/2006/main" xmlns:r="http://schemas.openxmlformats.org/officeDocument/2006/relationships" xmlns:p="http://schemas.openxmlformats.org/presentationml/2006/main">
+  <p:cSld>
+    <p:spTree>
+      <p:nvGrpSpPr>
+        <p:cNvPr id="1" name=""/>
+        <p:cNvGrpSpPr/>
+        <p:nvPr/>
+      </p:nvGrpSpPr>
+      <p:grpSpPr>
+        <a:xfrm>
+          <a:off x="0" y="0"/>
+          <a:ext cx="0" cy="0"/>
+          <a:chOff x="0" y="0"/>
+          <a:chExt cx="0" cy="0"/>
+        </a:xfrm>
+      </p:grpSpPr>
+      <p:sp>
+        <p:nvSpPr>
+          <p:cNvPr id="2" name="Title 1"/>
+          <p:cNvSpPr>
+            <a:spLocks noGrp="1"/>
+          </p:cNvSpPr>
+          <p:nvPr>
+            <p:ph type="title"/>
+          </p:nvPr>
+        </p:nvSpPr>
+        <p:spPr>
+          <a:xfrm>
+            <a:off x="457200" y="274638"/>
+            <a:ext cx="8229600" cy="562074"/>
+          </a:xfrm>
+        </p:spPr>
+        <p:txBody>
+          <a:bodyPr>
+            <a:normAutofit fontScale="90000"/>
+          </a:bodyPr>
+          <a:lstStyle/>
+          <a:p>
+            <a:r>
+              <a:rPr lang="en-US" dirty="0" err="1" smtClean="0"/>
+              <a:t>Time_access</a:t>
+            </a:r>
+            <a:endParaRPr lang="en-US" dirty="0"/>
+          </a:p>
+        </p:txBody>
+      </p:sp>
+      <p:graphicFrame>
+        <p:nvGraphicFramePr>
+          <p:cNvPr id="4" name="Diagram 3"/>
+          <p:cNvGraphicFramePr/>
+          <p:nvPr/>
+        </p:nvGraphicFramePr>
+        <p:xfrm>
+          <a:off x="251520" y="1397000"/>
+          <a:ext cx="8352928" cy="2032000"/>
+        </p:xfrm>
+        <a:graphic>
+          <a:graphicData uri="http://schemas.openxmlformats.org/drawingml/2006/diagram">
+            <dgm:relIds xmlns:dgm="http://schemas.openxmlformats.org/drawingml/2006/diagram" xmlns:r="http://schemas.openxmlformats.org/officeDocument/2006/relationships" r:dm="rId3" r:lo="rId4" r:qs="rId5" r:cs="rId6"/>
+          </a:graphicData>
+        </a:graphic>
+      </p:graphicFrame>
+    </p:spTree>
+  </p:cSld>
+  <p:clrMapOvr>
+    <a:masterClrMapping/>
+  </p:clrMapOvr>
+</p:sld>
+</file>
+
+<file path=ppt/slides/slide21.xml><?xml version="1.0" encoding="utf-8"?>
 <p:sld xmlns:a="http://schemas.openxmlformats.org/drawingml/2006/main" xmlns:r="http://schemas.openxmlformats.org/officeDocument/2006/relationships" xmlns:p="http://schemas.openxmlformats.org/presentationml/2006/main">
   <p:cSld>
     <p:spTree>
@@ -55680,7 +59239,7 @@
     </p:spTree>
     <p:extLst>
       <p:ext uri="{BB962C8B-B14F-4D97-AF65-F5344CB8AC3E}">
-        <p14:creationId xmlns:p14="http://schemas.microsoft.com/office/powerpoint/2010/main" xmlns="" val="2666438091"/>
+        <p14:creationId xmlns="" xmlns:p14="http://schemas.microsoft.com/office/powerpoint/2010/main" val="2666438091"/>
       </p:ext>
     </p:extLst>
   </p:cSld>
@@ -55697,7 +59256,7 @@
 </p:sld>
 </file>
 
-<file path=ppt/slides/slide21.xml><?xml version="1.0" encoding="utf-8"?>
+<file path=ppt/slides/slide22.xml><?xml version="1.0" encoding="utf-8"?>
 <p:sld xmlns:a="http://schemas.openxmlformats.org/drawingml/2006/main" xmlns:r="http://schemas.openxmlformats.org/officeDocument/2006/relationships" xmlns:p="http://schemas.openxmlformats.org/presentationml/2006/main">
   <p:cSld>
     <p:spTree>
@@ -56129,7 +59688,7 @@
     </p:spTree>
     <p:extLst>
       <p:ext uri="{BB962C8B-B14F-4D97-AF65-F5344CB8AC3E}">
-        <p14:creationId xmlns:p14="http://schemas.microsoft.com/office/powerpoint/2010/main" xmlns="" val="4073241746"/>
+        <p14:creationId xmlns="" xmlns:p14="http://schemas.microsoft.com/office/powerpoint/2010/main" val="4073241746"/>
       </p:ext>
     </p:extLst>
   </p:cSld>
@@ -56146,7 +59705,7 @@
 </p:sld>
 </file>
 
-<file path=ppt/slides/slide22.xml><?xml version="1.0" encoding="utf-8"?>
+<file path=ppt/slides/slide23.xml><?xml version="1.0" encoding="utf-8"?>
 <p:sld xmlns:a="http://schemas.openxmlformats.org/drawingml/2006/main" xmlns:r="http://schemas.openxmlformats.org/officeDocument/2006/relationships" xmlns:p="http://schemas.openxmlformats.org/presentationml/2006/main">
   <p:cSld>
     <p:spTree>
@@ -56405,7 +59964,7 @@
     </p:spTree>
     <p:extLst>
       <p:ext uri="{BB962C8B-B14F-4D97-AF65-F5344CB8AC3E}">
-        <p14:creationId xmlns:p14="http://schemas.microsoft.com/office/powerpoint/2010/main" xmlns="" val="296434353"/>
+        <p14:creationId xmlns="" xmlns:p14="http://schemas.microsoft.com/office/powerpoint/2010/main" val="296434353"/>
       </p:ext>
     </p:extLst>
   </p:cSld>
@@ -56878,7 +60437,7 @@
             <p:ph idx="1"/>
             <p:extLst>
               <p:ext uri="{D42A27DB-BD31-4B8C-83A1-F6EECF244321}">
-                <p14:modId xmlns:p14="http://schemas.microsoft.com/office/powerpoint/2010/main" xmlns="" val="3537299332"/>
+                <p14:modId xmlns="" xmlns:p14="http://schemas.microsoft.com/office/powerpoint/2010/main" val="3537299332"/>
               </p:ext>
             </p:extLst>
           </p:nvPr>
@@ -56896,7 +60455,7 @@
     </p:spTree>
     <p:extLst>
       <p:ext uri="{BB962C8B-B14F-4D97-AF65-F5344CB8AC3E}">
-        <p14:creationId xmlns:p14="http://schemas.microsoft.com/office/powerpoint/2010/main" xmlns="" val="2350175017"/>
+        <p14:creationId xmlns="" xmlns:p14="http://schemas.microsoft.com/office/powerpoint/2010/main" val="2350175017"/>
       </p:ext>
     </p:extLst>
   </p:cSld>
@@ -56964,7 +60523,7 @@
             <p:ph idx="1"/>
             <p:extLst>
               <p:ext uri="{D42A27DB-BD31-4B8C-83A1-F6EECF244321}">
-                <p14:modId xmlns:p14="http://schemas.microsoft.com/office/powerpoint/2010/main" xmlns="" val="2475547916"/>
+                <p14:modId xmlns="" xmlns:p14="http://schemas.microsoft.com/office/powerpoint/2010/main" val="2475547916"/>
               </p:ext>
             </p:extLst>
           </p:nvPr>
@@ -56986,7 +60545,7 @@
           <p:nvPr>
             <p:extLst>
               <p:ext uri="{D42A27DB-BD31-4B8C-83A1-F6EECF244321}">
-                <p14:modId xmlns:p14="http://schemas.microsoft.com/office/powerpoint/2010/main" xmlns="" val="1761478570"/>
+                <p14:modId xmlns="" xmlns:p14="http://schemas.microsoft.com/office/powerpoint/2010/main" val="1761478570"/>
               </p:ext>
             </p:extLst>
           </p:nvPr>
@@ -57010,7 +60569,7 @@
           <p:nvPr>
             <p:extLst>
               <p:ext uri="{D42A27DB-BD31-4B8C-83A1-F6EECF244321}">
-                <p14:modId xmlns:p14="http://schemas.microsoft.com/office/powerpoint/2010/main" xmlns="" val="1111039397"/>
+                <p14:modId xmlns="" xmlns:p14="http://schemas.microsoft.com/office/powerpoint/2010/main" val="1111039397"/>
               </p:ext>
             </p:extLst>
           </p:nvPr>
@@ -57137,7 +60696,7 @@
     </p:spTree>
     <p:extLst>
       <p:ext uri="{BB962C8B-B14F-4D97-AF65-F5344CB8AC3E}">
-        <p14:creationId xmlns:p14="http://schemas.microsoft.com/office/powerpoint/2010/main" xmlns="" val="2434108879"/>
+        <p14:creationId xmlns="" xmlns:p14="http://schemas.microsoft.com/office/powerpoint/2010/main" val="2434108879"/>
       </p:ext>
     </p:extLst>
   </p:cSld>
@@ -57205,7 +60764,7 @@
             <p:ph idx="1"/>
             <p:extLst>
               <p:ext uri="{D42A27DB-BD31-4B8C-83A1-F6EECF244321}">
-                <p14:modId xmlns:p14="http://schemas.microsoft.com/office/powerpoint/2010/main" xmlns="" val="1707743398"/>
+                <p14:modId xmlns="" xmlns:p14="http://schemas.microsoft.com/office/powerpoint/2010/main" val="1707743398"/>
               </p:ext>
             </p:extLst>
           </p:nvPr>
@@ -57227,7 +60786,7 @@
           <p:nvPr>
             <p:extLst>
               <p:ext uri="{D42A27DB-BD31-4B8C-83A1-F6EECF244321}">
-                <p14:modId xmlns:p14="http://schemas.microsoft.com/office/powerpoint/2010/main" xmlns="" val="3451522524"/>
+                <p14:modId xmlns="" xmlns:p14="http://schemas.microsoft.com/office/powerpoint/2010/main" val="3451522524"/>
               </p:ext>
             </p:extLst>
           </p:nvPr>
@@ -57251,7 +60810,7 @@
           <p:nvPr>
             <p:extLst>
               <p:ext uri="{D42A27DB-BD31-4B8C-83A1-F6EECF244321}">
-                <p14:modId xmlns:p14="http://schemas.microsoft.com/office/powerpoint/2010/main" xmlns="" val="874027869"/>
+                <p14:modId xmlns="" xmlns:p14="http://schemas.microsoft.com/office/powerpoint/2010/main" val="874027869"/>
               </p:ext>
             </p:extLst>
           </p:nvPr>
@@ -57378,7 +60937,7 @@
     </p:spTree>
     <p:extLst>
       <p:ext uri="{BB962C8B-B14F-4D97-AF65-F5344CB8AC3E}">
-        <p14:creationId xmlns:p14="http://schemas.microsoft.com/office/powerpoint/2010/main" xmlns="" val="4105648671"/>
+        <p14:creationId xmlns="" xmlns:p14="http://schemas.microsoft.com/office/powerpoint/2010/main" val="4105648671"/>
       </p:ext>
     </p:extLst>
   </p:cSld>
@@ -60849,7 +64408,7 @@
     </p:spTree>
     <p:extLst>
       <p:ext uri="{BB962C8B-B14F-4D97-AF65-F5344CB8AC3E}">
-        <p14:creationId xmlns:p14="http://schemas.microsoft.com/office/powerpoint/2010/main" xmlns="" val="1734076018"/>
+        <p14:creationId xmlns="" xmlns:p14="http://schemas.microsoft.com/office/powerpoint/2010/main" val="1734076018"/>
       </p:ext>
     </p:extLst>
   </p:cSld>

</xml_diff>